<commit_message>
lablog 수정 at 0731
</commit_message>
<xml_diff>
--- a/LabLog.pptx
+++ b/LabLog.pptx
@@ -2,7 +2,7 @@
 <file path=ppt/presentation.xml><?xml version="1.0" encoding="utf-8"?>
 <p:presentation xmlns:r="http://schemas.openxmlformats.org/officeDocument/2006/relationships" xmlns:c="http://schemas.openxmlformats.org/drawingml/2006/chart" xmlns:a="http://schemas.openxmlformats.org/drawingml/2006/main" xmlns:dgm="http://schemas.openxmlformats.org/drawingml/2006/diagram" xmlns:dsp="http://schemas.microsoft.com/office/drawing/2008/diagram" xmlns:p="http://schemas.openxmlformats.org/presentationml/2006/main">
   <p:sldMasterIdLst>
-    <p:sldMasterId id="2147483661" r:id="rId1"/>
+    <p:sldMasterId id="2147483662" r:id="rId1"/>
   </p:sldMasterIdLst>
   <p:sldIdLst>
     <p:sldId id="256" r:id="rId2"/>
@@ -3339,12 +3339,14 @@
         </p:nvSpPr>
         <p:spPr>
           <a:xfrm>
-            <a:off x="838200" y="538956"/>
-            <a:ext cx="10515600" cy="3212480"/>
+            <a:off x="358184" y="465174"/>
+            <a:ext cx="11475632" cy="5927651"/>
           </a:xfrm>
         </p:spPr>
         <p:txBody>
-          <a:bodyPr/>
+          <a:bodyPr>
+            <a:noAutofit/>
+          </a:bodyPr>
           <a:lstStyle/>
           <a:p>
             <a:pPr marL="0" indent="0">
@@ -3352,18 +3354,18 @@
               <a:defRPr/>
             </a:pPr>
             <a:r>
-              <a:rPr lang="en-US" altLang="ko-KR"/>
+              <a:rPr lang="en-US" altLang="ko-KR" sz="4000" b="1"/>
               <a:t>- h (</a:t>
             </a:r>
             <a:r>
-              <a:rPr lang="ko-KR" altLang="en-US"/>
+              <a:rPr lang="ko-KR" altLang="en-US" sz="4000" b="1"/>
               <a:t>핑거 높이</a:t>
             </a:r>
             <a:r>
-              <a:rPr lang="en-US" altLang="ko-KR"/>
-              <a:t>)</a:t>
-            </a:r>
-            <a:endParaRPr lang="en-US" altLang="ko-KR"/>
+              <a:rPr lang="en-US" altLang="ko-KR" sz="4000" b="1"/>
+              <a:t>) :</a:t>
+            </a:r>
+            <a:endParaRPr lang="en-US" altLang="ko-KR" sz="4000" b="1"/>
           </a:p>
           <a:p>
             <a:pPr marL="0" indent="0">
@@ -3371,75 +3373,59 @@
               <a:defRPr/>
             </a:pPr>
             <a:r>
-              <a:rPr lang="en-US" altLang="ko-KR"/>
-              <a:t>-</a:t>
-            </a:r>
-            <a:r>
-              <a:rPr lang="ko-KR" altLang="en-US"/>
-              <a:t> </a:t>
-            </a:r>
-            <a:r>
-              <a:rPr lang="en-US" altLang="ko-KR"/>
-              <a:t>n</a:t>
-            </a:r>
-            <a:r>
-              <a:rPr lang="ko-KR" altLang="en-US"/>
-              <a:t> </a:t>
-            </a:r>
-            <a:r>
-              <a:rPr lang="en-US" altLang="ko-KR"/>
-              <a:t>(</a:t>
-            </a:r>
-            <a:r>
-              <a:rPr lang="ko-KR" altLang="en-US"/>
-              <a:t>다각형 종류</a:t>
-            </a:r>
-            <a:r>
-              <a:rPr lang="en-US" altLang="ko-KR"/>
-              <a:t>)</a:t>
-            </a:r>
-            <a:endParaRPr lang="en-US" altLang="ko-KR"/>
+              <a:rPr lang="en-US" altLang="ko-KR" sz="3500" b="1"/>
+              <a:t>9mm 12mm 15mm 18mm 21mm 24mm 27mm</a:t>
+            </a:r>
+            <a:endParaRPr lang="en-US" altLang="ko-KR" sz="3500" b="1"/>
           </a:p>
           <a:p>
             <a:pPr marL="0" indent="0">
               <a:buNone/>
               <a:defRPr/>
             </a:pPr>
-            <a:r>
-              <a:rPr lang="en-US" altLang="ko-KR"/>
-              <a:t>-</a:t>
-            </a:r>
-            <a:r>
-              <a:rPr lang="ko-KR" altLang="en-US"/>
-              <a:t> </a:t>
-            </a:r>
-            <a:r>
-              <a:rPr lang="en-US" altLang="ko-KR"/>
-              <a:t>D (</a:t>
-            </a:r>
-            <a:r>
-              <a:rPr lang="ko-KR" altLang="en-US"/>
-              <a:t>외접원 지름</a:t>
-            </a:r>
-            <a:r>
-              <a:rPr lang="en-US" altLang="ko-KR"/>
-              <a:t>)</a:t>
-            </a:r>
-            <a:endParaRPr lang="en-US" altLang="ko-KR"/>
+            <a:endParaRPr lang="en-US" altLang="ko-KR" sz="3500" b="1"/>
           </a:p>
           <a:p>
             <a:pPr marL="0" indent="0">
               <a:buNone/>
               <a:defRPr/>
             </a:pPr>
-            <a:endParaRPr lang="en-US" altLang="ko-KR"/>
+            <a:r>
+              <a:rPr lang="en-US" altLang="ko-KR" sz="4000" b="1"/>
+              <a:t>-</a:t>
+            </a:r>
+            <a:r>
+              <a:rPr lang="ko-KR" altLang="en-US" sz="4000" b="1"/>
+              <a:t> </a:t>
+            </a:r>
+            <a:r>
+              <a:rPr lang="en-US" altLang="ko-KR" sz="4000" b="1"/>
+              <a:t>n</a:t>
+            </a:r>
+            <a:r>
+              <a:rPr lang="ko-KR" altLang="en-US" sz="4000" b="1"/>
+              <a:t> </a:t>
+            </a:r>
+            <a:r>
+              <a:rPr lang="en-US" altLang="ko-KR" sz="4000" b="1"/>
+              <a:t>(</a:t>
+            </a:r>
+            <a:r>
+              <a:rPr lang="ko-KR" altLang="en-US" sz="4000" b="1"/>
+              <a:t>다각형 종류</a:t>
+            </a:r>
+            <a:r>
+              <a:rPr lang="en-US" altLang="ko-KR" sz="4000" b="1"/>
+              <a:t>) :</a:t>
+            </a:r>
+            <a:endParaRPr lang="en-US" altLang="ko-KR" sz="4000" b="1"/>
           </a:p>
           <a:p>
             <a:pPr marL="0" indent="0">
               <a:buNone/>
               <a:defRPr/>
             </a:pPr>
-            <a:endParaRPr lang="en-US" altLang="ko-KR"/>
+            <a:endParaRPr lang="en-US" altLang="ko-KR" sz="4000" b="1"/>
           </a:p>
           <a:p>
             <a:pPr marL="0" indent="0">
@@ -3447,18 +3433,63 @@
               <a:defRPr/>
             </a:pPr>
             <a:r>
-              <a:rPr lang="en-US" altLang="ko-KR"/>
-              <a:t>*</a:t>
-            </a:r>
-            <a:r>
-              <a:rPr lang="ko-KR" altLang="en-US"/>
-              <a:t> 작은 외접원 지름</a:t>
-            </a:r>
-            <a:r>
-              <a:rPr lang="en-US" altLang="ko-KR"/>
-              <a:t> d </a:t>
-            </a:r>
-            <a:endParaRPr lang="en-US" altLang="ko-KR"/>
+              <a:rPr lang="en-US" altLang="ko-KR" sz="4000" b="1"/>
+              <a:t>-</a:t>
+            </a:r>
+            <a:r>
+              <a:rPr lang="ko-KR" altLang="en-US" sz="4000" b="1"/>
+              <a:t> </a:t>
+            </a:r>
+            <a:r>
+              <a:rPr lang="en-US" altLang="ko-KR" sz="4000" b="1"/>
+              <a:t>D (</a:t>
+            </a:r>
+            <a:r>
+              <a:rPr lang="ko-KR" altLang="en-US" sz="4000" b="1"/>
+              <a:t>외접원 지름</a:t>
+            </a:r>
+            <a:r>
+              <a:rPr lang="en-US" altLang="ko-KR" sz="4000" b="1"/>
+              <a:t>) :</a:t>
+            </a:r>
+            <a:endParaRPr lang="en-US" altLang="ko-KR" sz="4000" b="1"/>
+          </a:p>
+          <a:p>
+            <a:pPr marL="0" indent="0">
+              <a:buNone/>
+              <a:defRPr/>
+            </a:pPr>
+            <a:endParaRPr lang="en-US" altLang="ko-KR" sz="4000" b="1"/>
+          </a:p>
+          <a:p>
+            <a:pPr marL="0" indent="0">
+              <a:buNone/>
+              <a:defRPr/>
+            </a:pPr>
+            <a:r>
+              <a:rPr lang="en-US" altLang="ko-KR" sz="4000" b="1"/>
+              <a:t>- t (</a:t>
+            </a:r>
+            <a:r>
+              <a:rPr lang="ko-KR" altLang="en-US" sz="4000" b="1"/>
+              <a:t>얇은 부분 </a:t>
+            </a:r>
+            <a:r>
+              <a:rPr lang="en-US" altLang="ko-KR" sz="4000" b="1"/>
+              <a:t>thickness) :</a:t>
+            </a:r>
+            <a:endParaRPr lang="en-US" altLang="ko-KR" sz="4000" b="1"/>
+          </a:p>
+          <a:p>
+            <a:pPr marL="0" indent="0">
+              <a:buNone/>
+              <a:defRPr/>
+            </a:pPr>
+            <a:r>
+              <a:rPr lang="en-US" altLang="ko-KR" sz="4000" b="1"/>
+              <a:t>0.5mm 0.6mm 0.7mm 0.8mm 0.9mm</a:t>
+            </a:r>
+            <a:endParaRPr lang="en-US" altLang="ko-KR" sz="4000" b="1"/>
           </a:p>
         </p:txBody>
       </p:sp>

</xml_diff>

<commit_message>
0806update with new notebook version
</commit_message>
<xml_diff>
--- a/LabLog.pptx
+++ b/LabLog.pptx
@@ -1,6 +1,6 @@
 
 <file path=ppt/presentation.xml><?xml version="1.0" encoding="utf-8"?>
-<p:presentation xmlns:r="http://schemas.openxmlformats.org/officeDocument/2006/relationships" xmlns:c="http://schemas.openxmlformats.org/drawingml/2006/chart" xmlns:a="http://schemas.openxmlformats.org/drawingml/2006/main" xmlns:dgm="http://schemas.openxmlformats.org/drawingml/2006/diagram" xmlns:dsp="http://schemas.microsoft.com/office/drawing/2008/diagram" xmlns:p="http://schemas.openxmlformats.org/presentationml/2006/main">
+<p:presentation xmlns:a="http://schemas.openxmlformats.org/drawingml/2006/main" xmlns:r="http://schemas.openxmlformats.org/officeDocument/2006/relationships" xmlns:p="http://schemas.openxmlformats.org/presentationml/2006/main">
   <p:sldMasterIdLst>
     <p:sldMasterId id="2147483662" r:id="rId1"/>
   </p:sldMasterIdLst>
@@ -110,7 +110,56 @@
       </a:defRPr>
     </a:lvl9pPr>
   </p:defaultTextStyle>
+  <p:extLst>
+    <p:ext uri="{EFAFB233-063F-42B5-8137-9DF3F51BA10A}">
+      <p15:sldGuideLst xmlns:p15="http://schemas.microsoft.com/office/powerpoint/2012/main"/>
+    </p:ext>
+  </p:extLst>
 </p:presentation>
+</file>
+
+<file path=ppt/changesInfos/changesInfo1.xml><?xml version="1.0" encoding="utf-8"?>
+<pc:chgInfo xmlns:a="http://schemas.openxmlformats.org/drawingml/2006/main" xmlns:r="http://schemas.openxmlformats.org/officeDocument/2006/relationships" xmlns:ac="http://schemas.microsoft.com/office/drawing/2013/main/command" xmlns:pc="http://schemas.microsoft.com/office/powerpoint/2013/main/command">
+  <pc:docChgLst>
+    <pc:chgData name="민서 오" userId="7d89e7b822021c56" providerId="LiveId" clId="{B85301CE-5477-420D-98B8-2A5B4FD7B43E}"/>
+    <pc:docChg chg="modSld">
+      <pc:chgData name="민서 오" userId="7d89e7b822021c56" providerId="LiveId" clId="{B85301CE-5477-420D-98B8-2A5B4FD7B43E}" dt="2024-08-06T03:28:03.549" v="31" actId="1076"/>
+      <pc:docMkLst>
+        <pc:docMk/>
+      </pc:docMkLst>
+      <pc:sldChg chg="modSp mod">
+        <pc:chgData name="민서 오" userId="7d89e7b822021c56" providerId="LiveId" clId="{B85301CE-5477-420D-98B8-2A5B4FD7B43E}" dt="2024-08-06T03:27:53.420" v="30" actId="20577"/>
+        <pc:sldMkLst>
+          <pc:docMk/>
+          <pc:sldMk cId="0" sldId="256"/>
+        </pc:sldMkLst>
+        <pc:spChg chg="mod">
+          <ac:chgData name="민서 오" userId="7d89e7b822021c56" providerId="LiveId" clId="{B85301CE-5477-420D-98B8-2A5B4FD7B43E}" dt="2024-08-06T03:27:53.420" v="30" actId="20577"/>
+          <ac:spMkLst>
+            <pc:docMk/>
+            <pc:sldMk cId="0" sldId="256"/>
+            <ac:spMk id="3" creationId="{00000000-0000-0000-0000-000000000000}"/>
+          </ac:spMkLst>
+        </pc:spChg>
+      </pc:sldChg>
+      <pc:sldChg chg="modSp mod">
+        <pc:chgData name="민서 오" userId="7d89e7b822021c56" providerId="LiveId" clId="{B85301CE-5477-420D-98B8-2A5B4FD7B43E}" dt="2024-08-06T03:28:03.549" v="31" actId="1076"/>
+        <pc:sldMkLst>
+          <pc:docMk/>
+          <pc:sldMk cId="0" sldId="257"/>
+        </pc:sldMkLst>
+        <pc:grpChg chg="mod">
+          <ac:chgData name="민서 오" userId="7d89e7b822021c56" providerId="LiveId" clId="{B85301CE-5477-420D-98B8-2A5B4FD7B43E}" dt="2024-08-06T03:28:03.549" v="31" actId="1076"/>
+          <ac:grpSpMkLst>
+            <pc:docMk/>
+            <pc:sldMk cId="0" sldId="257"/>
+            <ac:grpSpMk id="2" creationId="{00000000-0000-0000-0000-000000000000}"/>
+          </ac:grpSpMkLst>
+        </pc:grpChg>
+      </pc:sldChg>
+    </pc:docChg>
+  </pc:docChgLst>
+</pc:chgInfo>
 </file>
 
 <file path=ppt/slideLayouts/slideLayout1.xml><?xml version="1.0" encoding="utf-8"?>
@@ -260,7 +309,7 @@
           <a:p>
             <a:fld id="{843012E4-EA86-4BA1-A56C-00CD16D7F17B}" type="datetimeFigureOut">
               <a:rPr lang="ko-KR" altLang="en-US" smtClean="0"/>
-              <a:t>2024-07-26</a:t>
+              <a:t>2024-08-06</a:t>
             </a:fld>
             <a:endParaRPr lang="ko-KR" altLang="en-US"/>
           </a:p>
@@ -458,7 +507,7 @@
           <a:p>
             <a:fld id="{843012E4-EA86-4BA1-A56C-00CD16D7F17B}" type="datetimeFigureOut">
               <a:rPr lang="ko-KR" altLang="en-US" smtClean="0"/>
-              <a:t>2024-07-26</a:t>
+              <a:t>2024-08-06</a:t>
             </a:fld>
             <a:endParaRPr lang="ko-KR" altLang="en-US"/>
           </a:p>
@@ -666,7 +715,7 @@
           <a:p>
             <a:fld id="{843012E4-EA86-4BA1-A56C-00CD16D7F17B}" type="datetimeFigureOut">
               <a:rPr lang="ko-KR" altLang="en-US" smtClean="0"/>
-              <a:t>2024-07-26</a:t>
+              <a:t>2024-08-06</a:t>
             </a:fld>
             <a:endParaRPr lang="ko-KR" altLang="en-US"/>
           </a:p>
@@ -864,7 +913,7 @@
           <a:p>
             <a:fld id="{843012E4-EA86-4BA1-A56C-00CD16D7F17B}" type="datetimeFigureOut">
               <a:rPr lang="ko-KR" altLang="en-US" smtClean="0"/>
-              <a:t>2024-07-26</a:t>
+              <a:t>2024-08-06</a:t>
             </a:fld>
             <a:endParaRPr lang="ko-KR" altLang="en-US"/>
           </a:p>
@@ -1139,7 +1188,7 @@
           <a:p>
             <a:fld id="{843012E4-EA86-4BA1-A56C-00CD16D7F17B}" type="datetimeFigureOut">
               <a:rPr lang="ko-KR" altLang="en-US" smtClean="0"/>
-              <a:t>2024-07-26</a:t>
+              <a:t>2024-08-06</a:t>
             </a:fld>
             <a:endParaRPr lang="ko-KR" altLang="en-US"/>
           </a:p>
@@ -1404,7 +1453,7 @@
           <a:p>
             <a:fld id="{843012E4-EA86-4BA1-A56C-00CD16D7F17B}" type="datetimeFigureOut">
               <a:rPr lang="ko-KR" altLang="en-US" smtClean="0"/>
-              <a:t>2024-07-26</a:t>
+              <a:t>2024-08-06</a:t>
             </a:fld>
             <a:endParaRPr lang="ko-KR" altLang="en-US"/>
           </a:p>
@@ -1816,7 +1865,7 @@
           <a:p>
             <a:fld id="{843012E4-EA86-4BA1-A56C-00CD16D7F17B}" type="datetimeFigureOut">
               <a:rPr lang="ko-KR" altLang="en-US" smtClean="0"/>
-              <a:t>2024-07-26</a:t>
+              <a:t>2024-08-06</a:t>
             </a:fld>
             <a:endParaRPr lang="ko-KR" altLang="en-US"/>
           </a:p>
@@ -1957,7 +2006,7 @@
           <a:p>
             <a:fld id="{843012E4-EA86-4BA1-A56C-00CD16D7F17B}" type="datetimeFigureOut">
               <a:rPr lang="ko-KR" altLang="en-US" smtClean="0"/>
-              <a:t>2024-07-26</a:t>
+              <a:t>2024-08-06</a:t>
             </a:fld>
             <a:endParaRPr lang="ko-KR" altLang="en-US"/>
           </a:p>
@@ -2070,7 +2119,7 @@
           <a:p>
             <a:fld id="{843012E4-EA86-4BA1-A56C-00CD16D7F17B}" type="datetimeFigureOut">
               <a:rPr lang="ko-KR" altLang="en-US" smtClean="0"/>
-              <a:t>2024-07-26</a:t>
+              <a:t>2024-08-06</a:t>
             </a:fld>
             <a:endParaRPr lang="ko-KR" altLang="en-US"/>
           </a:p>
@@ -2381,7 +2430,7 @@
           <a:p>
             <a:fld id="{843012E4-EA86-4BA1-A56C-00CD16D7F17B}" type="datetimeFigureOut">
               <a:rPr lang="ko-KR" altLang="en-US" smtClean="0"/>
-              <a:t>2024-07-26</a:t>
+              <a:t>2024-08-06</a:t>
             </a:fld>
             <a:endParaRPr lang="ko-KR" altLang="en-US"/>
           </a:p>
@@ -2669,7 +2718,7 @@
           <a:p>
             <a:fld id="{843012E4-EA86-4BA1-A56C-00CD16D7F17B}" type="datetimeFigureOut">
               <a:rPr lang="ko-KR" altLang="en-US" smtClean="0"/>
-              <a:t>2024-07-26</a:t>
+              <a:t>2024-08-06</a:t>
             </a:fld>
             <a:endParaRPr lang="ko-KR" altLang="en-US"/>
           </a:p>
@@ -2910,7 +2959,7 @@
           <a:p>
             <a:fld id="{843012E4-EA86-4BA1-A56C-00CD16D7F17B}" type="datetimeFigureOut">
               <a:rPr lang="ko-KR" altLang="en-US" smtClean="0"/>
-              <a:t>2024-07-26</a:t>
+              <a:t>2024-08-06</a:t>
             </a:fld>
             <a:endParaRPr lang="ko-KR" altLang="en-US"/>
           </a:p>
@@ -3311,7 +3360,7 @@
 </file>
 
 <file path=ppt/slides/slide1.xml><?xml version="1.0" encoding="utf-8"?>
-<p:sld xmlns:r="http://schemas.openxmlformats.org/officeDocument/2006/relationships" xmlns:c="http://schemas.openxmlformats.org/drawingml/2006/chart" xmlns:a="http://schemas.openxmlformats.org/drawingml/2006/main" xmlns:dgm="http://schemas.openxmlformats.org/drawingml/2006/diagram" xmlns:dsp="http://schemas.microsoft.com/office/drawing/2008/diagram" xmlns:p="http://schemas.openxmlformats.org/presentationml/2006/main">
+<p:sld xmlns:a="http://schemas.openxmlformats.org/drawingml/2006/main" xmlns:r="http://schemas.openxmlformats.org/officeDocument/2006/relationships" xmlns:p="http://schemas.openxmlformats.org/presentationml/2006/main">
   <p:cSld>
     <p:spTree>
       <p:nvGrpSpPr>
@@ -3354,18 +3403,21 @@
               <a:defRPr/>
             </a:pPr>
             <a:r>
-              <a:rPr lang="en-US" altLang="ko-KR" sz="4000" b="1"/>
+              <a:rPr lang="en-US" altLang="ko-KR" sz="4000" b="1" dirty="0"/>
               <a:t>- h (</a:t>
             </a:r>
             <a:r>
-              <a:rPr lang="ko-KR" altLang="en-US" sz="4000" b="1"/>
-              <a:t>핑거 높이</a:t>
-            </a:r>
-            <a:r>
-              <a:rPr lang="en-US" altLang="ko-KR" sz="4000" b="1"/>
+              <a:rPr lang="ko-KR" altLang="en-US" sz="4000" b="1" dirty="0" err="1"/>
+              <a:t>핑거</a:t>
+            </a:r>
+            <a:r>
+              <a:rPr lang="ko-KR" altLang="en-US" sz="4000" b="1" dirty="0"/>
+              <a:t> 높이</a:t>
+            </a:r>
+            <a:r>
+              <a:rPr lang="en-US" altLang="ko-KR" sz="4000" b="1" dirty="0"/>
               <a:t>) :</a:t>
             </a:r>
-            <a:endParaRPr lang="en-US" altLang="ko-KR" sz="4000" b="1"/>
           </a:p>
           <a:p>
             <a:pPr marL="0" indent="0">
@@ -3373,17 +3425,16 @@
               <a:defRPr/>
             </a:pPr>
             <a:r>
-              <a:rPr lang="en-US" altLang="ko-KR" sz="3500" b="1"/>
+              <a:rPr lang="en-US" altLang="ko-KR" sz="3500" b="1" dirty="0"/>
               <a:t>9mm 12mm 15mm 18mm 21mm 24mm 27mm</a:t>
             </a:r>
-            <a:endParaRPr lang="en-US" altLang="ko-KR" sz="3500" b="1"/>
           </a:p>
           <a:p>
             <a:pPr marL="0" indent="0">
               <a:buNone/>
               <a:defRPr/>
             </a:pPr>
-            <a:endParaRPr lang="en-US" altLang="ko-KR" sz="3500" b="1"/>
+            <a:endParaRPr lang="en-US" altLang="ko-KR" sz="3500" b="1" dirty="0"/>
           </a:p>
           <a:p>
             <a:pPr marL="0" indent="0">
@@ -3391,41 +3442,40 @@
               <a:defRPr/>
             </a:pPr>
             <a:r>
-              <a:rPr lang="en-US" altLang="ko-KR" sz="4000" b="1"/>
+              <a:rPr lang="en-US" altLang="ko-KR" sz="4000" b="1" dirty="0"/>
               <a:t>-</a:t>
             </a:r>
             <a:r>
-              <a:rPr lang="ko-KR" altLang="en-US" sz="4000" b="1"/>
+              <a:rPr lang="ko-KR" altLang="en-US" sz="4000" b="1" dirty="0"/>
               <a:t> </a:t>
             </a:r>
             <a:r>
-              <a:rPr lang="en-US" altLang="ko-KR" sz="4000" b="1"/>
+              <a:rPr lang="en-US" altLang="ko-KR" sz="4000" b="1" dirty="0"/>
               <a:t>n</a:t>
             </a:r>
             <a:r>
-              <a:rPr lang="ko-KR" altLang="en-US" sz="4000" b="1"/>
+              <a:rPr lang="ko-KR" altLang="en-US" sz="4000" b="1" dirty="0"/>
               <a:t> </a:t>
             </a:r>
             <a:r>
-              <a:rPr lang="en-US" altLang="ko-KR" sz="4000" b="1"/>
+              <a:rPr lang="en-US" altLang="ko-KR" sz="4000" b="1" dirty="0"/>
               <a:t>(</a:t>
             </a:r>
             <a:r>
-              <a:rPr lang="ko-KR" altLang="en-US" sz="4000" b="1"/>
+              <a:rPr lang="ko-KR" altLang="en-US" sz="4000" b="1" dirty="0"/>
               <a:t>다각형 종류</a:t>
             </a:r>
             <a:r>
-              <a:rPr lang="en-US" altLang="ko-KR" sz="4000" b="1"/>
-              <a:t>) :</a:t>
-            </a:r>
-            <a:endParaRPr lang="en-US" altLang="ko-KR" sz="4000" b="1"/>
+              <a:rPr lang="en-US" altLang="ko-KR" sz="4000" b="1" dirty="0"/>
+              <a:t>) : </a:t>
+            </a:r>
           </a:p>
           <a:p>
             <a:pPr marL="0" indent="0">
               <a:buNone/>
               <a:defRPr/>
             </a:pPr>
-            <a:endParaRPr lang="en-US" altLang="ko-KR" sz="4000" b="1"/>
+            <a:endParaRPr lang="en-US" altLang="ko-KR" sz="4000" b="1" dirty="0"/>
           </a:p>
           <a:p>
             <a:pPr marL="0" indent="0">
@@ -3433,33 +3483,32 @@
               <a:defRPr/>
             </a:pPr>
             <a:r>
-              <a:rPr lang="en-US" altLang="ko-KR" sz="4000" b="1"/>
+              <a:rPr lang="en-US" altLang="ko-KR" sz="4000" b="1" dirty="0"/>
               <a:t>-</a:t>
             </a:r>
             <a:r>
-              <a:rPr lang="ko-KR" altLang="en-US" sz="4000" b="1"/>
+              <a:rPr lang="ko-KR" altLang="en-US" sz="4000" b="1" dirty="0"/>
               <a:t> </a:t>
             </a:r>
             <a:r>
-              <a:rPr lang="en-US" altLang="ko-KR" sz="4000" b="1"/>
+              <a:rPr lang="en-US" altLang="ko-KR" sz="4000" b="1" dirty="0"/>
               <a:t>D (</a:t>
             </a:r>
             <a:r>
-              <a:rPr lang="ko-KR" altLang="en-US" sz="4000" b="1"/>
+              <a:rPr lang="ko-KR" altLang="en-US" sz="4000" b="1" dirty="0"/>
               <a:t>외접원 지름</a:t>
             </a:r>
             <a:r>
-              <a:rPr lang="en-US" altLang="ko-KR" sz="4000" b="1"/>
-              <a:t>) :</a:t>
-            </a:r>
-            <a:endParaRPr lang="en-US" altLang="ko-KR" sz="4000" b="1"/>
+              <a:rPr lang="en-US" altLang="ko-KR" sz="4000" b="1" dirty="0"/>
+              <a:t>) : </a:t>
+            </a:r>
           </a:p>
           <a:p>
             <a:pPr marL="0" indent="0">
               <a:buNone/>
               <a:defRPr/>
             </a:pPr>
-            <a:endParaRPr lang="en-US" altLang="ko-KR" sz="4000" b="1"/>
+            <a:endParaRPr lang="en-US" altLang="ko-KR" sz="4000" b="1" dirty="0"/>
           </a:p>
           <a:p>
             <a:pPr marL="0" indent="0">
@@ -3467,18 +3516,22 @@
               <a:defRPr/>
             </a:pPr>
             <a:r>
-              <a:rPr lang="en-US" altLang="ko-KR" sz="4000" b="1"/>
+              <a:rPr lang="en-US" altLang="ko-KR" sz="4000" b="1" dirty="0"/>
               <a:t>- t (</a:t>
             </a:r>
             <a:r>
-              <a:rPr lang="ko-KR" altLang="en-US" sz="4000" b="1"/>
+              <a:rPr lang="ko-KR" altLang="en-US" sz="4000" b="1" dirty="0"/>
               <a:t>얇은 부분 </a:t>
             </a:r>
             <a:r>
-              <a:rPr lang="en-US" altLang="ko-KR" sz="4000" b="1"/>
-              <a:t>thickness) :</a:t>
-            </a:r>
-            <a:endParaRPr lang="en-US" altLang="ko-KR" sz="4000" b="1"/>
+              <a:rPr lang="en-US" altLang="ko-KR" sz="4000" b="1" dirty="0"/>
+              <a:t>thickness) : 18mm</a:t>
+            </a:r>
+            <a:r>
+              <a:rPr lang="ko-KR" altLang="en-US" sz="4000" b="1" dirty="0"/>
+              <a:t> 대해서</a:t>
+            </a:r>
+            <a:endParaRPr lang="en-US" altLang="ko-KR" sz="4000" b="1" dirty="0"/>
           </a:p>
           <a:p>
             <a:pPr marL="0" indent="0">
@@ -3486,10 +3539,9 @@
               <a:defRPr/>
             </a:pPr>
             <a:r>
-              <a:rPr lang="en-US" altLang="ko-KR" sz="4000" b="1"/>
+              <a:rPr lang="en-US" altLang="ko-KR" sz="4000" b="1" dirty="0"/>
               <a:t>0.5mm 0.6mm 0.7mm 0.8mm 0.9mm</a:t>
             </a:r>
-            <a:endParaRPr lang="en-US" altLang="ko-KR" sz="4000" b="1"/>
           </a:p>
         </p:txBody>
       </p:sp>
@@ -3498,11 +3550,11 @@
   <p:clrMapOvr>
     <a:masterClrMapping/>
   </p:clrMapOvr>
-  <mc:AlternateContent xmlns:mc="http://schemas.openxmlformats.org/markup-compatibility/2006">
-    <mc:Choice xmlns:p14="http://schemas.microsoft.com/office/powerpoint/2010/main" Requires="p14">
-      <p:transition xmlns:mc="http://schemas.openxmlformats.org/markup-compatibility/2006" xmlns:p14="http://schemas.microsoft.com/office/powerpoint/2010/main" mc:Ignorable="p14" p14:dur="500"/>
+  <mc:AlternateContent xmlns:mc="http://schemas.openxmlformats.org/markup-compatibility/2006" xmlns:p14="http://schemas.microsoft.com/office/powerpoint/2010/main">
+    <mc:Choice Requires="p14">
+      <p:transition/>
     </mc:Choice>
-    <mc:Fallback>
+    <mc:Fallback xmlns:dsp="http://schemas.microsoft.com/office/drawing/2008/diagram" xmlns:dgm="http://schemas.openxmlformats.org/drawingml/2006/diagram" xmlns:c="http://schemas.openxmlformats.org/drawingml/2006/chart" xmlns="">
       <p:transition/>
     </mc:Fallback>
   </mc:AlternateContent>
@@ -3510,7 +3562,7 @@
 </file>
 
 <file path=ppt/slides/slide2.xml><?xml version="1.0" encoding="utf-8"?>
-<p:sld xmlns:r="http://schemas.openxmlformats.org/officeDocument/2006/relationships" xmlns:c="http://schemas.openxmlformats.org/drawingml/2006/chart" xmlns:a="http://schemas.openxmlformats.org/drawingml/2006/main" xmlns:dgm="http://schemas.openxmlformats.org/drawingml/2006/diagram" xmlns:dsp="http://schemas.microsoft.com/office/drawing/2008/diagram" xmlns:p="http://schemas.openxmlformats.org/presentationml/2006/main" xmlns:mc="http://schemas.openxmlformats.org/markup-compatibility/2006" xmlns:a14="http://schemas.microsoft.com/office/drawing/2010/main" mc:Ignorable="a14 ">
+<p:sld xmlns:a="http://schemas.openxmlformats.org/drawingml/2006/main" xmlns:r="http://schemas.openxmlformats.org/officeDocument/2006/relationships" xmlns:p="http://schemas.openxmlformats.org/presentationml/2006/main">
   <p:cSld>
     <p:spTree>
       <p:nvGrpSpPr>
@@ -3533,15 +3585,15 @@
           <p:nvPr/>
         </p:nvGrpSpPr>
         <p:grpSpPr>
-          <a:xfrm rot="0">
-            <a:off x="1093541" y="637491"/>
+          <a:xfrm>
+            <a:off x="1173424" y="543764"/>
             <a:ext cx="9845152" cy="5770472"/>
             <a:chOff x="773501" y="500331"/>
             <a:chExt cx="9845152" cy="5770472"/>
           </a:xfrm>
         </p:grpSpPr>
-        <mc:AlternateContent xmlns:mc="http://schemas.openxmlformats.org/markup-compatibility/2006">
-          <mc:Choice xmlns:a14="http://schemas.microsoft.com/office/drawing/2010/main" Requires="a14">
+        <mc:AlternateContent xmlns:mc="http://schemas.openxmlformats.org/markup-compatibility/2006" xmlns:a14="http://schemas.microsoft.com/office/drawing/2010/main">
+          <mc:Choice Requires="a14">
             <p:sp>
               <p:nvSpPr>
                 <p:cNvPr id="4" name="TextBox 3"/>
@@ -3562,41 +3614,150 @@
                 <a:bodyPr/>
                 <a:lstStyle/>
                 <a:p>
-                  <a14:m xmlns:m="http://schemas.openxmlformats.org/officeDocument/2006/math" xmlns:mc="http://schemas.openxmlformats.org/markup-compatibility/2006" xmlns:ho="http://schemas.haansoft.com/office/8.0" mc:Ignorable="ho" ho:hncCreate="1">
-                    <m:oMathPara>
+                  <a:pPr/>
+                  <a14:m>
+                    <m:oMathPara xmlns:m="http://schemas.openxmlformats.org/officeDocument/2006/math">
+                      <m:oMathParaPr>
+                        <m:jc m:val="centerGroup"/>
+                      </m:oMathParaPr>
                       <m:oMath xmlns:m="http://schemas.openxmlformats.org/officeDocument/2006/math">
                         <m:r>
                           <a:rPr lang="en-US" altLang="ko-KR" sz="1800" kern="100" dirty="0">
                             <a:solidFill>
-                              <a:srgbClr val="00b0f0"/>
+                              <a:srgbClr val="00B0F0"/>
                             </a:solidFill>
                             <a:effectLst/>
-                            <a:latin typeface="Arial Unicode MS" panose="020B0604020202020204" pitchFamily="50" charset="-127"/>
+                            <a:latin typeface="Cambria Math" panose="02040503050406030204" pitchFamily="18" charset="0"/>
                             <a:ea typeface="Arial Unicode MS" panose="020B0604020202020204" pitchFamily="50" charset="-127"/>
                             <a:cs typeface="Arial Unicode MS" panose="020B0604020202020204" pitchFamily="50" charset="-127"/>
                           </a:rPr>
-                          <m:t>Print Setting for TPE</m:t>
+                          <m:t>𝑃𝑟𝑖𝑛𝑡</m:t>
+                        </m:r>
+                        <m:r>
+                          <a:rPr lang="en-US" altLang="ko-KR" sz="1800" kern="100" dirty="0">
+                            <a:solidFill>
+                              <a:srgbClr val="00B0F0"/>
+                            </a:solidFill>
+                            <a:effectLst/>
+                            <a:latin typeface="Cambria Math" panose="02040503050406030204" pitchFamily="18" charset="0"/>
+                            <a:ea typeface="Arial Unicode MS" panose="020B0604020202020204" pitchFamily="50" charset="-127"/>
+                            <a:cs typeface="Arial Unicode MS" panose="020B0604020202020204" pitchFamily="50" charset="-127"/>
+                          </a:rPr>
+                          <m:t> </m:t>
+                        </m:r>
+                        <m:r>
+                          <a:rPr lang="en-US" altLang="ko-KR" sz="1800" kern="100" dirty="0">
+                            <a:solidFill>
+                              <a:srgbClr val="00B0F0"/>
+                            </a:solidFill>
+                            <a:effectLst/>
+                            <a:latin typeface="Cambria Math" panose="02040503050406030204" pitchFamily="18" charset="0"/>
+                            <a:ea typeface="Arial Unicode MS" panose="020B0604020202020204" pitchFamily="50" charset="-127"/>
+                            <a:cs typeface="Arial Unicode MS" panose="020B0604020202020204" pitchFamily="50" charset="-127"/>
+                          </a:rPr>
+                          <m:t>𝑆𝑒𝑡𝑡𝑖𝑛𝑔</m:t>
+                        </m:r>
+                        <m:r>
+                          <a:rPr lang="en-US" altLang="ko-KR" sz="1800" kern="100" dirty="0">
+                            <a:solidFill>
+                              <a:srgbClr val="00B0F0"/>
+                            </a:solidFill>
+                            <a:effectLst/>
+                            <a:latin typeface="Cambria Math" panose="02040503050406030204" pitchFamily="18" charset="0"/>
+                            <a:ea typeface="Arial Unicode MS" panose="020B0604020202020204" pitchFamily="50" charset="-127"/>
+                            <a:cs typeface="Arial Unicode MS" panose="020B0604020202020204" pitchFamily="50" charset="-127"/>
+                          </a:rPr>
+                          <m:t> </m:t>
+                        </m:r>
+                        <m:r>
+                          <a:rPr lang="en-US" altLang="ko-KR" sz="1800" kern="100" dirty="0">
+                            <a:solidFill>
+                              <a:srgbClr val="00B0F0"/>
+                            </a:solidFill>
+                            <a:effectLst/>
+                            <a:latin typeface="Cambria Math" panose="02040503050406030204" pitchFamily="18" charset="0"/>
+                            <a:ea typeface="Arial Unicode MS" panose="020B0604020202020204" pitchFamily="50" charset="-127"/>
+                            <a:cs typeface="Arial Unicode MS" panose="020B0604020202020204" pitchFamily="50" charset="-127"/>
+                          </a:rPr>
+                          <m:t>𝑓𝑜𝑟</m:t>
+                        </m:r>
+                        <m:r>
+                          <a:rPr lang="en-US" altLang="ko-KR" sz="1800" kern="100" dirty="0">
+                            <a:solidFill>
+                              <a:srgbClr val="00B0F0"/>
+                            </a:solidFill>
+                            <a:effectLst/>
+                            <a:latin typeface="Cambria Math" panose="02040503050406030204" pitchFamily="18" charset="0"/>
+                            <a:ea typeface="Arial Unicode MS" panose="020B0604020202020204" pitchFamily="50" charset="-127"/>
+                            <a:cs typeface="Arial Unicode MS" panose="020B0604020202020204" pitchFamily="50" charset="-127"/>
+                          </a:rPr>
+                          <m:t> </m:t>
+                        </m:r>
+                        <m:r>
+                          <a:rPr lang="en-US" altLang="ko-KR" sz="1800" kern="100" dirty="0">
+                            <a:solidFill>
+                              <a:srgbClr val="00B0F0"/>
+                            </a:solidFill>
+                            <a:effectLst/>
+                            <a:latin typeface="Cambria Math" panose="02040503050406030204" pitchFamily="18" charset="0"/>
+                            <a:ea typeface="Arial Unicode MS" panose="020B0604020202020204" pitchFamily="50" charset="-127"/>
+                            <a:cs typeface="Arial Unicode MS" panose="020B0604020202020204" pitchFamily="50" charset="-127"/>
+                          </a:rPr>
+                          <m:t>𝑇𝑃𝐸</m:t>
                         </m:r>
                       </m:oMath>
                     </m:oMathPara>
                   </a14:m>
+                  <a:endParaRPr dirty="0"/>
                 </a:p>
                 <a:p>
-                  <a14:m xmlns:m="http://schemas.openxmlformats.org/officeDocument/2006/math" xmlns:mc="http://schemas.openxmlformats.org/markup-compatibility/2006" xmlns:ho="http://schemas.haansoft.com/office/8.0" mc:Ignorable="ho" ho:hncCreate="1">
-                    <m:oMathPara>
+                  <a:pPr/>
+                  <a14:m>
+                    <m:oMathPara xmlns:m="http://schemas.openxmlformats.org/officeDocument/2006/math">
+                      <m:oMathParaPr>
+                        <m:jc m:val="centerGroup"/>
+                      </m:oMathParaPr>
                       <m:oMath xmlns:m="http://schemas.openxmlformats.org/officeDocument/2006/math">
                         <m:r>
                           <a:rPr lang="en-US" altLang="ko-KR" sz="1800" kern="100" dirty="0">
                             <a:effectLst/>
-                            <a:latin typeface="Arial Unicode MS" panose="020B0604020202020204" pitchFamily="50" charset="-127"/>
+                            <a:latin typeface="Cambria Math" panose="02040503050406030204" pitchFamily="18" charset="0"/>
                             <a:ea typeface="Arial Unicode MS" panose="020B0604020202020204" pitchFamily="50" charset="-127"/>
                             <a:cs typeface="Arial Unicode MS" panose="020B0604020202020204" pitchFamily="50" charset="-127"/>
                           </a:rPr>
-                          <m:t xml:space="preserve">Bed Temperature : </m:t>
+                          <m:t>𝐵𝑒𝑑</m:t>
+                        </m:r>
+                        <m:r>
+                          <a:rPr lang="en-US" altLang="ko-KR" sz="1800" kern="100" dirty="0">
+                            <a:effectLst/>
+                            <a:latin typeface="Cambria Math" panose="02040503050406030204" pitchFamily="18" charset="0"/>
+                            <a:ea typeface="Arial Unicode MS" panose="020B0604020202020204" pitchFamily="50" charset="-127"/>
+                            <a:cs typeface="Arial Unicode MS" panose="020B0604020202020204" pitchFamily="50" charset="-127"/>
+                          </a:rPr>
+                          <m:t> </m:t>
+                        </m:r>
+                        <m:r>
+                          <a:rPr lang="en-US" altLang="ko-KR" sz="1800" kern="100" dirty="0">
+                            <a:effectLst/>
+                            <a:latin typeface="Cambria Math" panose="02040503050406030204" pitchFamily="18" charset="0"/>
+                            <a:ea typeface="Arial Unicode MS" panose="020B0604020202020204" pitchFamily="50" charset="-127"/>
+                            <a:cs typeface="Arial Unicode MS" panose="020B0604020202020204" pitchFamily="50" charset="-127"/>
+                          </a:rPr>
+                          <m:t>𝑇𝑒𝑚𝑝𝑒𝑟𝑎𝑡𝑢𝑟𝑒</m:t>
+                        </m:r>
+                        <m:r>
+                          <a:rPr lang="en-US" altLang="ko-KR" sz="1800" kern="100" dirty="0">
+                            <a:effectLst/>
+                            <a:latin typeface="Cambria Math" panose="02040503050406030204" pitchFamily="18" charset="0"/>
+                            <a:ea typeface="Arial Unicode MS" panose="020B0604020202020204" pitchFamily="50" charset="-127"/>
+                            <a:cs typeface="Arial Unicode MS" panose="020B0604020202020204" pitchFamily="50" charset="-127"/>
+                          </a:rPr>
+                          <m:t> : </m:t>
                         </m:r>
                       </m:oMath>
                     </m:oMathPara>
                   </a14:m>
+                  <a:endParaRPr dirty="0"/>
                 </a:p>
                 <a:p>
                   <a:pPr latinLnBrk="1">
@@ -3604,8 +3765,11 @@
                       <a:spcPts val="800"/>
                     </a:spcAft>
                   </a:pPr>
-                  <a14:m xmlns:m="http://schemas.openxmlformats.org/officeDocument/2006/math" xmlns:mc="http://schemas.openxmlformats.org/markup-compatibility/2006" xmlns:ho="http://schemas.haansoft.com/office/8.0" mc:Ignorable="ho" ho:hncCreate="1">
-                    <m:oMathPara>
+                  <a14:m>
+                    <m:oMathPara xmlns:m="http://schemas.openxmlformats.org/officeDocument/2006/math">
+                      <m:oMathParaPr>
+                        <m:jc m:val="centerGroup"/>
+                      </m:oMathParaPr>
                       <m:oMath xmlns:m="http://schemas.openxmlformats.org/officeDocument/2006/math">
                         <m:r>
                           <a:rPr lang="en-US" altLang="ko-KR" sz="1800" i="1" kern="100">
@@ -3626,23 +3790,56 @@
                       </m:oMath>
                     </m:oMathPara>
                   </a14:m>
+                  <a:endParaRPr dirty="0"/>
                 </a:p>
                 <a:p>
-                  <a14:m xmlns:m="http://schemas.openxmlformats.org/officeDocument/2006/math" xmlns:mc="http://schemas.openxmlformats.org/markup-compatibility/2006" xmlns:ho="http://schemas.haansoft.com/office/8.0" mc:Ignorable="ho" ho:hncCreate="1">
-                    <m:oMathPara>
+                  <a:pPr/>
+                  <a14:m>
+                    <m:oMathPara xmlns:m="http://schemas.openxmlformats.org/officeDocument/2006/math">
+                      <m:oMathParaPr>
+                        <m:jc m:val="centerGroup"/>
+                      </m:oMathParaPr>
                       <m:oMath xmlns:m="http://schemas.openxmlformats.org/officeDocument/2006/math">
                         <m:r>
                           <a:rPr lang="en-US" altLang="ko-KR" sz="1800" kern="100" dirty="0">
                             <a:effectLst/>
-                            <a:latin typeface="Arial Unicode MS" panose="020B0604020202020204" pitchFamily="50" charset="-127"/>
+                            <a:latin typeface="Cambria Math" panose="02040503050406030204" pitchFamily="18" charset="0"/>
                             <a:ea typeface="Arial Unicode MS" panose="020B0604020202020204" pitchFamily="50" charset="-127"/>
                             <a:cs typeface="Arial Unicode MS" panose="020B0604020202020204" pitchFamily="50" charset="-127"/>
                           </a:rPr>
-                          <m:t xml:space="preserve">Nozzle Temperature : </m:t>
+                          <m:t>𝑁𝑜𝑧𝑧𝑙𝑒</m:t>
+                        </m:r>
+                        <m:r>
+                          <a:rPr lang="en-US" altLang="ko-KR" sz="1800" kern="100" dirty="0">
+                            <a:effectLst/>
+                            <a:latin typeface="Cambria Math" panose="02040503050406030204" pitchFamily="18" charset="0"/>
+                            <a:ea typeface="Arial Unicode MS" panose="020B0604020202020204" pitchFamily="50" charset="-127"/>
+                            <a:cs typeface="Arial Unicode MS" panose="020B0604020202020204" pitchFamily="50" charset="-127"/>
+                          </a:rPr>
+                          <m:t> </m:t>
+                        </m:r>
+                        <m:r>
+                          <a:rPr lang="en-US" altLang="ko-KR" sz="1800" kern="100" dirty="0">
+                            <a:effectLst/>
+                            <a:latin typeface="Cambria Math" panose="02040503050406030204" pitchFamily="18" charset="0"/>
+                            <a:ea typeface="Arial Unicode MS" panose="020B0604020202020204" pitchFamily="50" charset="-127"/>
+                            <a:cs typeface="Arial Unicode MS" panose="020B0604020202020204" pitchFamily="50" charset="-127"/>
+                          </a:rPr>
+                          <m:t>𝑇𝑒𝑚𝑝𝑒𝑟𝑎𝑡𝑢𝑟𝑒</m:t>
+                        </m:r>
+                        <m:r>
+                          <a:rPr lang="en-US" altLang="ko-KR" sz="1800" kern="100" dirty="0">
+                            <a:effectLst/>
+                            <a:latin typeface="Cambria Math" panose="02040503050406030204" pitchFamily="18" charset="0"/>
+                            <a:ea typeface="Arial Unicode MS" panose="020B0604020202020204" pitchFamily="50" charset="-127"/>
+                            <a:cs typeface="Arial Unicode MS" panose="020B0604020202020204" pitchFamily="50" charset="-127"/>
+                          </a:rPr>
+                          <m:t> : </m:t>
                         </m:r>
                       </m:oMath>
                     </m:oMathPara>
                   </a14:m>
+                  <a:endParaRPr dirty="0"/>
                 </a:p>
                 <a:p>
                   <a:pPr latinLnBrk="1">
@@ -3650,8 +3847,11 @@
                       <a:spcPts val="800"/>
                     </a:spcAft>
                   </a:pPr>
-                  <a14:m xmlns:m="http://schemas.openxmlformats.org/officeDocument/2006/math" xmlns:mc="http://schemas.openxmlformats.org/markup-compatibility/2006" xmlns:ho="http://schemas.haansoft.com/office/8.0" mc:Ignorable="ho" ho:hncCreate="1">
-                    <m:oMathPara>
+                  <a14:m>
+                    <m:oMathPara xmlns:m="http://schemas.openxmlformats.org/officeDocument/2006/math">
+                      <m:oMathParaPr>
+                        <m:jc m:val="centerGroup"/>
+                      </m:oMathParaPr>
                       <m:oMath xmlns:m="http://schemas.openxmlformats.org/officeDocument/2006/math">
                         <m:r>
                           <a:rPr lang="en-US" altLang="ko-KR" sz="1800" i="1" kern="100">
@@ -3672,23 +3872,56 @@
                       </m:oMath>
                     </m:oMathPara>
                   </a14:m>
+                  <a:endParaRPr dirty="0"/>
                 </a:p>
                 <a:p>
-                  <a14:m xmlns:m="http://schemas.openxmlformats.org/officeDocument/2006/math" xmlns:mc="http://schemas.openxmlformats.org/markup-compatibility/2006" xmlns:ho="http://schemas.haansoft.com/office/8.0" mc:Ignorable="ho" ho:hncCreate="1">
-                    <m:oMathPara>
+                  <a:pPr/>
+                  <a14:m>
+                    <m:oMathPara xmlns:m="http://schemas.openxmlformats.org/officeDocument/2006/math">
+                      <m:oMathParaPr>
+                        <m:jc m:val="centerGroup"/>
+                      </m:oMathParaPr>
                       <m:oMath xmlns:m="http://schemas.openxmlformats.org/officeDocument/2006/math">
                         <m:r>
                           <a:rPr lang="en-US" altLang="ko-KR" sz="1800" kern="100" dirty="0">
                             <a:effectLst/>
-                            <a:latin typeface="Arial Unicode MS" panose="020B0604020202020204" pitchFamily="50" charset="-127"/>
+                            <a:latin typeface="Cambria Math" panose="02040503050406030204" pitchFamily="18" charset="0"/>
                             <a:ea typeface="Arial Unicode MS" panose="020B0604020202020204" pitchFamily="50" charset="-127"/>
                             <a:cs typeface="Arial Unicode MS" panose="020B0604020202020204" pitchFamily="50" charset="-127"/>
                           </a:rPr>
-                          <m:t xml:space="preserve">Print Speed : </m:t>
+                          <m:t>𝑃𝑟𝑖𝑛𝑡</m:t>
+                        </m:r>
+                        <m:r>
+                          <a:rPr lang="en-US" altLang="ko-KR" sz="1800" kern="100" dirty="0">
+                            <a:effectLst/>
+                            <a:latin typeface="Cambria Math" panose="02040503050406030204" pitchFamily="18" charset="0"/>
+                            <a:ea typeface="Arial Unicode MS" panose="020B0604020202020204" pitchFamily="50" charset="-127"/>
+                            <a:cs typeface="Arial Unicode MS" panose="020B0604020202020204" pitchFamily="50" charset="-127"/>
+                          </a:rPr>
+                          <m:t> </m:t>
+                        </m:r>
+                        <m:r>
+                          <a:rPr lang="en-US" altLang="ko-KR" sz="1800" kern="100" dirty="0">
+                            <a:effectLst/>
+                            <a:latin typeface="Cambria Math" panose="02040503050406030204" pitchFamily="18" charset="0"/>
+                            <a:ea typeface="Arial Unicode MS" panose="020B0604020202020204" pitchFamily="50" charset="-127"/>
+                            <a:cs typeface="Arial Unicode MS" panose="020B0604020202020204" pitchFamily="50" charset="-127"/>
+                          </a:rPr>
+                          <m:t>𝑆𝑝𝑒𝑒𝑑</m:t>
+                        </m:r>
+                        <m:r>
+                          <a:rPr lang="en-US" altLang="ko-KR" sz="1800" kern="100" dirty="0">
+                            <a:effectLst/>
+                            <a:latin typeface="Cambria Math" panose="02040503050406030204" pitchFamily="18" charset="0"/>
+                            <a:ea typeface="Arial Unicode MS" panose="020B0604020202020204" pitchFamily="50" charset="-127"/>
+                            <a:cs typeface="Arial Unicode MS" panose="020B0604020202020204" pitchFamily="50" charset="-127"/>
+                          </a:rPr>
+                          <m:t> : </m:t>
                         </m:r>
                       </m:oMath>
                     </m:oMathPara>
                   </a14:m>
+                  <a:endParaRPr dirty="0"/>
                 </a:p>
                 <a:p>
                   <a:pPr latinLnBrk="1">
@@ -3696,8 +3929,11 @@
                       <a:spcPts val="800"/>
                     </a:spcAft>
                   </a:pPr>
-                  <a14:m xmlns:m="http://schemas.openxmlformats.org/officeDocument/2006/math" xmlns:mc="http://schemas.openxmlformats.org/markup-compatibility/2006" xmlns:ho="http://schemas.haansoft.com/office/8.0" mc:Ignorable="ho" ho:hncCreate="1">
-                    <m:oMathPara>
+                  <a14:m>
+                    <m:oMathPara xmlns:m="http://schemas.openxmlformats.org/officeDocument/2006/math">
+                      <m:oMathParaPr>
+                        <m:jc m:val="centerGroup"/>
+                      </m:oMathParaPr>
                       <m:oMath xmlns:m="http://schemas.openxmlformats.org/officeDocument/2006/math">
                         <m:r>
                           <a:rPr lang="en-US" altLang="ko-KR" sz="1800" i="1" kern="100">
@@ -3734,23 +3970,56 @@
                       </m:oMath>
                     </m:oMathPara>
                   </a14:m>
+                  <a:endParaRPr dirty="0"/>
                 </a:p>
                 <a:p>
-                  <a14:m xmlns:m="http://schemas.openxmlformats.org/officeDocument/2006/math" xmlns:mc="http://schemas.openxmlformats.org/markup-compatibility/2006" xmlns:ho="http://schemas.haansoft.com/office/8.0" mc:Ignorable="ho" ho:hncCreate="1">
-                    <m:oMathPara>
+                  <a:pPr/>
+                  <a14:m>
+                    <m:oMathPara xmlns:m="http://schemas.openxmlformats.org/officeDocument/2006/math">
+                      <m:oMathParaPr>
+                        <m:jc m:val="centerGroup"/>
+                      </m:oMathParaPr>
                       <m:oMath xmlns:m="http://schemas.openxmlformats.org/officeDocument/2006/math">
                         <m:r>
                           <a:rPr lang="en-US" altLang="ko-KR" sz="1800" kern="100" dirty="0">
                             <a:effectLst/>
-                            <a:latin typeface="Arial Unicode MS" panose="020B0604020202020204" pitchFamily="50" charset="-127"/>
+                            <a:latin typeface="Cambria Math" panose="02040503050406030204" pitchFamily="18" charset="0"/>
                             <a:ea typeface="Arial Unicode MS" panose="020B0604020202020204" pitchFamily="50" charset="-127"/>
                             <a:cs typeface="Arial Unicode MS" panose="020B0604020202020204" pitchFamily="50" charset="-127"/>
                           </a:rPr>
-                          <m:t xml:space="preserve">Layer Height : </m:t>
+                          <m:t>𝐿𝑎𝑦𝑒𝑟</m:t>
+                        </m:r>
+                        <m:r>
+                          <a:rPr lang="en-US" altLang="ko-KR" sz="1800" kern="100" dirty="0">
+                            <a:effectLst/>
+                            <a:latin typeface="Cambria Math" panose="02040503050406030204" pitchFamily="18" charset="0"/>
+                            <a:ea typeface="Arial Unicode MS" panose="020B0604020202020204" pitchFamily="50" charset="-127"/>
+                            <a:cs typeface="Arial Unicode MS" panose="020B0604020202020204" pitchFamily="50" charset="-127"/>
+                          </a:rPr>
+                          <m:t> </m:t>
+                        </m:r>
+                        <m:r>
+                          <a:rPr lang="en-US" altLang="ko-KR" sz="1800" kern="100" dirty="0">
+                            <a:effectLst/>
+                            <a:latin typeface="Cambria Math" panose="02040503050406030204" pitchFamily="18" charset="0"/>
+                            <a:ea typeface="Arial Unicode MS" panose="020B0604020202020204" pitchFamily="50" charset="-127"/>
+                            <a:cs typeface="Arial Unicode MS" panose="020B0604020202020204" pitchFamily="50" charset="-127"/>
+                          </a:rPr>
+                          <m:t>𝐻𝑒𝑖𝑔h𝑡</m:t>
+                        </m:r>
+                        <m:r>
+                          <a:rPr lang="en-US" altLang="ko-KR" sz="1800" kern="100" dirty="0">
+                            <a:effectLst/>
+                            <a:latin typeface="Cambria Math" panose="02040503050406030204" pitchFamily="18" charset="0"/>
+                            <a:ea typeface="Arial Unicode MS" panose="020B0604020202020204" pitchFamily="50" charset="-127"/>
+                            <a:cs typeface="Arial Unicode MS" panose="020B0604020202020204" pitchFamily="50" charset="-127"/>
+                          </a:rPr>
+                          <m:t> : </m:t>
                         </m:r>
                       </m:oMath>
                     </m:oMathPara>
                   </a14:m>
+                  <a:endParaRPr dirty="0"/>
                 </a:p>
                 <a:p>
                   <a:pPr latinLnBrk="1">
@@ -3758,8 +4027,11 @@
                       <a:spcPts val="800"/>
                     </a:spcAft>
                   </a:pPr>
-                  <a14:m xmlns:m="http://schemas.openxmlformats.org/officeDocument/2006/math" xmlns:mc="http://schemas.openxmlformats.org/markup-compatibility/2006" xmlns:ho="http://schemas.haansoft.com/office/8.0" mc:Ignorable="ho" ho:hncCreate="1">
-                    <m:oMathPara>
+                  <a14:m>
+                    <m:oMathPara xmlns:m="http://schemas.openxmlformats.org/officeDocument/2006/math">
+                      <m:oMathParaPr>
+                        <m:jc m:val="centerGroup"/>
+                      </m:oMathParaPr>
                       <m:oMath xmlns:m="http://schemas.openxmlformats.org/officeDocument/2006/math">
                         <m:r>
                           <a:rPr lang="en-US" altLang="ko-KR" sz="1800" i="1" kern="100">
@@ -3780,23 +4052,74 @@
                       </m:oMath>
                     </m:oMathPara>
                   </a14:m>
+                  <a:endParaRPr dirty="0"/>
                 </a:p>
                 <a:p>
-                  <a14:m xmlns:m="http://schemas.openxmlformats.org/officeDocument/2006/math" xmlns:mc="http://schemas.openxmlformats.org/markup-compatibility/2006" xmlns:ho="http://schemas.haansoft.com/office/8.0" mc:Ignorable="ho" ho:hncCreate="1">
-                    <m:oMathPara>
+                  <a:pPr/>
+                  <a14:m>
+                    <m:oMathPara xmlns:m="http://schemas.openxmlformats.org/officeDocument/2006/math">
+                      <m:oMathParaPr>
+                        <m:jc m:val="centerGroup"/>
+                      </m:oMathParaPr>
                       <m:oMath xmlns:m="http://schemas.openxmlformats.org/officeDocument/2006/math">
                         <m:r>
                           <a:rPr lang="en-US" altLang="ko-KR" sz="1800" kern="100" dirty="0">
                             <a:effectLst/>
-                            <a:latin typeface="Arial Unicode MS" panose="020B0604020202020204" pitchFamily="50" charset="-127"/>
+                            <a:latin typeface="Cambria Math" panose="02040503050406030204" pitchFamily="18" charset="0"/>
                             <a:ea typeface="Arial Unicode MS" panose="020B0604020202020204" pitchFamily="50" charset="-127"/>
                             <a:cs typeface="Arial Unicode MS" panose="020B0604020202020204" pitchFamily="50" charset="-127"/>
                           </a:rPr>
-                          <m:t xml:space="preserve">Initial Layer Height : </m:t>
+                          <m:t>𝐼𝑛𝑖𝑡𝑖𝑎𝑙</m:t>
+                        </m:r>
+                        <m:r>
+                          <a:rPr lang="en-US" altLang="ko-KR" sz="1800" kern="100" dirty="0">
+                            <a:effectLst/>
+                            <a:latin typeface="Cambria Math" panose="02040503050406030204" pitchFamily="18" charset="0"/>
+                            <a:ea typeface="Arial Unicode MS" panose="020B0604020202020204" pitchFamily="50" charset="-127"/>
+                            <a:cs typeface="Arial Unicode MS" panose="020B0604020202020204" pitchFamily="50" charset="-127"/>
+                          </a:rPr>
+                          <m:t> </m:t>
+                        </m:r>
+                        <m:r>
+                          <a:rPr lang="en-US" altLang="ko-KR" sz="1800" kern="100" dirty="0">
+                            <a:effectLst/>
+                            <a:latin typeface="Cambria Math" panose="02040503050406030204" pitchFamily="18" charset="0"/>
+                            <a:ea typeface="Arial Unicode MS" panose="020B0604020202020204" pitchFamily="50" charset="-127"/>
+                            <a:cs typeface="Arial Unicode MS" panose="020B0604020202020204" pitchFamily="50" charset="-127"/>
+                          </a:rPr>
+                          <m:t>𝐿𝑎𝑦𝑒𝑟</m:t>
+                        </m:r>
+                        <m:r>
+                          <a:rPr lang="en-US" altLang="ko-KR" sz="1800" kern="100" dirty="0">
+                            <a:effectLst/>
+                            <a:latin typeface="Cambria Math" panose="02040503050406030204" pitchFamily="18" charset="0"/>
+                            <a:ea typeface="Arial Unicode MS" panose="020B0604020202020204" pitchFamily="50" charset="-127"/>
+                            <a:cs typeface="Arial Unicode MS" panose="020B0604020202020204" pitchFamily="50" charset="-127"/>
+                          </a:rPr>
+                          <m:t> </m:t>
+                        </m:r>
+                        <m:r>
+                          <a:rPr lang="en-US" altLang="ko-KR" sz="1800" kern="100" dirty="0">
+                            <a:effectLst/>
+                            <a:latin typeface="Cambria Math" panose="02040503050406030204" pitchFamily="18" charset="0"/>
+                            <a:ea typeface="Arial Unicode MS" panose="020B0604020202020204" pitchFamily="50" charset="-127"/>
+                            <a:cs typeface="Arial Unicode MS" panose="020B0604020202020204" pitchFamily="50" charset="-127"/>
+                          </a:rPr>
+                          <m:t>𝐻𝑒𝑖𝑔h𝑡</m:t>
+                        </m:r>
+                        <m:r>
+                          <a:rPr lang="en-US" altLang="ko-KR" sz="1800" kern="100" dirty="0">
+                            <a:effectLst/>
+                            <a:latin typeface="Cambria Math" panose="02040503050406030204" pitchFamily="18" charset="0"/>
+                            <a:ea typeface="Arial Unicode MS" panose="020B0604020202020204" pitchFamily="50" charset="-127"/>
+                            <a:cs typeface="Arial Unicode MS" panose="020B0604020202020204" pitchFamily="50" charset="-127"/>
+                          </a:rPr>
+                          <m:t> : </m:t>
                         </m:r>
                       </m:oMath>
                     </m:oMathPara>
                   </a14:m>
+                  <a:endParaRPr dirty="0"/>
                 </a:p>
                 <a:p>
                   <a:pPr latinLnBrk="1">
@@ -3804,8 +4127,11 @@
                       <a:spcPts val="800"/>
                     </a:spcAft>
                   </a:pPr>
-                  <a14:m xmlns:m="http://schemas.openxmlformats.org/officeDocument/2006/math" xmlns:mc="http://schemas.openxmlformats.org/markup-compatibility/2006" xmlns:ho="http://schemas.haansoft.com/office/8.0" mc:Ignorable="ho" ho:hncCreate="1">
-                    <m:oMathPara>
+                  <a14:m>
+                    <m:oMathPara xmlns:m="http://schemas.openxmlformats.org/officeDocument/2006/math">
+                      <m:oMathParaPr>
+                        <m:jc m:val="centerGroup"/>
+                      </m:oMathParaPr>
                       <m:oMath xmlns:m="http://schemas.openxmlformats.org/officeDocument/2006/math">
                         <m:r>
                           <a:rPr lang="en-US" altLang="ko-KR" sz="1800" i="1" kern="100">
@@ -3826,23 +4152,56 @@
                       </m:oMath>
                     </m:oMathPara>
                   </a14:m>
+                  <a:endParaRPr dirty="0"/>
                 </a:p>
                 <a:p>
-                  <a14:m xmlns:m="http://schemas.openxmlformats.org/officeDocument/2006/math" xmlns:mc="http://schemas.openxmlformats.org/markup-compatibility/2006" xmlns:ho="http://schemas.haansoft.com/office/8.0" mc:Ignorable="ho" ho:hncCreate="1">
-                    <m:oMathPara>
+                  <a:pPr/>
+                  <a14:m>
+                    <m:oMathPara xmlns:m="http://schemas.openxmlformats.org/officeDocument/2006/math">
+                      <m:oMathParaPr>
+                        <m:jc m:val="centerGroup"/>
+                      </m:oMathParaPr>
                       <m:oMath xmlns:m="http://schemas.openxmlformats.org/officeDocument/2006/math">
                         <m:r>
                           <a:rPr lang="en-US" altLang="ko-KR" sz="1800" kern="100" dirty="0">
                             <a:effectLst/>
-                            <a:latin typeface="Arial Unicode MS" panose="020B0604020202020204" pitchFamily="50" charset="-127"/>
+                            <a:latin typeface="Cambria Math" panose="02040503050406030204" pitchFamily="18" charset="0"/>
                             <a:ea typeface="Arial Unicode MS" panose="020B0604020202020204" pitchFamily="50" charset="-127"/>
                             <a:cs typeface="Arial Unicode MS" panose="020B0604020202020204" pitchFamily="50" charset="-127"/>
                           </a:rPr>
-                          <m:t xml:space="preserve">Infill Density : </m:t>
+                          <m:t>𝐼𝑛𝑓𝑖𝑙𝑙</m:t>
+                        </m:r>
+                        <m:r>
+                          <a:rPr lang="en-US" altLang="ko-KR" sz="1800" kern="100" dirty="0">
+                            <a:effectLst/>
+                            <a:latin typeface="Cambria Math" panose="02040503050406030204" pitchFamily="18" charset="0"/>
+                            <a:ea typeface="Arial Unicode MS" panose="020B0604020202020204" pitchFamily="50" charset="-127"/>
+                            <a:cs typeface="Arial Unicode MS" panose="020B0604020202020204" pitchFamily="50" charset="-127"/>
+                          </a:rPr>
+                          <m:t> </m:t>
+                        </m:r>
+                        <m:r>
+                          <a:rPr lang="en-US" altLang="ko-KR" sz="1800" kern="100" dirty="0">
+                            <a:effectLst/>
+                            <a:latin typeface="Cambria Math" panose="02040503050406030204" pitchFamily="18" charset="0"/>
+                            <a:ea typeface="Arial Unicode MS" panose="020B0604020202020204" pitchFamily="50" charset="-127"/>
+                            <a:cs typeface="Arial Unicode MS" panose="020B0604020202020204" pitchFamily="50" charset="-127"/>
+                          </a:rPr>
+                          <m:t>𝐷𝑒𝑛𝑠𝑖𝑡𝑦</m:t>
+                        </m:r>
+                        <m:r>
+                          <a:rPr lang="en-US" altLang="ko-KR" sz="1800" kern="100" dirty="0">
+                            <a:effectLst/>
+                            <a:latin typeface="Cambria Math" panose="02040503050406030204" pitchFamily="18" charset="0"/>
+                            <a:ea typeface="Arial Unicode MS" panose="020B0604020202020204" pitchFamily="50" charset="-127"/>
+                            <a:cs typeface="Arial Unicode MS" panose="020B0604020202020204" pitchFamily="50" charset="-127"/>
+                          </a:rPr>
+                          <m:t> : </m:t>
                         </m:r>
                       </m:oMath>
                     </m:oMathPara>
                   </a14:m>
+                  <a:endParaRPr dirty="0"/>
                 </a:p>
                 <a:p>
                   <a:pPr latinLnBrk="1">
@@ -3850,8 +4209,11 @@
                       <a:spcPts val="800"/>
                     </a:spcAft>
                   </a:pPr>
-                  <a14:m xmlns:m="http://schemas.openxmlformats.org/officeDocument/2006/math" xmlns:mc="http://schemas.openxmlformats.org/markup-compatibility/2006" xmlns:ho="http://schemas.haansoft.com/office/8.0" mc:Ignorable="ho" ho:hncCreate="1">
-                    <m:oMathPara>
+                  <a14:m>
+                    <m:oMathPara xmlns:m="http://schemas.openxmlformats.org/officeDocument/2006/math">
+                      <m:oMathParaPr>
+                        <m:jc m:val="centerGroup"/>
+                      </m:oMathParaPr>
                       <m:oMath xmlns:m="http://schemas.openxmlformats.org/officeDocument/2006/math">
                         <m:r>
                           <a:rPr lang="en-US" altLang="ko-KR" sz="1800" i="1" kern="100">
@@ -3864,23 +4226,74 @@
                       </m:oMath>
                     </m:oMathPara>
                   </a14:m>
+                  <a:endParaRPr dirty="0"/>
                 </a:p>
                 <a:p>
-                  <a14:m xmlns:m="http://schemas.openxmlformats.org/officeDocument/2006/math" xmlns:mc="http://schemas.openxmlformats.org/markup-compatibility/2006" xmlns:ho="http://schemas.haansoft.com/office/8.0" mc:Ignorable="ho" ho:hncCreate="1">
-                    <m:oMathPara>
+                  <a:pPr/>
+                  <a14:m>
+                    <m:oMathPara xmlns:m="http://schemas.openxmlformats.org/officeDocument/2006/math">
+                      <m:oMathParaPr>
+                        <m:jc m:val="centerGroup"/>
+                      </m:oMathParaPr>
                       <m:oMath xmlns:m="http://schemas.openxmlformats.org/officeDocument/2006/math">
                         <m:r>
                           <a:rPr lang="en-US" altLang="ko-KR" sz="1800" kern="100" dirty="0">
                             <a:effectLst/>
-                            <a:latin typeface="Arial Unicode MS" panose="020B0604020202020204" pitchFamily="50" charset="-127"/>
+                            <a:latin typeface="Cambria Math" panose="02040503050406030204" pitchFamily="18" charset="0"/>
                             <a:ea typeface="Arial Unicode MS" panose="020B0604020202020204" pitchFamily="50" charset="-127"/>
                             <a:cs typeface="Arial Unicode MS" panose="020B0604020202020204" pitchFamily="50" charset="-127"/>
                           </a:rPr>
-                          <m:t xml:space="preserve">Fan Speed Max : </m:t>
+                          <m:t>𝐹𝑎𝑛</m:t>
+                        </m:r>
+                        <m:r>
+                          <a:rPr lang="en-US" altLang="ko-KR" sz="1800" kern="100" dirty="0">
+                            <a:effectLst/>
+                            <a:latin typeface="Cambria Math" panose="02040503050406030204" pitchFamily="18" charset="0"/>
+                            <a:ea typeface="Arial Unicode MS" panose="020B0604020202020204" pitchFamily="50" charset="-127"/>
+                            <a:cs typeface="Arial Unicode MS" panose="020B0604020202020204" pitchFamily="50" charset="-127"/>
+                          </a:rPr>
+                          <m:t> </m:t>
+                        </m:r>
+                        <m:r>
+                          <a:rPr lang="en-US" altLang="ko-KR" sz="1800" kern="100" dirty="0">
+                            <a:effectLst/>
+                            <a:latin typeface="Cambria Math" panose="02040503050406030204" pitchFamily="18" charset="0"/>
+                            <a:ea typeface="Arial Unicode MS" panose="020B0604020202020204" pitchFamily="50" charset="-127"/>
+                            <a:cs typeface="Arial Unicode MS" panose="020B0604020202020204" pitchFamily="50" charset="-127"/>
+                          </a:rPr>
+                          <m:t>𝑆𝑝𝑒𝑒𝑑</m:t>
+                        </m:r>
+                        <m:r>
+                          <a:rPr lang="en-US" altLang="ko-KR" sz="1800" kern="100" dirty="0">
+                            <a:effectLst/>
+                            <a:latin typeface="Cambria Math" panose="02040503050406030204" pitchFamily="18" charset="0"/>
+                            <a:ea typeface="Arial Unicode MS" panose="020B0604020202020204" pitchFamily="50" charset="-127"/>
+                            <a:cs typeface="Arial Unicode MS" panose="020B0604020202020204" pitchFamily="50" charset="-127"/>
+                          </a:rPr>
+                          <m:t> </m:t>
+                        </m:r>
+                        <m:r>
+                          <a:rPr lang="en-US" altLang="ko-KR" sz="1800" kern="100" dirty="0">
+                            <a:effectLst/>
+                            <a:latin typeface="Cambria Math" panose="02040503050406030204" pitchFamily="18" charset="0"/>
+                            <a:ea typeface="Arial Unicode MS" panose="020B0604020202020204" pitchFamily="50" charset="-127"/>
+                            <a:cs typeface="Arial Unicode MS" panose="020B0604020202020204" pitchFamily="50" charset="-127"/>
+                          </a:rPr>
+                          <m:t>𝑀𝑎𝑥</m:t>
+                        </m:r>
+                        <m:r>
+                          <a:rPr lang="en-US" altLang="ko-KR" sz="1800" kern="100" dirty="0">
+                            <a:effectLst/>
+                            <a:latin typeface="Cambria Math" panose="02040503050406030204" pitchFamily="18" charset="0"/>
+                            <a:ea typeface="Arial Unicode MS" panose="020B0604020202020204" pitchFamily="50" charset="-127"/>
+                            <a:cs typeface="Arial Unicode MS" panose="020B0604020202020204" pitchFamily="50" charset="-127"/>
+                          </a:rPr>
+                          <m:t> : </m:t>
                         </m:r>
                       </m:oMath>
                     </m:oMathPara>
                   </a14:m>
+                  <a:endParaRPr dirty="0"/>
                 </a:p>
                 <a:p>
                   <a:pPr latinLnBrk="1">
@@ -3888,8 +4301,11 @@
                       <a:spcPts val="800"/>
                     </a:spcAft>
                   </a:pPr>
-                  <a14:m xmlns:m="http://schemas.openxmlformats.org/officeDocument/2006/math" xmlns:mc="http://schemas.openxmlformats.org/markup-compatibility/2006" xmlns:ho="http://schemas.haansoft.com/office/8.0" mc:Ignorable="ho" ho:hncCreate="1">
-                    <m:oMathPara>
+                  <a14:m>
+                    <m:oMathPara xmlns:m="http://schemas.openxmlformats.org/officeDocument/2006/math">
+                      <m:oMathParaPr>
+                        <m:jc m:val="centerGroup"/>
+                      </m:oMathParaPr>
                       <m:oMath xmlns:m="http://schemas.openxmlformats.org/officeDocument/2006/math">
                         <m:r>
                           <a:rPr lang="en-US" altLang="ko-KR" sz="1800" i="1" kern="100">
@@ -3902,23 +4318,47 @@
                       </m:oMath>
                     </m:oMathPara>
                   </a14:m>
+                  <a:endParaRPr dirty="0"/>
                 </a:p>
                 <a:p>
-                  <a14:m xmlns:m="http://schemas.openxmlformats.org/officeDocument/2006/math" xmlns:mc="http://schemas.openxmlformats.org/markup-compatibility/2006" xmlns:ho="http://schemas.haansoft.com/office/8.0" mc:Ignorable="ho" ho:hncCreate="1">
-                    <m:oMathPara>
+                  <a:pPr/>
+                  <a14:m>
+                    <m:oMathPara xmlns:m="http://schemas.openxmlformats.org/officeDocument/2006/math">
+                      <m:oMathParaPr>
+                        <m:jc m:val="centerGroup"/>
+                      </m:oMathParaPr>
                       <m:oMath xmlns:m="http://schemas.openxmlformats.org/officeDocument/2006/math">
                         <m:r>
                           <a:rPr lang="en-US" altLang="ko-KR" sz="1800" kern="100" dirty="0">
                             <a:effectLst/>
-                            <a:latin typeface="Arial Unicode MS" panose="020B0604020202020204" pitchFamily="50" charset="-127"/>
+                            <a:latin typeface="Cambria Math" panose="02040503050406030204" pitchFamily="18" charset="0"/>
                             <a:ea typeface="Arial Unicode MS" panose="020B0604020202020204" pitchFamily="50" charset="-127"/>
                             <a:cs typeface="Arial Unicode MS" panose="020B0604020202020204" pitchFamily="50" charset="-127"/>
                           </a:rPr>
-                          <m:t xml:space="preserve">	  Min : </m:t>
+                          <m:t>	  </m:t>
+                        </m:r>
+                        <m:r>
+                          <a:rPr lang="en-US" altLang="ko-KR" sz="1800" kern="100" dirty="0">
+                            <a:effectLst/>
+                            <a:latin typeface="Cambria Math" panose="02040503050406030204" pitchFamily="18" charset="0"/>
+                            <a:ea typeface="Arial Unicode MS" panose="020B0604020202020204" pitchFamily="50" charset="-127"/>
+                            <a:cs typeface="Arial Unicode MS" panose="020B0604020202020204" pitchFamily="50" charset="-127"/>
+                          </a:rPr>
+                          <m:t>𝑀𝑖𝑛</m:t>
+                        </m:r>
+                        <m:r>
+                          <a:rPr lang="en-US" altLang="ko-KR" sz="1800" kern="100" dirty="0">
+                            <a:effectLst/>
+                            <a:latin typeface="Cambria Math" panose="02040503050406030204" pitchFamily="18" charset="0"/>
+                            <a:ea typeface="Arial Unicode MS" panose="020B0604020202020204" pitchFamily="50" charset="-127"/>
+                            <a:cs typeface="Arial Unicode MS" panose="020B0604020202020204" pitchFamily="50" charset="-127"/>
+                          </a:rPr>
+                          <m:t> : </m:t>
                         </m:r>
                       </m:oMath>
                     </m:oMathPara>
                   </a14:m>
+                  <a:endParaRPr dirty="0"/>
                 </a:p>
                 <a:p>
                   <a:pPr latinLnBrk="1">
@@ -3926,8 +4366,11 @@
                       <a:spcPts val="800"/>
                     </a:spcAft>
                   </a:pPr>
-                  <a14:m xmlns:m="http://schemas.openxmlformats.org/officeDocument/2006/math" xmlns:mc="http://schemas.openxmlformats.org/markup-compatibility/2006" xmlns:ho="http://schemas.haansoft.com/office/8.0" mc:Ignorable="ho" ho:hncCreate="1">
-                    <m:oMathPara>
+                  <a14:m>
+                    <m:oMathPara xmlns:m="http://schemas.openxmlformats.org/officeDocument/2006/math">
+                      <m:oMathParaPr>
+                        <m:jc m:val="centerGroup"/>
+                      </m:oMathParaPr>
                       <m:oMath xmlns:m="http://schemas.openxmlformats.org/officeDocument/2006/math">
                         <m:r>
                           <a:rPr lang="en-US" altLang="ko-KR" sz="1800" i="1" kern="100">
@@ -3940,23 +4383,56 @@
                       </m:oMath>
                     </m:oMathPara>
                   </a14:m>
+                  <a:endParaRPr dirty="0"/>
                 </a:p>
                 <a:p>
-                  <a14:m xmlns:m="http://schemas.openxmlformats.org/officeDocument/2006/math" xmlns:mc="http://schemas.openxmlformats.org/markup-compatibility/2006" xmlns:ho="http://schemas.haansoft.com/office/8.0" mc:Ignorable="ho" ho:hncCreate="1">
-                    <m:oMathPara>
+                  <a:pPr/>
+                  <a14:m>
+                    <m:oMathPara xmlns:m="http://schemas.openxmlformats.org/officeDocument/2006/math">
+                      <m:oMathParaPr>
+                        <m:jc m:val="centerGroup"/>
+                      </m:oMathParaPr>
                       <m:oMath xmlns:m="http://schemas.openxmlformats.org/officeDocument/2006/math">
                         <m:r>
                           <a:rPr lang="en-US" altLang="ko-KR" sz="1800" kern="100" dirty="0">
                             <a:effectLst/>
-                            <a:latin typeface="Arial Unicode MS" panose="020B0604020202020204" pitchFamily="50" charset="-127"/>
+                            <a:latin typeface="Cambria Math" panose="02040503050406030204" pitchFamily="18" charset="0"/>
                             <a:ea typeface="Arial Unicode MS" panose="020B0604020202020204" pitchFamily="50" charset="-127"/>
                             <a:cs typeface="Arial Unicode MS" panose="020B0604020202020204" pitchFamily="50" charset="-127"/>
                           </a:rPr>
-                          <m:t xml:space="preserve">Extrusion Multiplier : </m:t>
+                          <m:t>𝐸𝑥𝑡𝑟𝑢𝑠𝑖𝑜𝑛</m:t>
+                        </m:r>
+                        <m:r>
+                          <a:rPr lang="en-US" altLang="ko-KR" sz="1800" kern="100" dirty="0">
+                            <a:effectLst/>
+                            <a:latin typeface="Cambria Math" panose="02040503050406030204" pitchFamily="18" charset="0"/>
+                            <a:ea typeface="Arial Unicode MS" panose="020B0604020202020204" pitchFamily="50" charset="-127"/>
+                            <a:cs typeface="Arial Unicode MS" panose="020B0604020202020204" pitchFamily="50" charset="-127"/>
+                          </a:rPr>
+                          <m:t> </m:t>
+                        </m:r>
+                        <m:r>
+                          <a:rPr lang="en-US" altLang="ko-KR" sz="1800" kern="100" dirty="0">
+                            <a:effectLst/>
+                            <a:latin typeface="Cambria Math" panose="02040503050406030204" pitchFamily="18" charset="0"/>
+                            <a:ea typeface="Arial Unicode MS" panose="020B0604020202020204" pitchFamily="50" charset="-127"/>
+                            <a:cs typeface="Arial Unicode MS" panose="020B0604020202020204" pitchFamily="50" charset="-127"/>
+                          </a:rPr>
+                          <m:t>𝑀𝑢𝑙𝑡𝑖𝑝𝑙𝑖𝑒𝑟</m:t>
+                        </m:r>
+                        <m:r>
+                          <a:rPr lang="en-US" altLang="ko-KR" sz="1800" kern="100" dirty="0">
+                            <a:effectLst/>
+                            <a:latin typeface="Cambria Math" panose="02040503050406030204" pitchFamily="18" charset="0"/>
+                            <a:ea typeface="Arial Unicode MS" panose="020B0604020202020204" pitchFamily="50" charset="-127"/>
+                            <a:cs typeface="Arial Unicode MS" panose="020B0604020202020204" pitchFamily="50" charset="-127"/>
+                          </a:rPr>
+                          <m:t> : </m:t>
                         </m:r>
                       </m:oMath>
                     </m:oMathPara>
                   </a14:m>
+                  <a:endParaRPr dirty="0"/>
                 </a:p>
                 <a:p>
                   <a:pPr latinLnBrk="1">
@@ -3964,8 +4440,11 @@
                       <a:spcPts val="800"/>
                     </a:spcAft>
                   </a:pPr>
-                  <a14:m xmlns:m="http://schemas.openxmlformats.org/officeDocument/2006/math" xmlns:mc="http://schemas.openxmlformats.org/markup-compatibility/2006" xmlns:ho="http://schemas.haansoft.com/office/8.0" mc:Ignorable="ho" ho:hncCreate="1">
-                    <m:oMathPara>
+                  <a14:m>
+                    <m:oMathPara xmlns:m="http://schemas.openxmlformats.org/officeDocument/2006/math">
+                      <m:oMathParaPr>
+                        <m:jc m:val="centerGroup"/>
+                      </m:oMathParaPr>
                       <m:oMath xmlns:m="http://schemas.openxmlformats.org/officeDocument/2006/math">
                         <m:r>
                           <a:rPr lang="en-US" altLang="ko-KR" sz="1800" i="1" kern="100">
@@ -3978,23 +4457,56 @@
                       </m:oMath>
                     </m:oMathPara>
                   </a14:m>
+                  <a:endParaRPr dirty="0"/>
                 </a:p>
                 <a:p>
-                  <a14:m xmlns:m="http://schemas.openxmlformats.org/officeDocument/2006/math" xmlns:mc="http://schemas.openxmlformats.org/markup-compatibility/2006" xmlns:ho="http://schemas.haansoft.com/office/8.0" mc:Ignorable="ho" ho:hncCreate="1">
-                    <m:oMathPara>
+                  <a:pPr/>
+                  <a14:m>
+                    <m:oMathPara xmlns:m="http://schemas.openxmlformats.org/officeDocument/2006/math">
+                      <m:oMathParaPr>
+                        <m:jc m:val="centerGroup"/>
+                      </m:oMathParaPr>
                       <m:oMath xmlns:m="http://schemas.openxmlformats.org/officeDocument/2006/math">
                         <m:r>
                           <a:rPr lang="en-US" altLang="ko-KR" sz="1800" kern="100" dirty="0">
                             <a:effectLst/>
-                            <a:latin typeface="Arial Unicode MS" panose="020B0604020202020204" pitchFamily="50" charset="-127"/>
+                            <a:latin typeface="Cambria Math" panose="02040503050406030204" pitchFamily="18" charset="0"/>
                             <a:ea typeface="Arial Unicode MS" panose="020B0604020202020204" pitchFamily="50" charset="-127"/>
                             <a:cs typeface="Arial Unicode MS" panose="020B0604020202020204" pitchFamily="50" charset="-127"/>
                           </a:rPr>
-                          <m:t xml:space="preserve">Retraction Length : </m:t>
+                          <m:t>𝑅𝑒𝑡𝑟𝑎𝑐𝑡𝑖𝑜𝑛</m:t>
+                        </m:r>
+                        <m:r>
+                          <a:rPr lang="en-US" altLang="ko-KR" sz="1800" kern="100" dirty="0">
+                            <a:effectLst/>
+                            <a:latin typeface="Cambria Math" panose="02040503050406030204" pitchFamily="18" charset="0"/>
+                            <a:ea typeface="Arial Unicode MS" panose="020B0604020202020204" pitchFamily="50" charset="-127"/>
+                            <a:cs typeface="Arial Unicode MS" panose="020B0604020202020204" pitchFamily="50" charset="-127"/>
+                          </a:rPr>
+                          <m:t> </m:t>
+                        </m:r>
+                        <m:r>
+                          <a:rPr lang="en-US" altLang="ko-KR" sz="1800" kern="100" dirty="0">
+                            <a:effectLst/>
+                            <a:latin typeface="Cambria Math" panose="02040503050406030204" pitchFamily="18" charset="0"/>
+                            <a:ea typeface="Arial Unicode MS" panose="020B0604020202020204" pitchFamily="50" charset="-127"/>
+                            <a:cs typeface="Arial Unicode MS" panose="020B0604020202020204" pitchFamily="50" charset="-127"/>
+                          </a:rPr>
+                          <m:t>𝐿𝑒𝑛𝑔𝑡h</m:t>
+                        </m:r>
+                        <m:r>
+                          <a:rPr lang="en-US" altLang="ko-KR" sz="1800" kern="100" dirty="0">
+                            <a:effectLst/>
+                            <a:latin typeface="Cambria Math" panose="02040503050406030204" pitchFamily="18" charset="0"/>
+                            <a:ea typeface="Arial Unicode MS" panose="020B0604020202020204" pitchFamily="50" charset="-127"/>
+                            <a:cs typeface="Arial Unicode MS" panose="020B0604020202020204" pitchFamily="50" charset="-127"/>
+                          </a:rPr>
+                          <m:t> : </m:t>
                         </m:r>
                       </m:oMath>
                     </m:oMathPara>
                   </a14:m>
+                  <a:endParaRPr dirty="0"/>
                 </a:p>
                 <a:p>
                   <a:pPr latinLnBrk="1">
@@ -4002,8 +4514,11 @@
                       <a:spcPts val="800"/>
                     </a:spcAft>
                   </a:pPr>
-                  <a14:m xmlns:m="http://schemas.openxmlformats.org/officeDocument/2006/math" xmlns:mc="http://schemas.openxmlformats.org/markup-compatibility/2006" xmlns:ho="http://schemas.haansoft.com/office/8.0" mc:Ignorable="ho" ho:hncCreate="1">
-                    <m:oMathPara>
+                  <a14:m>
+                    <m:oMathPara xmlns:m="http://schemas.openxmlformats.org/officeDocument/2006/math">
+                      <m:oMathParaPr>
+                        <m:jc m:val="centerGroup"/>
+                      </m:oMathParaPr>
                       <m:oMath xmlns:m="http://schemas.openxmlformats.org/officeDocument/2006/math">
                         <m:r>
                           <a:rPr lang="en-US" altLang="ko-KR" sz="1800" i="1" kern="100">
@@ -4024,23 +4539,56 @@
                       </m:oMath>
                     </m:oMathPara>
                   </a14:m>
+                  <a:endParaRPr dirty="0"/>
                 </a:p>
                 <a:p>
-                  <a14:m xmlns:m="http://schemas.openxmlformats.org/officeDocument/2006/math" xmlns:mc="http://schemas.openxmlformats.org/markup-compatibility/2006" xmlns:ho="http://schemas.haansoft.com/office/8.0" mc:Ignorable="ho" ho:hncCreate="1">
-                    <m:oMathPara>
+                  <a:pPr/>
+                  <a14:m>
+                    <m:oMathPara xmlns:m="http://schemas.openxmlformats.org/officeDocument/2006/math">
+                      <m:oMathParaPr>
+                        <m:jc m:val="centerGroup"/>
+                      </m:oMathParaPr>
                       <m:oMath xmlns:m="http://schemas.openxmlformats.org/officeDocument/2006/math">
                         <m:r>
                           <a:rPr lang="en-US" altLang="ko-KR" sz="1800" kern="100" dirty="0">
                             <a:effectLst/>
-                            <a:latin typeface="Arial Unicode MS" panose="020B0604020202020204" pitchFamily="50" charset="-127"/>
+                            <a:latin typeface="Cambria Math" panose="02040503050406030204" pitchFamily="18" charset="0"/>
                             <a:ea typeface="Arial Unicode MS" panose="020B0604020202020204" pitchFamily="50" charset="-127"/>
                             <a:cs typeface="Arial Unicode MS" panose="020B0604020202020204" pitchFamily="50" charset="-127"/>
                           </a:rPr>
-                          <m:t xml:space="preserve">Retraction Speed : </m:t>
+                          <m:t>𝑅𝑒𝑡𝑟𝑎𝑐𝑡𝑖𝑜𝑛</m:t>
+                        </m:r>
+                        <m:r>
+                          <a:rPr lang="en-US" altLang="ko-KR" sz="1800" kern="100" dirty="0">
+                            <a:effectLst/>
+                            <a:latin typeface="Cambria Math" panose="02040503050406030204" pitchFamily="18" charset="0"/>
+                            <a:ea typeface="Arial Unicode MS" panose="020B0604020202020204" pitchFamily="50" charset="-127"/>
+                            <a:cs typeface="Arial Unicode MS" panose="020B0604020202020204" pitchFamily="50" charset="-127"/>
+                          </a:rPr>
+                          <m:t> </m:t>
+                        </m:r>
+                        <m:r>
+                          <a:rPr lang="en-US" altLang="ko-KR" sz="1800" kern="100" dirty="0">
+                            <a:effectLst/>
+                            <a:latin typeface="Cambria Math" panose="02040503050406030204" pitchFamily="18" charset="0"/>
+                            <a:ea typeface="Arial Unicode MS" panose="020B0604020202020204" pitchFamily="50" charset="-127"/>
+                            <a:cs typeface="Arial Unicode MS" panose="020B0604020202020204" pitchFamily="50" charset="-127"/>
+                          </a:rPr>
+                          <m:t>𝑆𝑝𝑒𝑒𝑑</m:t>
+                        </m:r>
+                        <m:r>
+                          <a:rPr lang="en-US" altLang="ko-KR" sz="1800" kern="100" dirty="0">
+                            <a:effectLst/>
+                            <a:latin typeface="Cambria Math" panose="02040503050406030204" pitchFamily="18" charset="0"/>
+                            <a:ea typeface="Arial Unicode MS" panose="020B0604020202020204" pitchFamily="50" charset="-127"/>
+                            <a:cs typeface="Arial Unicode MS" panose="020B0604020202020204" pitchFamily="50" charset="-127"/>
+                          </a:rPr>
+                          <m:t> : </m:t>
                         </m:r>
                       </m:oMath>
                     </m:oMathPara>
                   </a14:m>
+                  <a:endParaRPr dirty="0"/>
                 </a:p>
                 <a:p>
                   <a:pPr latinLnBrk="1">
@@ -4048,8 +4596,11 @@
                       <a:spcPts val="800"/>
                     </a:spcAft>
                   </a:pPr>
-                  <a14:m xmlns:m="http://schemas.openxmlformats.org/officeDocument/2006/math" xmlns:mc="http://schemas.openxmlformats.org/markup-compatibility/2006" xmlns:ho="http://schemas.haansoft.com/office/8.0" mc:Ignorable="ho" ho:hncCreate="1">
-                    <m:oMathPara>
+                  <a14:m>
+                    <m:oMathPara xmlns:m="http://schemas.openxmlformats.org/officeDocument/2006/math">
+                      <m:oMathParaPr>
+                        <m:jc m:val="centerGroup"/>
+                      </m:oMathParaPr>
                       <m:oMath xmlns:m="http://schemas.openxmlformats.org/officeDocument/2006/math">
                         <m:r>
                           <a:rPr lang="en-US" altLang="ko-KR" sz="1800" i="1" kern="100">
@@ -4132,27 +4683,33 @@
                       </m:oMath>
                     </m:oMathPara>
                   </a14:m>
+                  <a:endParaRPr dirty="0"/>
                 </a:p>
                 <a:p>
-                  <a14:m xmlns:m="http://schemas.openxmlformats.org/officeDocument/2006/math" xmlns:mc="http://schemas.openxmlformats.org/markup-compatibility/2006" xmlns:ho="http://schemas.haansoft.com/office/8.0" mc:Ignorable="ho" ho:hncCreate="1">
-                    <m:oMathPara>
+                  <a:pPr/>
+                  <a14:m>
+                    <m:oMathPara xmlns:m="http://schemas.openxmlformats.org/officeDocument/2006/math">
+                      <m:oMathParaPr>
+                        <m:jc m:val="centerGroup"/>
+                      </m:oMathParaPr>
                       <m:oMath xmlns:m="http://schemas.openxmlformats.org/officeDocument/2006/math">
                         <m:r>
                           <a:rPr lang="en-US" altLang="ko-KR" sz="1800" kern="100" dirty="0">
                             <a:effectLst/>
-                            <a:latin typeface="Times New Roman" panose="02020603050405020304" pitchFamily="18" charset="0"/>
+                            <a:latin typeface="Cambria Math" panose="02040503050406030204" pitchFamily="18" charset="0"/>
                             <a:ea typeface="맑은 고딕" panose="020B0503020000020004" pitchFamily="50" charset="-127"/>
                           </a:rPr>
-                          <m:t xml:space="preserve"> </m:t>
+                          <m:t> </m:t>
                         </m:r>
                       </m:oMath>
                     </m:oMathPara>
                   </a14:m>
+                  <a:endParaRPr dirty="0"/>
                 </a:p>
               </p:txBody>
             </p:sp>
           </mc:Choice>
-          <mc:Fallback>
+          <mc:Fallback xmlns:dsp="http://schemas.microsoft.com/office/drawing/2008/diagram" xmlns:dgm="http://schemas.openxmlformats.org/drawingml/2006/diagram" xmlns:c="http://schemas.openxmlformats.org/drawingml/2006/chart" xmlns="">
             <p:sp>
               <p:nvSpPr>
                 <p:cNvPr id="4" name=""/>
@@ -4231,11 +4788,11 @@
   <p:clrMapOvr>
     <a:masterClrMapping/>
   </p:clrMapOvr>
-  <mc:AlternateContent xmlns:mc="http://schemas.openxmlformats.org/markup-compatibility/2006">
-    <mc:Choice xmlns:p14="http://schemas.microsoft.com/office/powerpoint/2010/main" Requires="p14">
-      <p:transition xmlns:mc="http://schemas.openxmlformats.org/markup-compatibility/2006" xmlns:p14="http://schemas.microsoft.com/office/powerpoint/2010/main" mc:Ignorable="p14" p14:dur="500"/>
+  <mc:AlternateContent xmlns:mc="http://schemas.openxmlformats.org/markup-compatibility/2006" xmlns:p14="http://schemas.microsoft.com/office/powerpoint/2010/main">
+    <mc:Choice Requires="p14">
+      <p:transition/>
     </mc:Choice>
-    <mc:Fallback>
+    <mc:Fallback xmlns:a14="http://schemas.microsoft.com/office/drawing/2010/main" xmlns:dsp="http://schemas.microsoft.com/office/drawing/2008/diagram" xmlns:dgm="http://schemas.openxmlformats.org/drawingml/2006/diagram" xmlns:c="http://schemas.openxmlformats.org/drawingml/2006/chart" xmlns="">
       <p:transition/>
     </mc:Fallback>
   </mc:AlternateContent>
@@ -5724,44 +6281,44 @@
 </file>
 
 <file path=ppt/theme/theme1.xml><?xml version="1.0" encoding="utf-8"?>
-<a:theme xmlns:r="http://schemas.openxmlformats.org/officeDocument/2006/relationships" xmlns:c="http://schemas.openxmlformats.org/drawingml/2006/chart" xmlns:dgm="http://schemas.openxmlformats.org/drawingml/2006/diagram" xmlns:dsp="http://schemas.microsoft.com/office/drawing/2008/diagram" xmlns:a="http://schemas.openxmlformats.org/drawingml/2006/main" xmlns:pic="http://schemas.openxmlformats.org/drawingml/2006/picture" xmlns:wp="http://schemas.openxmlformats.org/drawingml/2006/wordprocessingDrawing" xmlns:xdr="http://schemas.openxmlformats.org/drawingml/2006/spreadsheetDrawing" xmlns:lc="http://schemas.openxmlformats.org/drawingml/2006/lockedCanvas" xmlns:p="http://schemas.openxmlformats.org/presentationml/2006/main" name="Office 테마">
+<a:theme xmlns:a="http://schemas.openxmlformats.org/drawingml/2006/main" name="Office 테마">
   <a:themeElements>
     <a:clrScheme name="Office">
       <a:dk1>
         <a:sysClr val="windowText" lastClr="000000"/>
       </a:dk1>
       <a:lt1>
-        <a:sysClr val="window" lastClr="ffffff"/>
+        <a:sysClr val="window" lastClr="FFFFFF"/>
       </a:lt1>
       <a:dk2>
-        <a:srgbClr val="0e2841"/>
+        <a:srgbClr val="0E2841"/>
       </a:dk2>
       <a:lt2>
-        <a:srgbClr val="e8e8e8"/>
+        <a:srgbClr val="E8E8E8"/>
       </a:lt2>
       <a:accent1>
         <a:srgbClr val="156082"/>
       </a:accent1>
       <a:accent2>
-        <a:srgbClr val="e97132"/>
+        <a:srgbClr val="E97132"/>
       </a:accent2>
       <a:accent3>
-        <a:srgbClr val="196b24"/>
+        <a:srgbClr val="196B24"/>
       </a:accent3>
       <a:accent4>
-        <a:srgbClr val="0f9ed5"/>
+        <a:srgbClr val="0F9ED5"/>
       </a:accent4>
       <a:accent5>
-        <a:srgbClr val="a02b93"/>
+        <a:srgbClr val="A02B93"/>
       </a:accent5>
       <a:accent6>
-        <a:srgbClr val="4ea72e"/>
+        <a:srgbClr val="4EA72E"/>
       </a:accent6>
       <a:hlink>
         <a:srgbClr val="467886"/>
       </a:hlink>
       <a:folHlink>
-        <a:srgbClr val="96607d"/>
+        <a:srgbClr val="96607D"/>
       </a:folHlink>
     </a:clrScheme>
     <a:fontScheme name="Office">
@@ -6055,5 +6612,6 @@
       <a:lstStyle/>
     </a:txDef>
   </a:objectDefaults>
+  <a:extraClrSchemeLst/>
 </a:theme>
 </file>
</xml_diff>

<commit_message>
0809 var-diameter exp completed
</commit_message>
<xml_diff>
--- a/LabLog.pptx
+++ b/LabLog.pptx
@@ -131,7 +131,7 @@
 <file path=ppt/revisionInfo.xml><?xml version="1.0" encoding="utf-8"?>
 <p1510:revInfo xmlns:a="http://schemas.openxmlformats.org/drawingml/2006/main" xmlns:r="http://schemas.openxmlformats.org/officeDocument/2006/relationships" xmlns:p1510="http://schemas.microsoft.com/office/powerpoint/2015/10/main">
   <p1510:revLst>
-    <p1510:client id="{B85301CE-5477-420D-98B8-2A5B4FD7B43E}" v="6" dt="2024-08-09T02:00:49.746"/>
+    <p1510:client id="{B85301CE-5477-420D-98B8-2A5B4FD7B43E}" v="20" dt="2024-08-09T09:27:08.268"/>
   </p1510:revLst>
 </p1510:revInfo>
 </file>
@@ -141,18 +141,18 @@
   <pc:docChgLst>
     <pc:chgData name="민서 오" userId="7d89e7b822021c56" providerId="LiveId" clId="{B85301CE-5477-420D-98B8-2A5B4FD7B43E}"/>
     <pc:docChg chg="undo custSel addSld delSld modSld">
-      <pc:chgData name="민서 오" userId="7d89e7b822021c56" providerId="LiveId" clId="{B85301CE-5477-420D-98B8-2A5B4FD7B43E}" dt="2024-08-09T02:01:12.982" v="82" actId="20577"/>
+      <pc:chgData name="민서 오" userId="7d89e7b822021c56" providerId="LiveId" clId="{B85301CE-5477-420D-98B8-2A5B4FD7B43E}" dt="2024-08-09T09:27:39.832" v="347" actId="1076"/>
       <pc:docMkLst>
         <pc:docMk/>
       </pc:docMkLst>
       <pc:sldChg chg="modSp add del mod">
-        <pc:chgData name="민서 오" userId="7d89e7b822021c56" providerId="LiveId" clId="{B85301CE-5477-420D-98B8-2A5B4FD7B43E}" dt="2024-08-09T02:01:12.982" v="82" actId="20577"/>
+        <pc:chgData name="민서 오" userId="7d89e7b822021c56" providerId="LiveId" clId="{B85301CE-5477-420D-98B8-2A5B4FD7B43E}" dt="2024-08-09T04:24:46.880" v="87" actId="13926"/>
         <pc:sldMkLst>
           <pc:docMk/>
           <pc:sldMk cId="0" sldId="256"/>
         </pc:sldMkLst>
         <pc:spChg chg="mod">
-          <ac:chgData name="민서 오" userId="7d89e7b822021c56" providerId="LiveId" clId="{B85301CE-5477-420D-98B8-2A5B4FD7B43E}" dt="2024-08-09T02:01:12.982" v="82" actId="20577"/>
+          <ac:chgData name="민서 오" userId="7d89e7b822021c56" providerId="LiveId" clId="{B85301CE-5477-420D-98B8-2A5B4FD7B43E}" dt="2024-08-09T04:24:46.880" v="87" actId="13926"/>
           <ac:spMkLst>
             <pc:docMk/>
             <pc:sldMk cId="0" sldId="256"/>
@@ -171,23 +171,16 @@
         <pc:chgData name="민서 오" userId="7d89e7b822021c56" providerId="LiveId" clId="{B85301CE-5477-420D-98B8-2A5B4FD7B43E}" dt="2024-08-09T02:00:49.452" v="39" actId="47"/>
         <pc:sldMkLst>
           <pc:docMk/>
-          <pc:sldMk cId="0" sldId="257"/>
+          <pc:sldMk cId="1317432533" sldId="257"/>
         </pc:sldMkLst>
         <pc:grpChg chg="mod">
           <ac:chgData name="민서 오" userId="7d89e7b822021c56" providerId="LiveId" clId="{B85301CE-5477-420D-98B8-2A5B4FD7B43E}" dt="2024-08-06T03:28:03.549" v="31" actId="1076"/>
           <ac:grpSpMkLst>
             <pc:docMk/>
-            <pc:sldMk cId="0" sldId="257"/>
+            <pc:sldMk cId="1317432533" sldId="257"/>
             <ac:grpSpMk id="2" creationId="{00000000-0000-0000-0000-000000000000}"/>
           </ac:grpSpMkLst>
         </pc:grpChg>
-      </pc:sldChg>
-      <pc:sldChg chg="add del">
-        <pc:chgData name="민서 오" userId="7d89e7b822021c56" providerId="LiveId" clId="{B85301CE-5477-420D-98B8-2A5B4FD7B43E}" dt="2024-08-09T02:00:49.741" v="40"/>
-        <pc:sldMkLst>
-          <pc:docMk/>
-          <pc:sldMk cId="1317432533" sldId="257"/>
-        </pc:sldMkLst>
       </pc:sldChg>
       <pc:sldChg chg="add del">
         <pc:chgData name="민서 오" userId="7d89e7b822021c56" providerId="LiveId" clId="{B85301CE-5477-420D-98B8-2A5B4FD7B43E}" dt="2024-08-09T02:00:44.354" v="37"/>
@@ -210,12 +203,28 @@
           <pc:sldMk cId="323906404" sldId="259"/>
         </pc:sldMkLst>
       </pc:sldChg>
-      <pc:sldChg chg="add del">
-        <pc:chgData name="민서 오" userId="7d89e7b822021c56" providerId="LiveId" clId="{B85301CE-5477-420D-98B8-2A5B4FD7B43E}" dt="2024-08-09T02:00:49.741" v="40"/>
+      <pc:sldChg chg="addSp delSp modSp add del mod">
+        <pc:chgData name="민서 오" userId="7d89e7b822021c56" providerId="LiveId" clId="{B85301CE-5477-420D-98B8-2A5B4FD7B43E}" dt="2024-08-09T04:28:58.177" v="259" actId="20577"/>
         <pc:sldMkLst>
           <pc:docMk/>
           <pc:sldMk cId="2937466682" sldId="259"/>
         </pc:sldMkLst>
+        <pc:spChg chg="add mod">
+          <ac:chgData name="민서 오" userId="7d89e7b822021c56" providerId="LiveId" clId="{B85301CE-5477-420D-98B8-2A5B4FD7B43E}" dt="2024-08-09T04:28:58.177" v="259" actId="20577"/>
+          <ac:spMkLst>
+            <pc:docMk/>
+            <pc:sldMk cId="2937466682" sldId="259"/>
+            <ac:spMk id="2" creationId="{ECD948C3-D185-0DED-0C51-D89A4AFE955E}"/>
+          </ac:spMkLst>
+        </pc:spChg>
+        <pc:spChg chg="del mod">
+          <ac:chgData name="민서 오" userId="7d89e7b822021c56" providerId="LiveId" clId="{B85301CE-5477-420D-98B8-2A5B4FD7B43E}" dt="2024-08-09T04:28:54.468" v="250" actId="478"/>
+          <ac:spMkLst>
+            <pc:docMk/>
+            <pc:sldMk cId="2937466682" sldId="259"/>
+            <ac:spMk id="3" creationId="{93F4DC52-D434-8EE5-AF24-314F12592CF7}"/>
+          </ac:spMkLst>
+        </pc:spChg>
       </pc:sldChg>
       <pc:sldChg chg="add del">
         <pc:chgData name="민서 오" userId="7d89e7b822021c56" providerId="LiveId" clId="{B85301CE-5477-420D-98B8-2A5B4FD7B43E}" dt="2024-08-09T02:00:49.452" v="39" actId="47"/>
@@ -224,12 +233,36 @@
           <pc:sldMk cId="323906404" sldId="260"/>
         </pc:sldMkLst>
       </pc:sldChg>
-      <pc:sldChg chg="add del">
-        <pc:chgData name="민서 오" userId="7d89e7b822021c56" providerId="LiveId" clId="{B85301CE-5477-420D-98B8-2A5B4FD7B43E}" dt="2024-08-09T02:00:49.741" v="40"/>
+      <pc:sldChg chg="addSp delSp modSp add del mod">
+        <pc:chgData name="민서 오" userId="7d89e7b822021c56" providerId="LiveId" clId="{B85301CE-5477-420D-98B8-2A5B4FD7B43E}" dt="2024-08-09T04:29:37.021" v="266" actId="20577"/>
         <pc:sldMkLst>
           <pc:docMk/>
           <pc:sldMk cId="1299342871" sldId="260"/>
         </pc:sldMkLst>
+        <pc:spChg chg="del">
+          <ac:chgData name="민서 오" userId="7d89e7b822021c56" providerId="LiveId" clId="{B85301CE-5477-420D-98B8-2A5B4FD7B43E}" dt="2024-08-09T04:28:01.512" v="233" actId="478"/>
+          <ac:spMkLst>
+            <pc:docMk/>
+            <pc:sldMk cId="1299342871" sldId="260"/>
+            <ac:spMk id="8" creationId="{4B90E248-5F19-8EF0-49DA-017D30E63B23}"/>
+          </ac:spMkLst>
+        </pc:spChg>
+        <pc:spChg chg="add mod">
+          <ac:chgData name="민서 오" userId="7d89e7b822021c56" providerId="LiveId" clId="{B85301CE-5477-420D-98B8-2A5B4FD7B43E}" dt="2024-08-09T04:28:01.734" v="234"/>
+          <ac:spMkLst>
+            <pc:docMk/>
+            <pc:sldMk cId="1299342871" sldId="260"/>
+            <ac:spMk id="9" creationId="{F2037D85-53CE-D408-F519-F0F7078C03B4}"/>
+          </ac:spMkLst>
+        </pc:spChg>
+        <pc:spChg chg="add mod">
+          <ac:chgData name="민서 오" userId="7d89e7b822021c56" providerId="LiveId" clId="{B85301CE-5477-420D-98B8-2A5B4FD7B43E}" dt="2024-08-09T04:29:37.021" v="266" actId="20577"/>
+          <ac:spMkLst>
+            <pc:docMk/>
+            <pc:sldMk cId="1299342871" sldId="260"/>
+            <ac:spMk id="10" creationId="{EF45C766-FFD8-D919-C4A2-A2BF59E6928B}"/>
+          </ac:spMkLst>
+        </pc:spChg>
       </pc:sldChg>
       <pc:sldChg chg="add del">
         <pc:chgData name="민서 오" userId="7d89e7b822021c56" providerId="LiveId" clId="{B85301CE-5477-420D-98B8-2A5B4FD7B43E}" dt="2024-08-09T02:00:49.452" v="39" actId="47"/>
@@ -238,19 +271,59 @@
           <pc:sldMk cId="1299342871" sldId="261"/>
         </pc:sldMkLst>
       </pc:sldChg>
-      <pc:sldChg chg="add del">
-        <pc:chgData name="민서 오" userId="7d89e7b822021c56" providerId="LiveId" clId="{B85301CE-5477-420D-98B8-2A5B4FD7B43E}" dt="2024-08-09T02:00:49.741" v="40"/>
+      <pc:sldChg chg="addSp delSp modSp add del mod">
+        <pc:chgData name="민서 오" userId="7d89e7b822021c56" providerId="LiveId" clId="{B85301CE-5477-420D-98B8-2A5B4FD7B43E}" dt="2024-08-09T04:30:22.503" v="276" actId="207"/>
         <pc:sldMkLst>
           <pc:docMk/>
           <pc:sldMk cId="3201859866" sldId="261"/>
         </pc:sldMkLst>
+        <pc:spChg chg="del">
+          <ac:chgData name="민서 오" userId="7d89e7b822021c56" providerId="LiveId" clId="{B85301CE-5477-420D-98B8-2A5B4FD7B43E}" dt="2024-08-09T04:29:41.167" v="267" actId="478"/>
+          <ac:spMkLst>
+            <pc:docMk/>
+            <pc:sldMk cId="3201859866" sldId="261"/>
+            <ac:spMk id="8" creationId="{44229F80-5AB1-E15A-3CD8-36E10C7CCF96}"/>
+          </ac:spMkLst>
+        </pc:spChg>
+        <pc:spChg chg="add mod">
+          <ac:chgData name="민서 오" userId="7d89e7b822021c56" providerId="LiveId" clId="{B85301CE-5477-420D-98B8-2A5B4FD7B43E}" dt="2024-08-09T04:30:22.503" v="276" actId="207"/>
+          <ac:spMkLst>
+            <pc:docMk/>
+            <pc:sldMk cId="3201859866" sldId="261"/>
+            <ac:spMk id="9" creationId="{6A515159-E6B5-76BF-54DE-7D15F76F0F9E}"/>
+          </ac:spMkLst>
+        </pc:spChg>
       </pc:sldChg>
-      <pc:sldChg chg="add del">
-        <pc:chgData name="민서 오" userId="7d89e7b822021c56" providerId="LiveId" clId="{B85301CE-5477-420D-98B8-2A5B4FD7B43E}" dt="2024-08-09T02:00:49.741" v="40"/>
+      <pc:sldChg chg="addSp delSp modSp add del mod">
+        <pc:chgData name="민서 오" userId="7d89e7b822021c56" providerId="LiveId" clId="{B85301CE-5477-420D-98B8-2A5B4FD7B43E}" dt="2024-08-09T04:28:41.629" v="249" actId="207"/>
         <pc:sldMkLst>
           <pc:docMk/>
           <pc:sldMk cId="1481339670" sldId="262"/>
         </pc:sldMkLst>
+        <pc:spChg chg="del">
+          <ac:chgData name="민서 오" userId="7d89e7b822021c56" providerId="LiveId" clId="{B85301CE-5477-420D-98B8-2A5B4FD7B43E}" dt="2024-08-09T04:26:46.115" v="189" actId="478"/>
+          <ac:spMkLst>
+            <pc:docMk/>
+            <pc:sldMk cId="1481339670" sldId="262"/>
+            <ac:spMk id="2" creationId="{520C9508-13DE-7957-9B52-41A7362A9425}"/>
+          </ac:spMkLst>
+        </pc:spChg>
+        <pc:spChg chg="add mod">
+          <ac:chgData name="민서 오" userId="7d89e7b822021c56" providerId="LiveId" clId="{B85301CE-5477-420D-98B8-2A5B4FD7B43E}" dt="2024-08-09T04:26:44.088" v="188"/>
+          <ac:spMkLst>
+            <pc:docMk/>
+            <pc:sldMk cId="1481339670" sldId="262"/>
+            <ac:spMk id="4" creationId="{8B9E3635-EF8A-2A54-EC96-97A16FAD6BEC}"/>
+          </ac:spMkLst>
+        </pc:spChg>
+        <pc:spChg chg="add mod">
+          <ac:chgData name="민서 오" userId="7d89e7b822021c56" providerId="LiveId" clId="{B85301CE-5477-420D-98B8-2A5B4FD7B43E}" dt="2024-08-09T04:28:41.629" v="249" actId="207"/>
+          <ac:spMkLst>
+            <pc:docMk/>
+            <pc:sldMk cId="1481339670" sldId="262"/>
+            <ac:spMk id="8" creationId="{2342DA94-6040-D2F1-24B0-58A4C69AB283}"/>
+          </ac:spMkLst>
+        </pc:spChg>
       </pc:sldChg>
       <pc:sldChg chg="add del">
         <pc:chgData name="민서 오" userId="7d89e7b822021c56" providerId="LiveId" clId="{B85301CE-5477-420D-98B8-2A5B4FD7B43E}" dt="2024-08-09T02:00:49.452" v="39" actId="47"/>
@@ -259,12 +332,28 @@
           <pc:sldMk cId="3201859866" sldId="262"/>
         </pc:sldMkLst>
       </pc:sldChg>
-      <pc:sldChg chg="add">
-        <pc:chgData name="민서 오" userId="7d89e7b822021c56" providerId="LiveId" clId="{B85301CE-5477-420D-98B8-2A5B4FD7B43E}" dt="2024-08-09T02:00:49.741" v="40"/>
+      <pc:sldChg chg="addSp delSp modSp add mod">
+        <pc:chgData name="민서 오" userId="7d89e7b822021c56" providerId="LiveId" clId="{B85301CE-5477-420D-98B8-2A5B4FD7B43E}" dt="2024-08-09T04:27:53.039" v="231" actId="207"/>
         <pc:sldMkLst>
           <pc:docMk/>
           <pc:sldMk cId="323906404" sldId="263"/>
         </pc:sldMkLst>
+        <pc:spChg chg="del">
+          <ac:chgData name="민서 오" userId="7d89e7b822021c56" providerId="LiveId" clId="{B85301CE-5477-420D-98B8-2A5B4FD7B43E}" dt="2024-08-09T04:27:06.507" v="202" actId="478"/>
+          <ac:spMkLst>
+            <pc:docMk/>
+            <pc:sldMk cId="323906404" sldId="263"/>
+            <ac:spMk id="2" creationId="{218A725E-F309-540A-61D3-02D4B0C36D33}"/>
+          </ac:spMkLst>
+        </pc:spChg>
+        <pc:spChg chg="add mod">
+          <ac:chgData name="민서 오" userId="7d89e7b822021c56" providerId="LiveId" clId="{B85301CE-5477-420D-98B8-2A5B4FD7B43E}" dt="2024-08-09T04:27:53.039" v="231" actId="207"/>
+          <ac:spMkLst>
+            <pc:docMk/>
+            <pc:sldMk cId="323906404" sldId="263"/>
+            <ac:spMk id="3" creationId="{35138586-BFFA-0E9C-F01C-EBE29DFF8BD0}"/>
+          </ac:spMkLst>
+        </pc:spChg>
       </pc:sldChg>
       <pc:sldChg chg="add del">
         <pc:chgData name="민서 오" userId="7d89e7b822021c56" providerId="LiveId" clId="{B85301CE-5477-420D-98B8-2A5B4FD7B43E}" dt="2024-08-09T02:00:44.354" v="37"/>
@@ -280,12 +369,28 @@
           <pc:sldMk cId="673990641" sldId="264"/>
         </pc:sldMkLst>
       </pc:sldChg>
-      <pc:sldChg chg="add">
-        <pc:chgData name="민서 오" userId="7d89e7b822021c56" providerId="LiveId" clId="{B85301CE-5477-420D-98B8-2A5B4FD7B43E}" dt="2024-08-09T02:00:49.741" v="40"/>
+      <pc:sldChg chg="addSp delSp modSp add mod">
+        <pc:chgData name="민서 오" userId="7d89e7b822021c56" providerId="LiveId" clId="{B85301CE-5477-420D-98B8-2A5B4FD7B43E}" dt="2024-08-09T04:27:57.204" v="232" actId="207"/>
         <pc:sldMkLst>
           <pc:docMk/>
           <pc:sldMk cId="1713032812" sldId="264"/>
         </pc:sldMkLst>
+        <pc:spChg chg="del">
+          <ac:chgData name="민서 오" userId="7d89e7b822021c56" providerId="LiveId" clId="{B85301CE-5477-420D-98B8-2A5B4FD7B43E}" dt="2024-08-09T04:27:37.615" v="218" actId="478"/>
+          <ac:spMkLst>
+            <pc:docMk/>
+            <pc:sldMk cId="1713032812" sldId="264"/>
+            <ac:spMk id="2" creationId="{2DBD04E3-9EC2-05E7-E63E-21975BDAF38E}"/>
+          </ac:spMkLst>
+        </pc:spChg>
+        <pc:spChg chg="add mod">
+          <ac:chgData name="민서 오" userId="7d89e7b822021c56" providerId="LiveId" clId="{B85301CE-5477-420D-98B8-2A5B4FD7B43E}" dt="2024-08-09T04:27:57.204" v="232" actId="207"/>
+          <ac:spMkLst>
+            <pc:docMk/>
+            <pc:sldMk cId="1713032812" sldId="264"/>
+            <ac:spMk id="4" creationId="{264DDDCF-FD89-B702-B57E-0CFABA5DBB1A}"/>
+          </ac:spMkLst>
+        </pc:spChg>
       </pc:sldChg>
       <pc:sldChg chg="add del">
         <pc:chgData name="민서 오" userId="7d89e7b822021c56" providerId="LiveId" clId="{B85301CE-5477-420D-98B8-2A5B4FD7B43E}" dt="2024-08-09T02:00:49.452" v="39" actId="47"/>
@@ -294,19 +399,35 @@
           <pc:sldMk cId="37500532" sldId="265"/>
         </pc:sldMkLst>
       </pc:sldChg>
-      <pc:sldChg chg="add">
-        <pc:chgData name="민서 오" userId="7d89e7b822021c56" providerId="LiveId" clId="{B85301CE-5477-420D-98B8-2A5B4FD7B43E}" dt="2024-08-09T02:00:49.741" v="40"/>
+      <pc:sldChg chg="modSp add mod">
+        <pc:chgData name="민서 오" userId="7d89e7b822021c56" providerId="LiveId" clId="{B85301CE-5477-420D-98B8-2A5B4FD7B43E}" dt="2024-08-09T04:31:15.360" v="301" actId="207"/>
         <pc:sldMkLst>
           <pc:docMk/>
           <pc:sldMk cId="673990641" sldId="265"/>
         </pc:sldMkLst>
+        <pc:spChg chg="mod">
+          <ac:chgData name="민서 오" userId="7d89e7b822021c56" providerId="LiveId" clId="{B85301CE-5477-420D-98B8-2A5B4FD7B43E}" dt="2024-08-09T04:31:15.360" v="301" actId="207"/>
+          <ac:spMkLst>
+            <pc:docMk/>
+            <pc:sldMk cId="673990641" sldId="265"/>
+            <ac:spMk id="8" creationId="{DA61CA4A-AB2A-C92E-CD33-C105F4C92C03}"/>
+          </ac:spMkLst>
+        </pc:spChg>
       </pc:sldChg>
-      <pc:sldChg chg="add">
-        <pc:chgData name="민서 오" userId="7d89e7b822021c56" providerId="LiveId" clId="{B85301CE-5477-420D-98B8-2A5B4FD7B43E}" dt="2024-08-09T02:00:49.741" v="40"/>
+      <pc:sldChg chg="modSp add mod">
+        <pc:chgData name="민서 오" userId="7d89e7b822021c56" providerId="LiveId" clId="{B85301CE-5477-420D-98B8-2A5B4FD7B43E}" dt="2024-08-09T04:30:44.833" v="288" actId="207"/>
         <pc:sldMkLst>
           <pc:docMk/>
           <pc:sldMk cId="37500532" sldId="266"/>
         </pc:sldMkLst>
+        <pc:spChg chg="mod">
+          <ac:chgData name="민서 오" userId="7d89e7b822021c56" providerId="LiveId" clId="{B85301CE-5477-420D-98B8-2A5B4FD7B43E}" dt="2024-08-09T04:30:44.833" v="288" actId="207"/>
+          <ac:spMkLst>
+            <pc:docMk/>
+            <pc:sldMk cId="37500532" sldId="266"/>
+            <ac:spMk id="2" creationId="{61FCAC99-8559-EFE4-240C-B2AA4B2ABEEC}"/>
+          </ac:spMkLst>
+        </pc:spChg>
       </pc:sldChg>
       <pc:sldChg chg="add del">
         <pc:chgData name="민서 오" userId="7d89e7b822021c56" providerId="LiveId" clId="{B85301CE-5477-420D-98B8-2A5B4FD7B43E}" dt="2024-08-09T02:00:49.452" v="39" actId="47"/>
@@ -315,19 +436,35 @@
           <pc:sldMk cId="2739686958" sldId="266"/>
         </pc:sldMkLst>
       </pc:sldChg>
-      <pc:sldChg chg="add del">
-        <pc:chgData name="민서 오" userId="7d89e7b822021c56" providerId="LiveId" clId="{B85301CE-5477-420D-98B8-2A5B4FD7B43E}" dt="2024-08-09T02:00:49.741" v="40"/>
+      <pc:sldChg chg="modSp add del mod">
+        <pc:chgData name="민서 오" userId="7d89e7b822021c56" providerId="LiveId" clId="{B85301CE-5477-420D-98B8-2A5B4FD7B43E}" dt="2024-08-09T04:31:04.117" v="297" actId="207"/>
         <pc:sldMkLst>
           <pc:docMk/>
           <pc:sldMk cId="3281594670" sldId="267"/>
         </pc:sldMkLst>
+        <pc:spChg chg="mod">
+          <ac:chgData name="민서 오" userId="7d89e7b822021c56" providerId="LiveId" clId="{B85301CE-5477-420D-98B8-2A5B4FD7B43E}" dt="2024-08-09T04:31:04.117" v="297" actId="207"/>
+          <ac:spMkLst>
+            <pc:docMk/>
+            <pc:sldMk cId="3281594670" sldId="267"/>
+            <ac:spMk id="4" creationId="{3B092B35-58A6-8C07-03C0-9279B1D20F0D}"/>
+          </ac:spMkLst>
+        </pc:spChg>
       </pc:sldChg>
-      <pc:sldChg chg="add">
-        <pc:chgData name="민서 오" userId="7d89e7b822021c56" providerId="LiveId" clId="{B85301CE-5477-420D-98B8-2A5B4FD7B43E}" dt="2024-08-09T02:00:49.741" v="40"/>
+      <pc:sldChg chg="modSp add mod">
+        <pc:chgData name="민서 오" userId="7d89e7b822021c56" providerId="LiveId" clId="{B85301CE-5477-420D-98B8-2A5B4FD7B43E}" dt="2024-08-09T04:31:10.089" v="300" actId="207"/>
         <pc:sldMkLst>
           <pc:docMk/>
           <pc:sldMk cId="2739686958" sldId="268"/>
         </pc:sldMkLst>
+        <pc:spChg chg="mod">
+          <ac:chgData name="민서 오" userId="7d89e7b822021c56" providerId="LiveId" clId="{B85301CE-5477-420D-98B8-2A5B4FD7B43E}" dt="2024-08-09T04:31:10.089" v="300" actId="207"/>
+          <ac:spMkLst>
+            <pc:docMk/>
+            <pc:sldMk cId="2739686958" sldId="268"/>
+            <ac:spMk id="2" creationId="{79D497B1-52CA-BEE2-76AC-7833AF082841}"/>
+          </ac:spMkLst>
+        </pc:spChg>
       </pc:sldChg>
       <pc:sldChg chg="add del">
         <pc:chgData name="민서 오" userId="7d89e7b822021c56" providerId="LiveId" clId="{B85301CE-5477-420D-98B8-2A5B4FD7B43E}" dt="2024-08-09T02:00:49.452" v="39" actId="47"/>
@@ -343,19 +480,67 @@
           <pc:sldMk cId="2506622858" sldId="269"/>
         </pc:sldMkLst>
       </pc:sldChg>
-      <pc:sldChg chg="add">
-        <pc:chgData name="민서 오" userId="7d89e7b822021c56" providerId="LiveId" clId="{B85301CE-5477-420D-98B8-2A5B4FD7B43E}" dt="2024-08-09T02:00:49.741" v="40"/>
+      <pc:sldChg chg="addSp delSp modSp add mod">
+        <pc:chgData name="민서 오" userId="7d89e7b822021c56" providerId="LiveId" clId="{B85301CE-5477-420D-98B8-2A5B4FD7B43E}" dt="2024-08-09T09:27:19.103" v="340" actId="1076"/>
         <pc:sldMkLst>
           <pc:docMk/>
           <pc:sldMk cId="3285401794" sldId="269"/>
         </pc:sldMkLst>
+        <pc:spChg chg="mod">
+          <ac:chgData name="민서 오" userId="7d89e7b822021c56" providerId="LiveId" clId="{B85301CE-5477-420D-98B8-2A5B4FD7B43E}" dt="2024-08-09T04:31:28.919" v="306" actId="207"/>
+          <ac:spMkLst>
+            <pc:docMk/>
+            <pc:sldMk cId="3285401794" sldId="269"/>
+            <ac:spMk id="4" creationId="{54CE3854-7E54-1AF6-0859-C4827976A894}"/>
+          </ac:spMkLst>
+        </pc:spChg>
+        <pc:picChg chg="add mod">
+          <ac:chgData name="민서 오" userId="7d89e7b822021c56" providerId="LiveId" clId="{B85301CE-5477-420D-98B8-2A5B4FD7B43E}" dt="2024-08-09T09:27:19.103" v="340" actId="1076"/>
+          <ac:picMkLst>
+            <pc:docMk/>
+            <pc:sldMk cId="3285401794" sldId="269"/>
+            <ac:picMk id="3" creationId="{A72CA37F-405D-1FB9-D534-888F53397783}"/>
+          </ac:picMkLst>
+        </pc:picChg>
+        <pc:picChg chg="del">
+          <ac:chgData name="민서 오" userId="7d89e7b822021c56" providerId="LiveId" clId="{B85301CE-5477-420D-98B8-2A5B4FD7B43E}" dt="2024-08-09T09:26:46.570" v="324" actId="478"/>
+          <ac:picMkLst>
+            <pc:docMk/>
+            <pc:sldMk cId="3285401794" sldId="269"/>
+            <ac:picMk id="6" creationId="{FD819842-48CB-2EE2-AB8B-A3DBE097DB55}"/>
+          </ac:picMkLst>
+        </pc:picChg>
       </pc:sldChg>
-      <pc:sldChg chg="add">
-        <pc:chgData name="민서 오" userId="7d89e7b822021c56" providerId="LiveId" clId="{B85301CE-5477-420D-98B8-2A5B4FD7B43E}" dt="2024-08-09T02:00:49.741" v="40"/>
+      <pc:sldChg chg="addSp delSp modSp add mod">
+        <pc:chgData name="민서 오" userId="7d89e7b822021c56" providerId="LiveId" clId="{B85301CE-5477-420D-98B8-2A5B4FD7B43E}" dt="2024-08-09T09:27:25.128" v="342" actId="1076"/>
         <pc:sldMkLst>
           <pc:docMk/>
           <pc:sldMk cId="2506622858" sldId="270"/>
         </pc:sldMkLst>
+        <pc:spChg chg="mod">
+          <ac:chgData name="민서 오" userId="7d89e7b822021c56" providerId="LiveId" clId="{B85301CE-5477-420D-98B8-2A5B4FD7B43E}" dt="2024-08-09T04:31:34.234" v="309" actId="207"/>
+          <ac:spMkLst>
+            <pc:docMk/>
+            <pc:sldMk cId="2506622858" sldId="270"/>
+            <ac:spMk id="4" creationId="{54CE3854-7E54-1AF6-0859-C4827976A894}"/>
+          </ac:spMkLst>
+        </pc:spChg>
+        <pc:picChg chg="add mod">
+          <ac:chgData name="민서 오" userId="7d89e7b822021c56" providerId="LiveId" clId="{B85301CE-5477-420D-98B8-2A5B4FD7B43E}" dt="2024-08-09T09:27:25.128" v="342" actId="1076"/>
+          <ac:picMkLst>
+            <pc:docMk/>
+            <pc:sldMk cId="2506622858" sldId="270"/>
+            <ac:picMk id="3" creationId="{DBBF2A47-743A-1F71-6B7A-88DE63EFBCF2}"/>
+          </ac:picMkLst>
+        </pc:picChg>
+        <pc:picChg chg="del">
+          <ac:chgData name="민서 오" userId="7d89e7b822021c56" providerId="LiveId" clId="{B85301CE-5477-420D-98B8-2A5B4FD7B43E}" dt="2024-08-09T09:26:55.795" v="327" actId="478"/>
+          <ac:picMkLst>
+            <pc:docMk/>
+            <pc:sldMk cId="2506622858" sldId="270"/>
+            <ac:picMk id="10" creationId="{D0225500-72C1-4F42-238A-3F1FC84C989F}"/>
+          </ac:picMkLst>
+        </pc:picChg>
       </pc:sldChg>
       <pc:sldChg chg="add del">
         <pc:chgData name="민서 오" userId="7d89e7b822021c56" providerId="LiveId" clId="{B85301CE-5477-420D-98B8-2A5B4FD7B43E}" dt="2024-08-09T02:00:49.452" v="39" actId="47"/>
@@ -364,12 +549,36 @@
           <pc:sldMk cId="2506723362" sldId="270"/>
         </pc:sldMkLst>
       </pc:sldChg>
-      <pc:sldChg chg="add">
-        <pc:chgData name="민서 오" userId="7d89e7b822021c56" providerId="LiveId" clId="{B85301CE-5477-420D-98B8-2A5B4FD7B43E}" dt="2024-08-09T02:00:49.741" v="40"/>
+      <pc:sldChg chg="addSp delSp modSp add mod">
+        <pc:chgData name="민서 오" userId="7d89e7b822021c56" providerId="LiveId" clId="{B85301CE-5477-420D-98B8-2A5B4FD7B43E}" dt="2024-08-09T09:27:33.231" v="345" actId="1076"/>
         <pc:sldMkLst>
           <pc:docMk/>
           <pc:sldMk cId="2506723362" sldId="271"/>
         </pc:sldMkLst>
+        <pc:spChg chg="mod">
+          <ac:chgData name="민서 오" userId="7d89e7b822021c56" providerId="LiveId" clId="{B85301CE-5477-420D-98B8-2A5B4FD7B43E}" dt="2024-08-09T04:31:41.179" v="316" actId="20577"/>
+          <ac:spMkLst>
+            <pc:docMk/>
+            <pc:sldMk cId="2506723362" sldId="271"/>
+            <ac:spMk id="4" creationId="{54CE3854-7E54-1AF6-0859-C4827976A894}"/>
+          </ac:spMkLst>
+        </pc:spChg>
+        <pc:picChg chg="del">
+          <ac:chgData name="민서 오" userId="7d89e7b822021c56" providerId="LiveId" clId="{B85301CE-5477-420D-98B8-2A5B4FD7B43E}" dt="2024-08-09T09:27:02.715" v="331" actId="478"/>
+          <ac:picMkLst>
+            <pc:docMk/>
+            <pc:sldMk cId="2506723362" sldId="271"/>
+            <ac:picMk id="3" creationId="{93288F6E-C742-4B3C-A078-14FF104C8F84}"/>
+          </ac:picMkLst>
+        </pc:picChg>
+        <pc:picChg chg="add mod">
+          <ac:chgData name="민서 오" userId="7d89e7b822021c56" providerId="LiveId" clId="{B85301CE-5477-420D-98B8-2A5B4FD7B43E}" dt="2024-08-09T09:27:33.231" v="345" actId="1076"/>
+          <ac:picMkLst>
+            <pc:docMk/>
+            <pc:sldMk cId="2506723362" sldId="271"/>
+            <ac:picMk id="5" creationId="{019F5293-9F6D-3905-598B-AC3C930C1B9C}"/>
+          </ac:picMkLst>
+        </pc:picChg>
       </pc:sldChg>
       <pc:sldChg chg="add del">
         <pc:chgData name="민서 오" userId="7d89e7b822021c56" providerId="LiveId" clId="{B85301CE-5477-420D-98B8-2A5B4FD7B43E}" dt="2024-08-09T02:00:49.452" v="39" actId="47"/>
@@ -378,12 +587,36 @@
           <pc:sldMk cId="2656696961" sldId="271"/>
         </pc:sldMkLst>
       </pc:sldChg>
-      <pc:sldChg chg="add">
-        <pc:chgData name="민서 오" userId="7d89e7b822021c56" providerId="LiveId" clId="{B85301CE-5477-420D-98B8-2A5B4FD7B43E}" dt="2024-08-09T02:00:49.741" v="40"/>
+      <pc:sldChg chg="addSp delSp modSp add mod">
+        <pc:chgData name="민서 오" userId="7d89e7b822021c56" providerId="LiveId" clId="{B85301CE-5477-420D-98B8-2A5B4FD7B43E}" dt="2024-08-09T09:27:39.832" v="347" actId="1076"/>
         <pc:sldMkLst>
           <pc:docMk/>
           <pc:sldMk cId="2656696961" sldId="272"/>
         </pc:sldMkLst>
+        <pc:spChg chg="mod">
+          <ac:chgData name="민서 오" userId="7d89e7b822021c56" providerId="LiveId" clId="{B85301CE-5477-420D-98B8-2A5B4FD7B43E}" dt="2024-08-09T04:31:48.265" v="323" actId="20577"/>
+          <ac:spMkLst>
+            <pc:docMk/>
+            <pc:sldMk cId="2656696961" sldId="272"/>
+            <ac:spMk id="4" creationId="{54CE3854-7E54-1AF6-0859-C4827976A894}"/>
+          </ac:spMkLst>
+        </pc:spChg>
+        <pc:picChg chg="add mod">
+          <ac:chgData name="민서 오" userId="7d89e7b822021c56" providerId="LiveId" clId="{B85301CE-5477-420D-98B8-2A5B4FD7B43E}" dt="2024-08-09T09:27:39.832" v="347" actId="1076"/>
+          <ac:picMkLst>
+            <pc:docMk/>
+            <pc:sldMk cId="2656696961" sldId="272"/>
+            <ac:picMk id="3" creationId="{6F909E1C-13C8-12F8-012C-610B17FEB63B}"/>
+          </ac:picMkLst>
+        </pc:picChg>
+        <pc:picChg chg="del">
+          <ac:chgData name="민서 오" userId="7d89e7b822021c56" providerId="LiveId" clId="{B85301CE-5477-420D-98B8-2A5B4FD7B43E}" dt="2024-08-09T09:27:06.330" v="335" actId="478"/>
+          <ac:picMkLst>
+            <pc:docMk/>
+            <pc:sldMk cId="2656696961" sldId="272"/>
+            <ac:picMk id="8" creationId="{8236B02E-CDE5-225E-DFBC-B4457051CCA8}"/>
+          </ac:picMkLst>
+        </pc:picChg>
       </pc:sldChg>
     </pc:docChg>
   </pc:docChgLst>
@@ -3631,19 +3864,35 @@
               <a:defRPr/>
             </a:pPr>
             <a:r>
-              <a:rPr lang="en-US" altLang="ko-KR" sz="3000" b="1" dirty="0"/>
+              <a:rPr lang="en-US" altLang="ko-KR" sz="3000" b="1" dirty="0">
+                <a:highlight>
+                  <a:srgbClr val="FFFF00"/>
+                </a:highlight>
+              </a:rPr>
               <a:t>- h (</a:t>
             </a:r>
             <a:r>
-              <a:rPr lang="ko-KR" altLang="en-US" sz="3000" b="1" dirty="0" err="1"/>
+              <a:rPr lang="ko-KR" altLang="en-US" sz="3000" b="1" dirty="0" err="1">
+                <a:highlight>
+                  <a:srgbClr val="FFFF00"/>
+                </a:highlight>
+              </a:rPr>
               <a:t>핑거</a:t>
             </a:r>
             <a:r>
-              <a:rPr lang="ko-KR" altLang="en-US" sz="3000" b="1" dirty="0"/>
+              <a:rPr lang="ko-KR" altLang="en-US" sz="3000" b="1" dirty="0">
+                <a:highlight>
+                  <a:srgbClr val="FFFF00"/>
+                </a:highlight>
+              </a:rPr>
               <a:t> 높이</a:t>
             </a:r>
             <a:r>
-              <a:rPr lang="en-US" altLang="ko-KR" sz="3000" b="1" dirty="0"/>
+              <a:rPr lang="en-US" altLang="ko-KR" sz="3000" b="1" dirty="0">
+                <a:highlight>
+                  <a:srgbClr val="FFFF00"/>
+                </a:highlight>
+              </a:rPr>
               <a:t>) :</a:t>
             </a:r>
           </a:p>
@@ -3653,7 +3902,11 @@
               <a:defRPr/>
             </a:pPr>
             <a:r>
-              <a:rPr lang="en-US" altLang="ko-KR" sz="3000" b="1" dirty="0"/>
+              <a:rPr lang="en-US" altLang="ko-KR" sz="3000" b="1" dirty="0">
+                <a:highlight>
+                  <a:srgbClr val="FFFF00"/>
+                </a:highlight>
+              </a:rPr>
               <a:t>9mm 12mm 15mm 18mm 21mm 24mm 27mm</a:t>
             </a:r>
           </a:p>
@@ -3731,10 +3984,37 @@
               <a:defRPr/>
             </a:pPr>
             <a:r>
-              <a:rPr lang="en-US" altLang="ko-KR" sz="3000" b="1"/>
-              <a:t>18, 21, 24, 27, 30, 33mm</a:t>
-            </a:r>
-            <a:endParaRPr lang="en-US" altLang="ko-KR" sz="3000" b="1" dirty="0"/>
+              <a:rPr lang="en-US" altLang="ko-KR" sz="3000" b="1" dirty="0">
+                <a:highlight>
+                  <a:srgbClr val="FFFF00"/>
+                </a:highlight>
+              </a:rPr>
+              <a:t>18, </a:t>
+            </a:r>
+            <a:r>
+              <a:rPr lang="en-US" altLang="ko-KR" sz="3000" b="1" dirty="0"/>
+              <a:t>21, </a:t>
+            </a:r>
+            <a:r>
+              <a:rPr lang="en-US" altLang="ko-KR" sz="3000" b="1" dirty="0">
+                <a:highlight>
+                  <a:srgbClr val="FFFF00"/>
+                </a:highlight>
+              </a:rPr>
+              <a:t>24, </a:t>
+            </a:r>
+            <a:r>
+              <a:rPr lang="en-US" altLang="ko-KR" sz="3000" b="1" dirty="0"/>
+              <a:t>27, 30, </a:t>
+            </a:r>
+            <a:r>
+              <a:rPr lang="en-US" altLang="ko-KR" sz="3000" b="1" dirty="0">
+                <a:highlight>
+                  <a:srgbClr val="FFFF00"/>
+                </a:highlight>
+              </a:rPr>
+              <a:t>33mm</a:t>
+            </a:r>
           </a:p>
           <a:p>
             <a:pPr marL="0" indent="0">
@@ -3749,22 +4029,42 @@
               <a:defRPr/>
             </a:pPr>
             <a:r>
-              <a:rPr lang="en-US" altLang="ko-KR" sz="3000" b="1" dirty="0"/>
+              <a:rPr lang="en-US" altLang="ko-KR" sz="3000" b="1" dirty="0">
+                <a:highlight>
+                  <a:srgbClr val="FFFF00"/>
+                </a:highlight>
+              </a:rPr>
               <a:t>- t (</a:t>
             </a:r>
             <a:r>
-              <a:rPr lang="ko-KR" altLang="en-US" sz="3000" b="1" dirty="0"/>
+              <a:rPr lang="ko-KR" altLang="en-US" sz="3000" b="1" dirty="0">
+                <a:highlight>
+                  <a:srgbClr val="FFFF00"/>
+                </a:highlight>
+              </a:rPr>
               <a:t>얇은 부분 </a:t>
             </a:r>
             <a:r>
-              <a:rPr lang="en-US" altLang="ko-KR" sz="3000" b="1" dirty="0"/>
+              <a:rPr lang="en-US" altLang="ko-KR" sz="3000" b="1" dirty="0">
+                <a:highlight>
+                  <a:srgbClr val="FFFF00"/>
+                </a:highlight>
+              </a:rPr>
               <a:t>thickness) : 18mm</a:t>
             </a:r>
             <a:r>
-              <a:rPr lang="ko-KR" altLang="en-US" sz="3000" b="1" dirty="0"/>
+              <a:rPr lang="ko-KR" altLang="en-US" sz="3000" b="1" dirty="0">
+                <a:highlight>
+                  <a:srgbClr val="FFFF00"/>
+                </a:highlight>
+              </a:rPr>
               <a:t> 대해서</a:t>
             </a:r>
-            <a:endParaRPr lang="en-US" altLang="ko-KR" sz="3000" b="1" dirty="0"/>
+            <a:endParaRPr lang="en-US" altLang="ko-KR" sz="3000" b="1" dirty="0">
+              <a:highlight>
+                <a:srgbClr val="FFFF00"/>
+              </a:highlight>
+            </a:endParaRPr>
           </a:p>
           <a:p>
             <a:pPr marL="0" indent="0">
@@ -3772,7 +4072,11 @@
               <a:defRPr/>
             </a:pPr>
             <a:r>
-              <a:rPr lang="en-US" altLang="ko-KR" sz="3000" b="1" dirty="0"/>
+              <a:rPr lang="en-US" altLang="ko-KR" sz="3000" b="1" dirty="0">
+                <a:highlight>
+                  <a:srgbClr val="FFFF00"/>
+                </a:highlight>
+              </a:rPr>
               <a:t>0.5mm 0.6mm 0.7mm 0.8mm 0.9mm</a:t>
             </a:r>
           </a:p>
@@ -3826,7 +4130,7 @@
         <p:spPr>
           <a:xfrm>
             <a:off x="1887059" y="127819"/>
-            <a:ext cx="8417882" cy="830997"/>
+            <a:ext cx="8463151" cy="830997"/>
           </a:xfrm>
           <a:prstGeom prst="rect">
             <a:avLst/>
@@ -3840,8 +4144,16 @@
           <a:lstStyle/>
           <a:p>
             <a:r>
+              <a:rPr lang="en-US" altLang="ko-KR" sz="4800" b="1" dirty="0" err="1">
+                <a:solidFill>
+                  <a:srgbClr val="FF0000"/>
+                </a:solidFill>
+              </a:rPr>
+              <a:t>DP</a:t>
+            </a:r>
+            <a:r>
               <a:rPr lang="en-US" altLang="ko-KR" sz="4800" b="1" dirty="0" err="1"/>
-              <a:t>dpcase</a:t>
+              <a:t>case</a:t>
             </a:r>
             <a:r>
               <a:rPr lang="ko-KR" altLang="en-US" sz="4800" b="1" dirty="0"/>
@@ -3951,7 +4263,7 @@
         <p:spPr>
           <a:xfrm>
             <a:off x="1887059" y="127819"/>
-            <a:ext cx="8408264" cy="830997"/>
+            <a:ext cx="8455135" cy="830997"/>
           </a:xfrm>
           <a:prstGeom prst="rect">
             <a:avLst/>
@@ -3965,8 +4277,16 @@
           <a:lstStyle/>
           <a:p>
             <a:r>
+              <a:rPr lang="en-US" altLang="ko-KR" sz="4800" b="1" dirty="0" err="1">
+                <a:solidFill>
+                  <a:srgbClr val="FF0000"/>
+                </a:solidFill>
+              </a:rPr>
+              <a:t>UP</a:t>
+            </a:r>
+            <a:r>
               <a:rPr lang="en-US" altLang="ko-KR" sz="4800" b="1" dirty="0" err="1"/>
-              <a:t>upcase</a:t>
+              <a:t>case</a:t>
             </a:r>
             <a:r>
               <a:rPr lang="ko-KR" altLang="en-US" sz="4800" b="1" dirty="0"/>
@@ -4076,7 +4396,7 @@
         <p:spPr>
           <a:xfrm>
             <a:off x="1887059" y="127819"/>
-            <a:ext cx="8406660" cy="830997"/>
+            <a:ext cx="8595815" cy="830997"/>
           </a:xfrm>
           <a:prstGeom prst="rect">
             <a:avLst/>
@@ -4090,8 +4410,16 @@
           <a:lstStyle/>
           <a:p>
             <a:r>
+              <a:rPr lang="en-US" altLang="ko-KR" sz="4800" b="1" dirty="0" err="1">
+                <a:solidFill>
+                  <a:srgbClr val="00B0F0"/>
+                </a:solidFill>
+              </a:rPr>
+              <a:t>DN</a:t>
+            </a:r>
+            <a:r>
               <a:rPr lang="en-US" altLang="ko-KR" sz="4800" b="1" dirty="0" err="1"/>
-              <a:t>dncase</a:t>
+              <a:t>case</a:t>
             </a:r>
             <a:r>
               <a:rPr lang="ko-KR" altLang="en-US" sz="4800" b="1" dirty="0"/>
@@ -4253,7 +4581,7 @@
         <p:spPr>
           <a:xfrm>
             <a:off x="1887059" y="127819"/>
-            <a:ext cx="8397042" cy="830997"/>
+            <a:ext cx="8587800" cy="830997"/>
           </a:xfrm>
           <a:prstGeom prst="rect">
             <a:avLst/>
@@ -4267,8 +4595,16 @@
           <a:lstStyle/>
           <a:p>
             <a:r>
-              <a:rPr lang="en-US" altLang="ko-KR" sz="4800" b="1" dirty="0"/>
-              <a:t>uncase</a:t>
+              <a:rPr lang="en-US" altLang="ko-KR" sz="4800" b="1" dirty="0" err="1">
+                <a:solidFill>
+                  <a:srgbClr val="00B0F0"/>
+                </a:solidFill>
+              </a:rPr>
+              <a:t>UN</a:t>
+            </a:r>
+            <a:r>
+              <a:rPr lang="en-US" altLang="ko-KR" sz="4800" b="1" dirty="0" err="1"/>
+              <a:t>case</a:t>
             </a:r>
             <a:r>
               <a:rPr lang="ko-KR" altLang="en-US" sz="4800" b="1" dirty="0"/>
@@ -4430,7 +4766,7 @@
         <p:spPr>
           <a:xfrm>
             <a:off x="1887059" y="127819"/>
-            <a:ext cx="8327023" cy="830997"/>
+            <a:ext cx="8372292" cy="830997"/>
           </a:xfrm>
           <a:prstGeom prst="rect">
             <a:avLst/>
@@ -4444,8 +4780,16 @@
           <a:lstStyle/>
           <a:p>
             <a:r>
+              <a:rPr lang="en-US" altLang="ko-KR" sz="4800" b="1" dirty="0" err="1">
+                <a:solidFill>
+                  <a:srgbClr val="FF0000"/>
+                </a:solidFill>
+              </a:rPr>
+              <a:t>DP</a:t>
+            </a:r>
+            <a:r>
               <a:rPr lang="en-US" altLang="ko-KR" sz="4800" b="1" dirty="0" err="1"/>
-              <a:t>dpcase</a:t>
+              <a:t>case</a:t>
             </a:r>
             <a:r>
               <a:rPr lang="ko-KR" altLang="en-US" sz="4800" b="1" dirty="0"/>
@@ -4476,10 +4820,10 @@
       </p:sp>
       <p:pic>
         <p:nvPicPr>
-          <p:cNvPr id="6" name="그림 5" descr="텍스트, 라인, 도표, 그래프이(가) 표시된 사진&#10;&#10;자동 생성된 설명">
-            <a:extLst>
-              <a:ext uri="{FF2B5EF4-FFF2-40B4-BE49-F238E27FC236}">
-                <a16:creationId xmlns:a16="http://schemas.microsoft.com/office/drawing/2014/main" id="{FD819842-48CB-2EE2-AB8B-A3DBE097DB55}"/>
+          <p:cNvPr id="3" name="그림 2" descr="텍스트, 라인, 도표, 그래프이(가) 표시된 사진&#10;&#10;자동 생성된 설명">
+            <a:extLst>
+              <a:ext uri="{FF2B5EF4-FFF2-40B4-BE49-F238E27FC236}">
+                <a16:creationId xmlns:a16="http://schemas.microsoft.com/office/drawing/2014/main" id="{A72CA37F-405D-1FB9-D534-888F53397783}"/>
               </a:ext>
             </a:extLst>
           </p:cNvPr>
@@ -4502,8 +4846,8 @@
         </p:blipFill>
         <p:spPr>
           <a:xfrm>
-            <a:off x="1523991" y="1243770"/>
-            <a:ext cx="9144018" cy="5486411"/>
+            <a:off x="1573205" y="1330181"/>
+            <a:ext cx="9000000" cy="5400000"/>
           </a:xfrm>
           <a:prstGeom prst="rect">
             <a:avLst/>
@@ -4555,7 +4899,7 @@
         <p:spPr>
           <a:xfrm>
             <a:off x="1887059" y="127819"/>
-            <a:ext cx="8408264" cy="830997"/>
+            <a:ext cx="8364277" cy="830997"/>
           </a:xfrm>
           <a:prstGeom prst="rect">
             <a:avLst/>
@@ -4569,8 +4913,16 @@
           <a:lstStyle/>
           <a:p>
             <a:r>
+              <a:rPr lang="en-US" altLang="ko-KR" sz="4800" b="1" dirty="0" err="1">
+                <a:solidFill>
+                  <a:srgbClr val="FF0000"/>
+                </a:solidFill>
+              </a:rPr>
+              <a:t>UP</a:t>
+            </a:r>
+            <a:r>
               <a:rPr lang="en-US" altLang="ko-KR" sz="4800" b="1" dirty="0" err="1"/>
-              <a:t>upcase</a:t>
+              <a:t>case</a:t>
             </a:r>
             <a:r>
               <a:rPr lang="ko-KR" altLang="en-US" sz="4800" b="1" dirty="0"/>
@@ -4601,10 +4953,10 @@
       </p:sp>
       <p:pic>
         <p:nvPicPr>
-          <p:cNvPr id="10" name="그림 9" descr="라인, 텍스트, 도표, 그래프이(가) 표시된 사진&#10;&#10;자동 생성된 설명">
-            <a:extLst>
-              <a:ext uri="{FF2B5EF4-FFF2-40B4-BE49-F238E27FC236}">
-                <a16:creationId xmlns:a16="http://schemas.microsoft.com/office/drawing/2014/main" id="{D0225500-72C1-4F42-238A-3F1FC84C989F}"/>
+          <p:cNvPr id="3" name="그림 2" descr="라인, 텍스트, 도표, 그래프이(가) 표시된 사진&#10;&#10;자동 생성된 설명">
+            <a:extLst>
+              <a:ext uri="{FF2B5EF4-FFF2-40B4-BE49-F238E27FC236}">
+                <a16:creationId xmlns:a16="http://schemas.microsoft.com/office/drawing/2014/main" id="{DBBF2A47-743A-1F71-6B7A-88DE63EFBCF2}"/>
               </a:ext>
             </a:extLst>
           </p:cNvPr>
@@ -4627,8 +4979,8 @@
         </p:blipFill>
         <p:spPr>
           <a:xfrm>
-            <a:off x="1519182" y="1243770"/>
-            <a:ext cx="9144018" cy="5486411"/>
+            <a:off x="1596000" y="1330181"/>
+            <a:ext cx="9000000" cy="5400000"/>
           </a:xfrm>
           <a:prstGeom prst="rect">
             <a:avLst/>
@@ -4680,7 +5032,7 @@
         <p:spPr>
           <a:xfrm>
             <a:off x="1887059" y="127819"/>
-            <a:ext cx="8406660" cy="830997"/>
+            <a:ext cx="8504957" cy="830997"/>
           </a:xfrm>
           <a:prstGeom prst="rect">
             <a:avLst/>
@@ -4694,8 +5046,16 @@
           <a:lstStyle/>
           <a:p>
             <a:r>
+              <a:rPr lang="en-US" altLang="ko-KR" sz="4800" b="1" dirty="0" err="1">
+                <a:solidFill>
+                  <a:srgbClr val="00B0F0"/>
+                </a:solidFill>
+              </a:rPr>
+              <a:t>DN</a:t>
+            </a:r>
+            <a:r>
               <a:rPr lang="en-US" altLang="ko-KR" sz="4800" b="1" dirty="0" err="1"/>
-              <a:t>dncase</a:t>
+              <a:t>case</a:t>
             </a:r>
             <a:r>
               <a:rPr lang="ko-KR" altLang="en-US" sz="4800" b="1" dirty="0"/>
@@ -4726,10 +5086,10 @@
       </p:sp>
       <p:pic>
         <p:nvPicPr>
-          <p:cNvPr id="3" name="그림 2" descr="텍스트, 라인, 도표, 그래프이(가) 표시된 사진&#10;&#10;자동 생성된 설명">
-            <a:extLst>
-              <a:ext uri="{FF2B5EF4-FFF2-40B4-BE49-F238E27FC236}">
-                <a16:creationId xmlns:a16="http://schemas.microsoft.com/office/drawing/2014/main" id="{93288F6E-C742-4B3C-A078-14FF104C8F84}"/>
+          <p:cNvPr id="5" name="그림 4" descr="텍스트, 라인, 도표, 그래프이(가) 표시된 사진&#10;&#10;자동 생성된 설명">
+            <a:extLst>
+              <a:ext uri="{FF2B5EF4-FFF2-40B4-BE49-F238E27FC236}">
+                <a16:creationId xmlns:a16="http://schemas.microsoft.com/office/drawing/2014/main" id="{019F5293-9F6D-3905-598B-AC3C930C1B9C}"/>
               </a:ext>
             </a:extLst>
           </p:cNvPr>
@@ -4752,8 +5112,8 @@
         </p:blipFill>
         <p:spPr>
           <a:xfrm>
-            <a:off x="1518380" y="1243770"/>
-            <a:ext cx="9144018" cy="5486411"/>
+            <a:off x="1639537" y="1330181"/>
+            <a:ext cx="9000000" cy="5400000"/>
           </a:xfrm>
           <a:prstGeom prst="rect">
             <a:avLst/>
@@ -4805,7 +5165,7 @@
         <p:spPr>
           <a:xfrm>
             <a:off x="1887059" y="127819"/>
-            <a:ext cx="8397042" cy="830997"/>
+            <a:ext cx="8496941" cy="830997"/>
           </a:xfrm>
           <a:prstGeom prst="rect">
             <a:avLst/>
@@ -4819,8 +5179,16 @@
           <a:lstStyle/>
           <a:p>
             <a:r>
-              <a:rPr lang="en-US" altLang="ko-KR" sz="4800" b="1" dirty="0"/>
-              <a:t>uncase</a:t>
+              <a:rPr lang="en-US" altLang="ko-KR" sz="4800" b="1" dirty="0" err="1">
+                <a:solidFill>
+                  <a:srgbClr val="00B0F0"/>
+                </a:solidFill>
+              </a:rPr>
+              <a:t>UN</a:t>
+            </a:r>
+            <a:r>
+              <a:rPr lang="en-US" altLang="ko-KR" sz="4800" b="1" dirty="0" err="1"/>
+              <a:t>case</a:t>
             </a:r>
             <a:r>
               <a:rPr lang="ko-KR" altLang="en-US" sz="4800" b="1" dirty="0"/>
@@ -4851,10 +5219,10 @@
       </p:sp>
       <p:pic>
         <p:nvPicPr>
-          <p:cNvPr id="8" name="그림 7" descr="텍스트, 라인, 도표, 그래프이(가) 표시된 사진&#10;&#10;자동 생성된 설명">
-            <a:extLst>
-              <a:ext uri="{FF2B5EF4-FFF2-40B4-BE49-F238E27FC236}">
-                <a16:creationId xmlns:a16="http://schemas.microsoft.com/office/drawing/2014/main" id="{8236B02E-CDE5-225E-DFBC-B4457051CCA8}"/>
+          <p:cNvPr id="3" name="그림 2" descr="텍스트, 라인, 도표, 그래프이(가) 표시된 사진&#10;&#10;자동 생성된 설명">
+            <a:extLst>
+              <a:ext uri="{FF2B5EF4-FFF2-40B4-BE49-F238E27FC236}">
+                <a16:creationId xmlns:a16="http://schemas.microsoft.com/office/drawing/2014/main" id="{6F909E1C-13C8-12F8-012C-610B17FEB63B}"/>
               </a:ext>
             </a:extLst>
           </p:cNvPr>
@@ -4877,8 +5245,8 @@
         </p:blipFill>
         <p:spPr>
           <a:xfrm>
-            <a:off x="1523991" y="1243770"/>
-            <a:ext cx="9144018" cy="5486411"/>
+            <a:off x="1596000" y="1330181"/>
+            <a:ext cx="9000000" cy="5400000"/>
           </a:xfrm>
           <a:prstGeom prst="rect">
             <a:avLst/>
@@ -6354,10 +6722,10 @@
       </p:pic>
       <p:sp>
         <p:nvSpPr>
-          <p:cNvPr id="3" name="TextBox 2">
-            <a:extLst>
-              <a:ext uri="{FF2B5EF4-FFF2-40B4-BE49-F238E27FC236}">
-                <a16:creationId xmlns:a16="http://schemas.microsoft.com/office/drawing/2014/main" id="{93F4DC52-D434-8EE5-AF24-314F12592CF7}"/>
+          <p:cNvPr id="2" name="TextBox 1">
+            <a:extLst>
+              <a:ext uri="{FF2B5EF4-FFF2-40B4-BE49-F238E27FC236}">
+                <a16:creationId xmlns:a16="http://schemas.microsoft.com/office/drawing/2014/main" id="{ECD948C3-D185-0DED-0C51-D89A4AFE955E}"/>
               </a:ext>
             </a:extLst>
           </p:cNvPr>
@@ -6366,8 +6734,8 @@
         </p:nvSpPr>
         <p:spPr>
           <a:xfrm>
-            <a:off x="5396574" y="385780"/>
-            <a:ext cx="1398851" cy="523220"/>
+            <a:off x="1208549" y="101592"/>
+            <a:ext cx="9774901" cy="1323439"/>
           </a:xfrm>
           <a:prstGeom prst="rect">
             <a:avLst/>
@@ -6382,22 +6750,96 @@
           <a:p>
             <a:pPr algn="ctr"/>
             <a:r>
-              <a:rPr lang="en-US" altLang="ko-KR" sz="2800" b="1" dirty="0" err="1">
+              <a:rPr lang="en-US" altLang="ko-KR" sz="4000" b="1" dirty="0">
+                <a:solidFill>
+                  <a:srgbClr val="00B0F0"/>
+                </a:solidFill>
                 <a:latin typeface="Arial Unicode MS" panose="020B0604020202020204" pitchFamily="50" charset="-127"/>
                 <a:ea typeface="Arial Unicode MS" panose="020B0604020202020204" pitchFamily="50" charset="-127"/>
                 <a:cs typeface="Arial Unicode MS" panose="020B0604020202020204" pitchFamily="50" charset="-127"/>
               </a:rPr>
-              <a:t>dn</a:t>
-            </a:r>
-            <a:r>
-              <a:rPr lang="en-US" altLang="ko-KR" sz="2800" b="1" dirty="0">
+              <a:t>D</a:t>
+            </a:r>
+            <a:r>
+              <a:rPr lang="en-US" altLang="ko-KR" sz="4000" b="1" dirty="0">
                 <a:latin typeface="Arial Unicode MS" panose="020B0604020202020204" pitchFamily="50" charset="-127"/>
                 <a:ea typeface="Arial Unicode MS" panose="020B0604020202020204" pitchFamily="50" charset="-127"/>
                 <a:cs typeface="Arial Unicode MS" panose="020B0604020202020204" pitchFamily="50" charset="-127"/>
               </a:rPr>
-              <a:t> 1st</a:t>
-            </a:r>
-            <a:endParaRPr lang="ko-KR" altLang="en-US" sz="2800" b="1" dirty="0">
+              <a:t>own Position-</a:t>
+            </a:r>
+            <a:r>
+              <a:rPr lang="en-US" altLang="ko-KR" sz="4000" b="1" dirty="0">
+                <a:solidFill>
+                  <a:srgbClr val="00B0F0"/>
+                </a:solidFill>
+                <a:latin typeface="Arial Unicode MS" panose="020B0604020202020204" pitchFamily="50" charset="-127"/>
+                <a:ea typeface="Arial Unicode MS" panose="020B0604020202020204" pitchFamily="50" charset="-127"/>
+                <a:cs typeface="Arial Unicode MS" panose="020B0604020202020204" pitchFamily="50" charset="-127"/>
+              </a:rPr>
+              <a:t>N</a:t>
+            </a:r>
+            <a:r>
+              <a:rPr lang="en-US" altLang="ko-KR" sz="4000" b="1" dirty="0">
+                <a:latin typeface="Arial Unicode MS" panose="020B0604020202020204" pitchFamily="50" charset="-127"/>
+                <a:ea typeface="Arial Unicode MS" panose="020B0604020202020204" pitchFamily="50" charset="-127"/>
+                <a:cs typeface="Arial Unicode MS" panose="020B0604020202020204" pitchFamily="50" charset="-127"/>
+              </a:rPr>
+              <a:t>egative Pressure </a:t>
+            </a:r>
+            <a:r>
+              <a:rPr lang="en-US" altLang="ko-KR" sz="4000" b="1" dirty="0">
+                <a:solidFill>
+                  <a:srgbClr val="00B0F0"/>
+                </a:solidFill>
+                <a:latin typeface="Arial Unicode MS" panose="020B0604020202020204" pitchFamily="50" charset="-127"/>
+                <a:ea typeface="Arial Unicode MS" panose="020B0604020202020204" pitchFamily="50" charset="-127"/>
+                <a:cs typeface="Arial Unicode MS" panose="020B0604020202020204" pitchFamily="50" charset="-127"/>
+              </a:rPr>
+              <a:t>(DN)</a:t>
+            </a:r>
+          </a:p>
+          <a:p>
+            <a:pPr algn="ctr"/>
+            <a:r>
+              <a:rPr lang="en-US" altLang="ko-KR" sz="4000" b="1" dirty="0">
+                <a:latin typeface="Arial Unicode MS" panose="020B0604020202020204" pitchFamily="50" charset="-127"/>
+                <a:ea typeface="Arial Unicode MS" panose="020B0604020202020204" pitchFamily="50" charset="-127"/>
+                <a:cs typeface="Arial Unicode MS" panose="020B0604020202020204" pitchFamily="50" charset="-127"/>
+              </a:rPr>
+              <a:t>1</a:t>
+            </a:r>
+            <a:r>
+              <a:rPr lang="en-US" altLang="ko-KR" sz="4000" b="1" baseline="30000" dirty="0">
+                <a:latin typeface="Arial Unicode MS" panose="020B0604020202020204" pitchFamily="50" charset="-127"/>
+                <a:ea typeface="Arial Unicode MS" panose="020B0604020202020204" pitchFamily="50" charset="-127"/>
+                <a:cs typeface="Arial Unicode MS" panose="020B0604020202020204" pitchFamily="50" charset="-127"/>
+              </a:rPr>
+              <a:t>st</a:t>
+            </a:r>
+            <a:r>
+              <a:rPr lang="en-US" altLang="ko-KR" sz="4000" b="1" dirty="0">
+                <a:latin typeface="Arial Unicode MS" panose="020B0604020202020204" pitchFamily="50" charset="-127"/>
+                <a:ea typeface="Arial Unicode MS" panose="020B0604020202020204" pitchFamily="50" charset="-127"/>
+                <a:cs typeface="Arial Unicode MS" panose="020B0604020202020204" pitchFamily="50" charset="-127"/>
+              </a:rPr>
+              <a:t>-EXP, </a:t>
+            </a:r>
+            <a:r>
+              <a:rPr lang="en-US" altLang="ko-KR" sz="4000" b="1" dirty="0">
+                <a:solidFill>
+                  <a:srgbClr val="00B0F0"/>
+                </a:solidFill>
+                <a:latin typeface="Arial Unicode MS" panose="020B0604020202020204" pitchFamily="50" charset="-127"/>
+                <a:ea typeface="Arial Unicode MS" panose="020B0604020202020204" pitchFamily="50" charset="-127"/>
+                <a:cs typeface="Arial Unicode MS" panose="020B0604020202020204" pitchFamily="50" charset="-127"/>
+              </a:rPr>
+              <a:t>different h</a:t>
+            </a:r>
+            <a:endParaRPr lang="ko-KR" altLang="en-US" sz="4000" b="1" dirty="0">
+              <a:solidFill>
+                <a:srgbClr val="00B0F0"/>
+              </a:solidFill>
               <a:latin typeface="Arial Unicode MS" panose="020B0604020202020204" pitchFamily="50" charset="-127"/>
               <a:ea typeface="Arial Unicode MS" panose="020B0604020202020204" pitchFamily="50" charset="-127"/>
               <a:cs typeface="Arial Unicode MS" panose="020B0604020202020204" pitchFamily="50" charset="-127"/>
@@ -6662,10 +7104,10 @@
       </p:pic>
       <p:sp>
         <p:nvSpPr>
-          <p:cNvPr id="2" name="TextBox 1">
-            <a:extLst>
-              <a:ext uri="{FF2B5EF4-FFF2-40B4-BE49-F238E27FC236}">
-                <a16:creationId xmlns:a16="http://schemas.microsoft.com/office/drawing/2014/main" id="{520C9508-13DE-7957-9B52-41A7362A9425}"/>
+          <p:cNvPr id="8" name="TextBox 7">
+            <a:extLst>
+              <a:ext uri="{FF2B5EF4-FFF2-40B4-BE49-F238E27FC236}">
+                <a16:creationId xmlns:a16="http://schemas.microsoft.com/office/drawing/2014/main" id="{2342DA94-6040-D2F1-24B0-58A4C69AB283}"/>
               </a:ext>
             </a:extLst>
           </p:cNvPr>
@@ -6674,8 +7116,8 @@
         </p:nvSpPr>
         <p:spPr>
           <a:xfrm>
-            <a:off x="5396574" y="385780"/>
-            <a:ext cx="1398851" cy="523220"/>
+            <a:off x="1208549" y="101592"/>
+            <a:ext cx="9774901" cy="1323439"/>
           </a:xfrm>
           <a:prstGeom prst="rect">
             <a:avLst/>
@@ -6690,22 +7132,96 @@
           <a:p>
             <a:pPr algn="ctr"/>
             <a:r>
-              <a:rPr lang="en-US" altLang="ko-KR" sz="2800" b="1" dirty="0" err="1">
+              <a:rPr lang="en-US" altLang="ko-KR" sz="4000" b="1" dirty="0">
+                <a:solidFill>
+                  <a:srgbClr val="00B0F0"/>
+                </a:solidFill>
                 <a:latin typeface="Arial Unicode MS" panose="020B0604020202020204" pitchFamily="50" charset="-127"/>
                 <a:ea typeface="Arial Unicode MS" panose="020B0604020202020204" pitchFamily="50" charset="-127"/>
                 <a:cs typeface="Arial Unicode MS" panose="020B0604020202020204" pitchFamily="50" charset="-127"/>
               </a:rPr>
-              <a:t>dn</a:t>
-            </a:r>
-            <a:r>
-              <a:rPr lang="en-US" altLang="ko-KR" sz="2800" b="1" dirty="0">
+              <a:t>D</a:t>
+            </a:r>
+            <a:r>
+              <a:rPr lang="en-US" altLang="ko-KR" sz="4000" b="1" dirty="0">
                 <a:latin typeface="Arial Unicode MS" panose="020B0604020202020204" pitchFamily="50" charset="-127"/>
                 <a:ea typeface="Arial Unicode MS" panose="020B0604020202020204" pitchFamily="50" charset="-127"/>
                 <a:cs typeface="Arial Unicode MS" panose="020B0604020202020204" pitchFamily="50" charset="-127"/>
               </a:rPr>
-              <a:t> 2nd</a:t>
-            </a:r>
-            <a:endParaRPr lang="ko-KR" altLang="en-US" sz="2800" b="1" dirty="0">
+              <a:t>own Position-</a:t>
+            </a:r>
+            <a:r>
+              <a:rPr lang="en-US" altLang="ko-KR" sz="4000" b="1" dirty="0">
+                <a:solidFill>
+                  <a:srgbClr val="00B0F0"/>
+                </a:solidFill>
+                <a:latin typeface="Arial Unicode MS" panose="020B0604020202020204" pitchFamily="50" charset="-127"/>
+                <a:ea typeface="Arial Unicode MS" panose="020B0604020202020204" pitchFamily="50" charset="-127"/>
+                <a:cs typeface="Arial Unicode MS" panose="020B0604020202020204" pitchFamily="50" charset="-127"/>
+              </a:rPr>
+              <a:t>N</a:t>
+            </a:r>
+            <a:r>
+              <a:rPr lang="en-US" altLang="ko-KR" sz="4000" b="1" dirty="0">
+                <a:latin typeface="Arial Unicode MS" panose="020B0604020202020204" pitchFamily="50" charset="-127"/>
+                <a:ea typeface="Arial Unicode MS" panose="020B0604020202020204" pitchFamily="50" charset="-127"/>
+                <a:cs typeface="Arial Unicode MS" panose="020B0604020202020204" pitchFamily="50" charset="-127"/>
+              </a:rPr>
+              <a:t>egative Pressure </a:t>
+            </a:r>
+            <a:r>
+              <a:rPr lang="en-US" altLang="ko-KR" sz="4000" b="1" dirty="0">
+                <a:solidFill>
+                  <a:srgbClr val="00B0F0"/>
+                </a:solidFill>
+                <a:latin typeface="Arial Unicode MS" panose="020B0604020202020204" pitchFamily="50" charset="-127"/>
+                <a:ea typeface="Arial Unicode MS" panose="020B0604020202020204" pitchFamily="50" charset="-127"/>
+                <a:cs typeface="Arial Unicode MS" panose="020B0604020202020204" pitchFamily="50" charset="-127"/>
+              </a:rPr>
+              <a:t>(DN)</a:t>
+            </a:r>
+          </a:p>
+          <a:p>
+            <a:pPr algn="ctr"/>
+            <a:r>
+              <a:rPr lang="en-US" altLang="ko-KR" sz="4000" b="1" dirty="0">
+                <a:latin typeface="Arial Unicode MS" panose="020B0604020202020204" pitchFamily="50" charset="-127"/>
+                <a:ea typeface="Arial Unicode MS" panose="020B0604020202020204" pitchFamily="50" charset="-127"/>
+                <a:cs typeface="Arial Unicode MS" panose="020B0604020202020204" pitchFamily="50" charset="-127"/>
+              </a:rPr>
+              <a:t>2</a:t>
+            </a:r>
+            <a:r>
+              <a:rPr lang="en-US" altLang="ko-KR" sz="4000" b="1" baseline="30000" dirty="0">
+                <a:latin typeface="Arial Unicode MS" panose="020B0604020202020204" pitchFamily="50" charset="-127"/>
+                <a:ea typeface="Arial Unicode MS" panose="020B0604020202020204" pitchFamily="50" charset="-127"/>
+                <a:cs typeface="Arial Unicode MS" panose="020B0604020202020204" pitchFamily="50" charset="-127"/>
+              </a:rPr>
+              <a:t>nd</a:t>
+            </a:r>
+            <a:r>
+              <a:rPr lang="en-US" altLang="ko-KR" sz="4000" b="1" dirty="0">
+                <a:latin typeface="Arial Unicode MS" panose="020B0604020202020204" pitchFamily="50" charset="-127"/>
+                <a:ea typeface="Arial Unicode MS" panose="020B0604020202020204" pitchFamily="50" charset="-127"/>
+                <a:cs typeface="Arial Unicode MS" panose="020B0604020202020204" pitchFamily="50" charset="-127"/>
+              </a:rPr>
+              <a:t>-EXP, </a:t>
+            </a:r>
+            <a:r>
+              <a:rPr lang="en-US" altLang="ko-KR" sz="4000" b="1" dirty="0">
+                <a:solidFill>
+                  <a:srgbClr val="00B0F0"/>
+                </a:solidFill>
+                <a:latin typeface="Arial Unicode MS" panose="020B0604020202020204" pitchFamily="50" charset="-127"/>
+                <a:ea typeface="Arial Unicode MS" panose="020B0604020202020204" pitchFamily="50" charset="-127"/>
+                <a:cs typeface="Arial Unicode MS" panose="020B0604020202020204" pitchFamily="50" charset="-127"/>
+              </a:rPr>
+              <a:t>different h</a:t>
+            </a:r>
+            <a:endParaRPr lang="ko-KR" altLang="en-US" sz="4000" b="1" dirty="0">
+              <a:solidFill>
+                <a:srgbClr val="00B0F0"/>
+              </a:solidFill>
               <a:latin typeface="Arial Unicode MS" panose="020B0604020202020204" pitchFamily="50" charset="-127"/>
               <a:ea typeface="Arial Unicode MS" panose="020B0604020202020204" pitchFamily="50" charset="-127"/>
               <a:cs typeface="Arial Unicode MS" panose="020B0604020202020204" pitchFamily="50" charset="-127"/>
@@ -6970,10 +7486,10 @@
       </p:pic>
       <p:sp>
         <p:nvSpPr>
-          <p:cNvPr id="2" name="TextBox 1">
-            <a:extLst>
-              <a:ext uri="{FF2B5EF4-FFF2-40B4-BE49-F238E27FC236}">
-                <a16:creationId xmlns:a16="http://schemas.microsoft.com/office/drawing/2014/main" id="{218A725E-F309-540A-61D3-02D4B0C36D33}"/>
+          <p:cNvPr id="3" name="TextBox 2">
+            <a:extLst>
+              <a:ext uri="{FF2B5EF4-FFF2-40B4-BE49-F238E27FC236}">
+                <a16:creationId xmlns:a16="http://schemas.microsoft.com/office/drawing/2014/main" id="{35138586-BFFA-0E9C-F01C-EBE29DFF8BD0}"/>
               </a:ext>
             </a:extLst>
           </p:cNvPr>
@@ -6982,8 +7498,8 @@
         </p:nvSpPr>
         <p:spPr>
           <a:xfrm>
-            <a:off x="5396574" y="385456"/>
-            <a:ext cx="1398851" cy="523220"/>
+            <a:off x="1208549" y="101592"/>
+            <a:ext cx="9774901" cy="1323439"/>
           </a:xfrm>
           <a:prstGeom prst="rect">
             <a:avLst/>
@@ -6998,14 +7514,96 @@
           <a:p>
             <a:pPr algn="ctr"/>
             <a:r>
-              <a:rPr lang="en-US" altLang="ko-KR" sz="2800" b="1" dirty="0">
+              <a:rPr lang="en-US" altLang="ko-KR" sz="4000" b="1" dirty="0">
+                <a:solidFill>
+                  <a:srgbClr val="FF0000"/>
+                </a:solidFill>
                 <a:latin typeface="Arial Unicode MS" panose="020B0604020202020204" pitchFamily="50" charset="-127"/>
                 <a:ea typeface="Arial Unicode MS" panose="020B0604020202020204" pitchFamily="50" charset="-127"/>
                 <a:cs typeface="Arial Unicode MS" panose="020B0604020202020204" pitchFamily="50" charset="-127"/>
               </a:rPr>
-              <a:t>un 1st</a:t>
-            </a:r>
-            <a:endParaRPr lang="ko-KR" altLang="en-US" sz="2800" b="1" dirty="0">
+              <a:t>U</a:t>
+            </a:r>
+            <a:r>
+              <a:rPr lang="en-US" altLang="ko-KR" sz="4000" b="1" dirty="0">
+                <a:latin typeface="Arial Unicode MS" panose="020B0604020202020204" pitchFamily="50" charset="-127"/>
+                <a:ea typeface="Arial Unicode MS" panose="020B0604020202020204" pitchFamily="50" charset="-127"/>
+                <a:cs typeface="Arial Unicode MS" panose="020B0604020202020204" pitchFamily="50" charset="-127"/>
+              </a:rPr>
+              <a:t>p Position-</a:t>
+            </a:r>
+            <a:r>
+              <a:rPr lang="en-US" altLang="ko-KR" sz="4000" b="1" dirty="0">
+                <a:solidFill>
+                  <a:srgbClr val="FF0000"/>
+                </a:solidFill>
+                <a:latin typeface="Arial Unicode MS" panose="020B0604020202020204" pitchFamily="50" charset="-127"/>
+                <a:ea typeface="Arial Unicode MS" panose="020B0604020202020204" pitchFamily="50" charset="-127"/>
+                <a:cs typeface="Arial Unicode MS" panose="020B0604020202020204" pitchFamily="50" charset="-127"/>
+              </a:rPr>
+              <a:t>N</a:t>
+            </a:r>
+            <a:r>
+              <a:rPr lang="en-US" altLang="ko-KR" sz="4000" b="1" dirty="0">
+                <a:latin typeface="Arial Unicode MS" panose="020B0604020202020204" pitchFamily="50" charset="-127"/>
+                <a:ea typeface="Arial Unicode MS" panose="020B0604020202020204" pitchFamily="50" charset="-127"/>
+                <a:cs typeface="Arial Unicode MS" panose="020B0604020202020204" pitchFamily="50" charset="-127"/>
+              </a:rPr>
+              <a:t>egative Pressure </a:t>
+            </a:r>
+            <a:r>
+              <a:rPr lang="en-US" altLang="ko-KR" sz="4000" b="1" dirty="0">
+                <a:solidFill>
+                  <a:srgbClr val="FF0000"/>
+                </a:solidFill>
+                <a:latin typeface="Arial Unicode MS" panose="020B0604020202020204" pitchFamily="50" charset="-127"/>
+                <a:ea typeface="Arial Unicode MS" panose="020B0604020202020204" pitchFamily="50" charset="-127"/>
+                <a:cs typeface="Arial Unicode MS" panose="020B0604020202020204" pitchFamily="50" charset="-127"/>
+              </a:rPr>
+              <a:t>(UN)</a:t>
+            </a:r>
+          </a:p>
+          <a:p>
+            <a:pPr algn="ctr"/>
+            <a:r>
+              <a:rPr lang="en-US" altLang="ko-KR" sz="4000" b="1" dirty="0">
+                <a:latin typeface="Arial Unicode MS" panose="020B0604020202020204" pitchFamily="50" charset="-127"/>
+                <a:ea typeface="Arial Unicode MS" panose="020B0604020202020204" pitchFamily="50" charset="-127"/>
+                <a:cs typeface="Arial Unicode MS" panose="020B0604020202020204" pitchFamily="50" charset="-127"/>
+              </a:rPr>
+              <a:t>1</a:t>
+            </a:r>
+            <a:r>
+              <a:rPr lang="en-US" altLang="ko-KR" sz="4000" b="1" baseline="30000" dirty="0">
+                <a:latin typeface="Arial Unicode MS" panose="020B0604020202020204" pitchFamily="50" charset="-127"/>
+                <a:ea typeface="Arial Unicode MS" panose="020B0604020202020204" pitchFamily="50" charset="-127"/>
+                <a:cs typeface="Arial Unicode MS" panose="020B0604020202020204" pitchFamily="50" charset="-127"/>
+              </a:rPr>
+              <a:t>st</a:t>
+            </a:r>
+            <a:r>
+              <a:rPr lang="en-US" altLang="ko-KR" sz="4000" b="1" dirty="0">
+                <a:latin typeface="Arial Unicode MS" panose="020B0604020202020204" pitchFamily="50" charset="-127"/>
+                <a:ea typeface="Arial Unicode MS" panose="020B0604020202020204" pitchFamily="50" charset="-127"/>
+                <a:cs typeface="Arial Unicode MS" panose="020B0604020202020204" pitchFamily="50" charset="-127"/>
+              </a:rPr>
+              <a:t>-EXP, </a:t>
+            </a:r>
+            <a:r>
+              <a:rPr lang="en-US" altLang="ko-KR" sz="4000" b="1" dirty="0">
+                <a:solidFill>
+                  <a:srgbClr val="FF0000"/>
+                </a:solidFill>
+                <a:latin typeface="Arial Unicode MS" panose="020B0604020202020204" pitchFamily="50" charset="-127"/>
+                <a:ea typeface="Arial Unicode MS" panose="020B0604020202020204" pitchFamily="50" charset="-127"/>
+                <a:cs typeface="Arial Unicode MS" panose="020B0604020202020204" pitchFamily="50" charset="-127"/>
+              </a:rPr>
+              <a:t>different h</a:t>
+            </a:r>
+            <a:endParaRPr lang="ko-KR" altLang="en-US" sz="4000" b="1" dirty="0">
+              <a:solidFill>
+                <a:srgbClr val="FF0000"/>
+              </a:solidFill>
               <a:latin typeface="Arial Unicode MS" panose="020B0604020202020204" pitchFamily="50" charset="-127"/>
               <a:ea typeface="Arial Unicode MS" panose="020B0604020202020204" pitchFamily="50" charset="-127"/>
               <a:cs typeface="Arial Unicode MS" panose="020B0604020202020204" pitchFamily="50" charset="-127"/>
@@ -7355,10 +7953,10 @@
       </p:grpSp>
       <p:sp>
         <p:nvSpPr>
-          <p:cNvPr id="2" name="TextBox 1">
-            <a:extLst>
-              <a:ext uri="{FF2B5EF4-FFF2-40B4-BE49-F238E27FC236}">
-                <a16:creationId xmlns:a16="http://schemas.microsoft.com/office/drawing/2014/main" id="{2DBD04E3-9EC2-05E7-E63E-21975BDAF38E}"/>
+          <p:cNvPr id="4" name="TextBox 3">
+            <a:extLst>
+              <a:ext uri="{FF2B5EF4-FFF2-40B4-BE49-F238E27FC236}">
+                <a16:creationId xmlns:a16="http://schemas.microsoft.com/office/drawing/2014/main" id="{264DDDCF-FD89-B702-B57E-0CFABA5DBB1A}"/>
               </a:ext>
             </a:extLst>
           </p:cNvPr>
@@ -7367,8 +7965,8 @@
         </p:nvSpPr>
         <p:spPr>
           <a:xfrm>
-            <a:off x="5396574" y="385780"/>
-            <a:ext cx="1398851" cy="523220"/>
+            <a:off x="1208549" y="101592"/>
+            <a:ext cx="9774901" cy="1323439"/>
           </a:xfrm>
           <a:prstGeom prst="rect">
             <a:avLst/>
@@ -7383,14 +7981,96 @@
           <a:p>
             <a:pPr algn="ctr"/>
             <a:r>
-              <a:rPr lang="en-US" altLang="ko-KR" sz="2800" b="1" dirty="0">
+              <a:rPr lang="en-US" altLang="ko-KR" sz="4000" b="1" dirty="0">
+                <a:solidFill>
+                  <a:srgbClr val="FF0000"/>
+                </a:solidFill>
                 <a:latin typeface="Arial Unicode MS" panose="020B0604020202020204" pitchFamily="50" charset="-127"/>
                 <a:ea typeface="Arial Unicode MS" panose="020B0604020202020204" pitchFamily="50" charset="-127"/>
                 <a:cs typeface="Arial Unicode MS" panose="020B0604020202020204" pitchFamily="50" charset="-127"/>
               </a:rPr>
-              <a:t>un 2nd</a:t>
-            </a:r>
-            <a:endParaRPr lang="ko-KR" altLang="en-US" sz="2800" b="1" dirty="0">
+              <a:t>U</a:t>
+            </a:r>
+            <a:r>
+              <a:rPr lang="en-US" altLang="ko-KR" sz="4000" b="1" dirty="0">
+                <a:latin typeface="Arial Unicode MS" panose="020B0604020202020204" pitchFamily="50" charset="-127"/>
+                <a:ea typeface="Arial Unicode MS" panose="020B0604020202020204" pitchFamily="50" charset="-127"/>
+                <a:cs typeface="Arial Unicode MS" panose="020B0604020202020204" pitchFamily="50" charset="-127"/>
+              </a:rPr>
+              <a:t>p Position-</a:t>
+            </a:r>
+            <a:r>
+              <a:rPr lang="en-US" altLang="ko-KR" sz="4000" b="1" dirty="0">
+                <a:solidFill>
+                  <a:srgbClr val="FF0000"/>
+                </a:solidFill>
+                <a:latin typeface="Arial Unicode MS" panose="020B0604020202020204" pitchFamily="50" charset="-127"/>
+                <a:ea typeface="Arial Unicode MS" panose="020B0604020202020204" pitchFamily="50" charset="-127"/>
+                <a:cs typeface="Arial Unicode MS" panose="020B0604020202020204" pitchFamily="50" charset="-127"/>
+              </a:rPr>
+              <a:t>N</a:t>
+            </a:r>
+            <a:r>
+              <a:rPr lang="en-US" altLang="ko-KR" sz="4000" b="1" dirty="0">
+                <a:latin typeface="Arial Unicode MS" panose="020B0604020202020204" pitchFamily="50" charset="-127"/>
+                <a:ea typeface="Arial Unicode MS" panose="020B0604020202020204" pitchFamily="50" charset="-127"/>
+                <a:cs typeface="Arial Unicode MS" panose="020B0604020202020204" pitchFamily="50" charset="-127"/>
+              </a:rPr>
+              <a:t>egative Pressure </a:t>
+            </a:r>
+            <a:r>
+              <a:rPr lang="en-US" altLang="ko-KR" sz="4000" b="1" dirty="0">
+                <a:solidFill>
+                  <a:srgbClr val="FF0000"/>
+                </a:solidFill>
+                <a:latin typeface="Arial Unicode MS" panose="020B0604020202020204" pitchFamily="50" charset="-127"/>
+                <a:ea typeface="Arial Unicode MS" panose="020B0604020202020204" pitchFamily="50" charset="-127"/>
+                <a:cs typeface="Arial Unicode MS" panose="020B0604020202020204" pitchFamily="50" charset="-127"/>
+              </a:rPr>
+              <a:t>(UN)</a:t>
+            </a:r>
+          </a:p>
+          <a:p>
+            <a:pPr algn="ctr"/>
+            <a:r>
+              <a:rPr lang="en-US" altLang="ko-KR" sz="4000" b="1" dirty="0">
+                <a:latin typeface="Arial Unicode MS" panose="020B0604020202020204" pitchFamily="50" charset="-127"/>
+                <a:ea typeface="Arial Unicode MS" panose="020B0604020202020204" pitchFamily="50" charset="-127"/>
+                <a:cs typeface="Arial Unicode MS" panose="020B0604020202020204" pitchFamily="50" charset="-127"/>
+              </a:rPr>
+              <a:t>2</a:t>
+            </a:r>
+            <a:r>
+              <a:rPr lang="en-US" altLang="ko-KR" sz="4000" b="1" baseline="30000" dirty="0">
+                <a:latin typeface="Arial Unicode MS" panose="020B0604020202020204" pitchFamily="50" charset="-127"/>
+                <a:ea typeface="Arial Unicode MS" panose="020B0604020202020204" pitchFamily="50" charset="-127"/>
+                <a:cs typeface="Arial Unicode MS" panose="020B0604020202020204" pitchFamily="50" charset="-127"/>
+              </a:rPr>
+              <a:t>nd</a:t>
+            </a:r>
+            <a:r>
+              <a:rPr lang="en-US" altLang="ko-KR" sz="4000" b="1" dirty="0">
+                <a:latin typeface="Arial Unicode MS" panose="020B0604020202020204" pitchFamily="50" charset="-127"/>
+                <a:ea typeface="Arial Unicode MS" panose="020B0604020202020204" pitchFamily="50" charset="-127"/>
+                <a:cs typeface="Arial Unicode MS" panose="020B0604020202020204" pitchFamily="50" charset="-127"/>
+              </a:rPr>
+              <a:t>-EXP, </a:t>
+            </a:r>
+            <a:r>
+              <a:rPr lang="en-US" altLang="ko-KR" sz="4000" b="1" dirty="0">
+                <a:solidFill>
+                  <a:srgbClr val="FF0000"/>
+                </a:solidFill>
+                <a:latin typeface="Arial Unicode MS" panose="020B0604020202020204" pitchFamily="50" charset="-127"/>
+                <a:ea typeface="Arial Unicode MS" panose="020B0604020202020204" pitchFamily="50" charset="-127"/>
+                <a:cs typeface="Arial Unicode MS" panose="020B0604020202020204" pitchFamily="50" charset="-127"/>
+              </a:rPr>
+              <a:t>different h</a:t>
+            </a:r>
+            <a:endParaRPr lang="ko-KR" altLang="en-US" sz="4000" b="1" dirty="0">
+              <a:solidFill>
+                <a:srgbClr val="FF0000"/>
+              </a:solidFill>
               <a:latin typeface="Arial Unicode MS" panose="020B0604020202020204" pitchFamily="50" charset="-127"/>
               <a:ea typeface="Arial Unicode MS" panose="020B0604020202020204" pitchFamily="50" charset="-127"/>
               <a:cs typeface="Arial Unicode MS" panose="020B0604020202020204" pitchFamily="50" charset="-127"/>
@@ -7655,10 +8335,10 @@
       </p:pic>
       <p:sp>
         <p:nvSpPr>
-          <p:cNvPr id="8" name="TextBox 7">
-            <a:extLst>
-              <a:ext uri="{FF2B5EF4-FFF2-40B4-BE49-F238E27FC236}">
-                <a16:creationId xmlns:a16="http://schemas.microsoft.com/office/drawing/2014/main" id="{4B90E248-5F19-8EF0-49DA-017D30E63B23}"/>
+          <p:cNvPr id="10" name="TextBox 9">
+            <a:extLst>
+              <a:ext uri="{FF2B5EF4-FFF2-40B4-BE49-F238E27FC236}">
+                <a16:creationId xmlns:a16="http://schemas.microsoft.com/office/drawing/2014/main" id="{EF45C766-FFD8-D919-C4A2-A2BF59E6928B}"/>
               </a:ext>
             </a:extLst>
           </p:cNvPr>
@@ -7667,8 +8347,8 @@
         </p:nvSpPr>
         <p:spPr>
           <a:xfrm>
-            <a:off x="5396574" y="290767"/>
-            <a:ext cx="1398851" cy="523220"/>
+            <a:off x="1208549" y="101592"/>
+            <a:ext cx="9774901" cy="1323439"/>
           </a:xfrm>
           <a:prstGeom prst="rect">
             <a:avLst/>
@@ -7683,22 +8363,96 @@
           <a:p>
             <a:pPr algn="ctr"/>
             <a:r>
-              <a:rPr lang="en-US" altLang="ko-KR" sz="2800" b="1" dirty="0" err="1">
+              <a:rPr lang="en-US" altLang="ko-KR" sz="4000" b="1" dirty="0">
+                <a:solidFill>
+                  <a:srgbClr val="00B0F0"/>
+                </a:solidFill>
                 <a:latin typeface="Arial Unicode MS" panose="020B0604020202020204" pitchFamily="50" charset="-127"/>
                 <a:ea typeface="Arial Unicode MS" panose="020B0604020202020204" pitchFamily="50" charset="-127"/>
                 <a:cs typeface="Arial Unicode MS" panose="020B0604020202020204" pitchFamily="50" charset="-127"/>
               </a:rPr>
-              <a:t>dp</a:t>
-            </a:r>
-            <a:r>
-              <a:rPr lang="en-US" altLang="ko-KR" sz="2800" b="1" dirty="0">
+              <a:t>D</a:t>
+            </a:r>
+            <a:r>
+              <a:rPr lang="en-US" altLang="ko-KR" sz="4000" b="1" dirty="0">
                 <a:latin typeface="Arial Unicode MS" panose="020B0604020202020204" pitchFamily="50" charset="-127"/>
                 <a:ea typeface="Arial Unicode MS" panose="020B0604020202020204" pitchFamily="50" charset="-127"/>
                 <a:cs typeface="Arial Unicode MS" panose="020B0604020202020204" pitchFamily="50" charset="-127"/>
               </a:rPr>
-              <a:t> 1st</a:t>
-            </a:r>
-            <a:endParaRPr lang="ko-KR" altLang="en-US" sz="2800" b="1" dirty="0">
+              <a:t>own Position-</a:t>
+            </a:r>
+            <a:r>
+              <a:rPr lang="en-US" altLang="ko-KR" sz="4000" b="1" dirty="0">
+                <a:solidFill>
+                  <a:srgbClr val="00B0F0"/>
+                </a:solidFill>
+                <a:latin typeface="Arial Unicode MS" panose="020B0604020202020204" pitchFamily="50" charset="-127"/>
+                <a:ea typeface="Arial Unicode MS" panose="020B0604020202020204" pitchFamily="50" charset="-127"/>
+                <a:cs typeface="Arial Unicode MS" panose="020B0604020202020204" pitchFamily="50" charset="-127"/>
+              </a:rPr>
+              <a:t>P</a:t>
+            </a:r>
+            <a:r>
+              <a:rPr lang="en-US" altLang="ko-KR" sz="4000" b="1" dirty="0">
+                <a:latin typeface="Arial Unicode MS" panose="020B0604020202020204" pitchFamily="50" charset="-127"/>
+                <a:ea typeface="Arial Unicode MS" panose="020B0604020202020204" pitchFamily="50" charset="-127"/>
+                <a:cs typeface="Arial Unicode MS" panose="020B0604020202020204" pitchFamily="50" charset="-127"/>
+              </a:rPr>
+              <a:t>ositive Pressure </a:t>
+            </a:r>
+            <a:r>
+              <a:rPr lang="en-US" altLang="ko-KR" sz="4000" b="1" dirty="0">
+                <a:solidFill>
+                  <a:srgbClr val="00B0F0"/>
+                </a:solidFill>
+                <a:latin typeface="Arial Unicode MS" panose="020B0604020202020204" pitchFamily="50" charset="-127"/>
+                <a:ea typeface="Arial Unicode MS" panose="020B0604020202020204" pitchFamily="50" charset="-127"/>
+                <a:cs typeface="Arial Unicode MS" panose="020B0604020202020204" pitchFamily="50" charset="-127"/>
+              </a:rPr>
+              <a:t>(DP)</a:t>
+            </a:r>
+          </a:p>
+          <a:p>
+            <a:pPr algn="ctr"/>
+            <a:r>
+              <a:rPr lang="en-US" altLang="ko-KR" sz="4000" b="1" dirty="0">
+                <a:latin typeface="Arial Unicode MS" panose="020B0604020202020204" pitchFamily="50" charset="-127"/>
+                <a:ea typeface="Arial Unicode MS" panose="020B0604020202020204" pitchFamily="50" charset="-127"/>
+                <a:cs typeface="Arial Unicode MS" panose="020B0604020202020204" pitchFamily="50" charset="-127"/>
+              </a:rPr>
+              <a:t>1</a:t>
+            </a:r>
+            <a:r>
+              <a:rPr lang="en-US" altLang="ko-KR" sz="4000" b="1" baseline="30000" dirty="0">
+                <a:latin typeface="Arial Unicode MS" panose="020B0604020202020204" pitchFamily="50" charset="-127"/>
+                <a:ea typeface="Arial Unicode MS" panose="020B0604020202020204" pitchFamily="50" charset="-127"/>
+                <a:cs typeface="Arial Unicode MS" panose="020B0604020202020204" pitchFamily="50" charset="-127"/>
+              </a:rPr>
+              <a:t>st</a:t>
+            </a:r>
+            <a:r>
+              <a:rPr lang="en-US" altLang="ko-KR" sz="4000" b="1" dirty="0">
+                <a:latin typeface="Arial Unicode MS" panose="020B0604020202020204" pitchFamily="50" charset="-127"/>
+                <a:ea typeface="Arial Unicode MS" panose="020B0604020202020204" pitchFamily="50" charset="-127"/>
+                <a:cs typeface="Arial Unicode MS" panose="020B0604020202020204" pitchFamily="50" charset="-127"/>
+              </a:rPr>
+              <a:t>-EXP, </a:t>
+            </a:r>
+            <a:r>
+              <a:rPr lang="en-US" altLang="ko-KR" sz="4000" b="1" dirty="0">
+                <a:solidFill>
+                  <a:srgbClr val="00B0F0"/>
+                </a:solidFill>
+                <a:latin typeface="Arial Unicode MS" panose="020B0604020202020204" pitchFamily="50" charset="-127"/>
+                <a:ea typeface="Arial Unicode MS" panose="020B0604020202020204" pitchFamily="50" charset="-127"/>
+                <a:cs typeface="Arial Unicode MS" panose="020B0604020202020204" pitchFamily="50" charset="-127"/>
+              </a:rPr>
+              <a:t>different h</a:t>
+            </a:r>
+            <a:endParaRPr lang="ko-KR" altLang="en-US" sz="4000" b="1" dirty="0">
+              <a:solidFill>
+                <a:srgbClr val="00B0F0"/>
+              </a:solidFill>
               <a:latin typeface="Arial Unicode MS" panose="020B0604020202020204" pitchFamily="50" charset="-127"/>
               <a:ea typeface="Arial Unicode MS" panose="020B0604020202020204" pitchFamily="50" charset="-127"/>
               <a:cs typeface="Arial Unicode MS" panose="020B0604020202020204" pitchFamily="50" charset="-127"/>
@@ -7963,10 +8717,10 @@
       </p:pic>
       <p:sp>
         <p:nvSpPr>
-          <p:cNvPr id="8" name="TextBox 7">
-            <a:extLst>
-              <a:ext uri="{FF2B5EF4-FFF2-40B4-BE49-F238E27FC236}">
-                <a16:creationId xmlns:a16="http://schemas.microsoft.com/office/drawing/2014/main" id="{44229F80-5AB1-E15A-3CD8-36E10C7CCF96}"/>
+          <p:cNvPr id="9" name="TextBox 8">
+            <a:extLst>
+              <a:ext uri="{FF2B5EF4-FFF2-40B4-BE49-F238E27FC236}">
+                <a16:creationId xmlns:a16="http://schemas.microsoft.com/office/drawing/2014/main" id="{6A515159-E6B5-76BF-54DE-7D15F76F0F9E}"/>
               </a:ext>
             </a:extLst>
           </p:cNvPr>
@@ -7975,8 +8729,8 @@
         </p:nvSpPr>
         <p:spPr>
           <a:xfrm>
-            <a:off x="5396574" y="281277"/>
-            <a:ext cx="1398851" cy="523220"/>
+            <a:off x="1208549" y="101592"/>
+            <a:ext cx="9774901" cy="1323439"/>
           </a:xfrm>
           <a:prstGeom prst="rect">
             <a:avLst/>
@@ -7991,14 +8745,96 @@
           <a:p>
             <a:pPr algn="ctr"/>
             <a:r>
-              <a:rPr lang="en-US" altLang="ko-KR" sz="2800" b="1" dirty="0">
+              <a:rPr lang="en-US" altLang="ko-KR" sz="4000" b="1" dirty="0">
+                <a:solidFill>
+                  <a:srgbClr val="FF0000"/>
+                </a:solidFill>
                 <a:latin typeface="Arial Unicode MS" panose="020B0604020202020204" pitchFamily="50" charset="-127"/>
                 <a:ea typeface="Arial Unicode MS" panose="020B0604020202020204" pitchFamily="50" charset="-127"/>
                 <a:cs typeface="Arial Unicode MS" panose="020B0604020202020204" pitchFamily="50" charset="-127"/>
               </a:rPr>
-              <a:t>up 1st</a:t>
-            </a:r>
-            <a:endParaRPr lang="ko-KR" altLang="en-US" sz="2800" b="1" dirty="0">
+              <a:t>U</a:t>
+            </a:r>
+            <a:r>
+              <a:rPr lang="en-US" altLang="ko-KR" sz="4000" b="1" dirty="0">
+                <a:latin typeface="Arial Unicode MS" panose="020B0604020202020204" pitchFamily="50" charset="-127"/>
+                <a:ea typeface="Arial Unicode MS" panose="020B0604020202020204" pitchFamily="50" charset="-127"/>
+                <a:cs typeface="Arial Unicode MS" panose="020B0604020202020204" pitchFamily="50" charset="-127"/>
+              </a:rPr>
+              <a:t>p Position-</a:t>
+            </a:r>
+            <a:r>
+              <a:rPr lang="en-US" altLang="ko-KR" sz="4000" b="1" dirty="0">
+                <a:solidFill>
+                  <a:srgbClr val="FF0000"/>
+                </a:solidFill>
+                <a:latin typeface="Arial Unicode MS" panose="020B0604020202020204" pitchFamily="50" charset="-127"/>
+                <a:ea typeface="Arial Unicode MS" panose="020B0604020202020204" pitchFamily="50" charset="-127"/>
+                <a:cs typeface="Arial Unicode MS" panose="020B0604020202020204" pitchFamily="50" charset="-127"/>
+              </a:rPr>
+              <a:t>P</a:t>
+            </a:r>
+            <a:r>
+              <a:rPr lang="en-US" altLang="ko-KR" sz="4000" b="1" dirty="0">
+                <a:latin typeface="Arial Unicode MS" panose="020B0604020202020204" pitchFamily="50" charset="-127"/>
+                <a:ea typeface="Arial Unicode MS" panose="020B0604020202020204" pitchFamily="50" charset="-127"/>
+                <a:cs typeface="Arial Unicode MS" panose="020B0604020202020204" pitchFamily="50" charset="-127"/>
+              </a:rPr>
+              <a:t>ositive Pressure </a:t>
+            </a:r>
+            <a:r>
+              <a:rPr lang="en-US" altLang="ko-KR" sz="4000" b="1" dirty="0">
+                <a:solidFill>
+                  <a:srgbClr val="FF0000"/>
+                </a:solidFill>
+                <a:latin typeface="Arial Unicode MS" panose="020B0604020202020204" pitchFamily="50" charset="-127"/>
+                <a:ea typeface="Arial Unicode MS" panose="020B0604020202020204" pitchFamily="50" charset="-127"/>
+                <a:cs typeface="Arial Unicode MS" panose="020B0604020202020204" pitchFamily="50" charset="-127"/>
+              </a:rPr>
+              <a:t>(UP)</a:t>
+            </a:r>
+          </a:p>
+          <a:p>
+            <a:pPr algn="ctr"/>
+            <a:r>
+              <a:rPr lang="en-US" altLang="ko-KR" sz="4000" b="1" dirty="0">
+                <a:latin typeface="Arial Unicode MS" panose="020B0604020202020204" pitchFamily="50" charset="-127"/>
+                <a:ea typeface="Arial Unicode MS" panose="020B0604020202020204" pitchFamily="50" charset="-127"/>
+                <a:cs typeface="Arial Unicode MS" panose="020B0604020202020204" pitchFamily="50" charset="-127"/>
+              </a:rPr>
+              <a:t>1</a:t>
+            </a:r>
+            <a:r>
+              <a:rPr lang="en-US" altLang="ko-KR" sz="4000" b="1" baseline="30000" dirty="0">
+                <a:latin typeface="Arial Unicode MS" panose="020B0604020202020204" pitchFamily="50" charset="-127"/>
+                <a:ea typeface="Arial Unicode MS" panose="020B0604020202020204" pitchFamily="50" charset="-127"/>
+                <a:cs typeface="Arial Unicode MS" panose="020B0604020202020204" pitchFamily="50" charset="-127"/>
+              </a:rPr>
+              <a:t>st</a:t>
+            </a:r>
+            <a:r>
+              <a:rPr lang="en-US" altLang="ko-KR" sz="4000" b="1" dirty="0">
+                <a:latin typeface="Arial Unicode MS" panose="020B0604020202020204" pitchFamily="50" charset="-127"/>
+                <a:ea typeface="Arial Unicode MS" panose="020B0604020202020204" pitchFamily="50" charset="-127"/>
+                <a:cs typeface="Arial Unicode MS" panose="020B0604020202020204" pitchFamily="50" charset="-127"/>
+              </a:rPr>
+              <a:t>-EXP, </a:t>
+            </a:r>
+            <a:r>
+              <a:rPr lang="en-US" altLang="ko-KR" sz="4000" b="1" dirty="0">
+                <a:solidFill>
+                  <a:srgbClr val="FF0000"/>
+                </a:solidFill>
+                <a:latin typeface="Arial Unicode MS" panose="020B0604020202020204" pitchFamily="50" charset="-127"/>
+                <a:ea typeface="Arial Unicode MS" panose="020B0604020202020204" pitchFamily="50" charset="-127"/>
+                <a:cs typeface="Arial Unicode MS" panose="020B0604020202020204" pitchFamily="50" charset="-127"/>
+              </a:rPr>
+              <a:t>different h</a:t>
+            </a:r>
+            <a:endParaRPr lang="ko-KR" altLang="en-US" sz="4000" b="1" dirty="0">
+              <a:solidFill>
+                <a:srgbClr val="FF0000"/>
+              </a:solidFill>
               <a:latin typeface="Arial Unicode MS" panose="020B0604020202020204" pitchFamily="50" charset="-127"/>
               <a:ea typeface="Arial Unicode MS" panose="020B0604020202020204" pitchFamily="50" charset="-127"/>
               <a:cs typeface="Arial Unicode MS" panose="020B0604020202020204" pitchFamily="50" charset="-127"/>

</xml_diff>

<commit_message>
diff n-models and raw data organized
</commit_message>
<xml_diff>
--- a/LabLog.pptx
+++ b/LabLog.pptx
@@ -141,18 +141,18 @@
   <pc:docChgLst>
     <pc:chgData name="민서 오" userId="7d89e7b822021c56" providerId="LiveId" clId="{B85301CE-5477-420D-98B8-2A5B4FD7B43E}"/>
     <pc:docChg chg="undo custSel addSld delSld modSld">
-      <pc:chgData name="민서 오" userId="7d89e7b822021c56" providerId="LiveId" clId="{B85301CE-5477-420D-98B8-2A5B4FD7B43E}" dt="2024-08-09T09:27:39.832" v="347" actId="1076"/>
+      <pc:chgData name="민서 오" userId="7d89e7b822021c56" providerId="LiveId" clId="{B85301CE-5477-420D-98B8-2A5B4FD7B43E}" dt="2024-08-13T05:51:24.968" v="423" actId="20577"/>
       <pc:docMkLst>
         <pc:docMk/>
       </pc:docMkLst>
       <pc:sldChg chg="modSp add del mod">
-        <pc:chgData name="민서 오" userId="7d89e7b822021c56" providerId="LiveId" clId="{B85301CE-5477-420D-98B8-2A5B4FD7B43E}" dt="2024-08-09T04:24:46.880" v="87" actId="13926"/>
+        <pc:chgData name="민서 오" userId="7d89e7b822021c56" providerId="LiveId" clId="{B85301CE-5477-420D-98B8-2A5B4FD7B43E}" dt="2024-08-13T05:51:24.968" v="423" actId="20577"/>
         <pc:sldMkLst>
           <pc:docMk/>
           <pc:sldMk cId="0" sldId="256"/>
         </pc:sldMkLst>
         <pc:spChg chg="mod">
-          <ac:chgData name="민서 오" userId="7d89e7b822021c56" providerId="LiveId" clId="{B85301CE-5477-420D-98B8-2A5B4FD7B43E}" dt="2024-08-09T04:24:46.880" v="87" actId="13926"/>
+          <ac:chgData name="민서 오" userId="7d89e7b822021c56" providerId="LiveId" clId="{B85301CE-5477-420D-98B8-2A5B4FD7B43E}" dt="2024-08-13T05:51:24.968" v="423" actId="20577"/>
           <ac:spMkLst>
             <pc:docMk/>
             <pc:sldMk cId="0" sldId="256"/>
@@ -770,7 +770,7 @@
           <a:p>
             <a:fld id="{843012E4-EA86-4BA1-A56C-00CD16D7F17B}" type="datetimeFigureOut">
               <a:rPr lang="ko-KR" altLang="en-US" smtClean="0"/>
-              <a:t>2024-08-09</a:t>
+              <a:t>2024-08-13</a:t>
             </a:fld>
             <a:endParaRPr lang="ko-KR" altLang="en-US"/>
           </a:p>
@@ -968,7 +968,7 @@
           <a:p>
             <a:fld id="{843012E4-EA86-4BA1-A56C-00CD16D7F17B}" type="datetimeFigureOut">
               <a:rPr lang="ko-KR" altLang="en-US" smtClean="0"/>
-              <a:t>2024-08-09</a:t>
+              <a:t>2024-08-13</a:t>
             </a:fld>
             <a:endParaRPr lang="ko-KR" altLang="en-US"/>
           </a:p>
@@ -1176,7 +1176,7 @@
           <a:p>
             <a:fld id="{843012E4-EA86-4BA1-A56C-00CD16D7F17B}" type="datetimeFigureOut">
               <a:rPr lang="ko-KR" altLang="en-US" smtClean="0"/>
-              <a:t>2024-08-09</a:t>
+              <a:t>2024-08-13</a:t>
             </a:fld>
             <a:endParaRPr lang="ko-KR" altLang="en-US"/>
           </a:p>
@@ -1374,7 +1374,7 @@
           <a:p>
             <a:fld id="{843012E4-EA86-4BA1-A56C-00CD16D7F17B}" type="datetimeFigureOut">
               <a:rPr lang="ko-KR" altLang="en-US" smtClean="0"/>
-              <a:t>2024-08-09</a:t>
+              <a:t>2024-08-13</a:t>
             </a:fld>
             <a:endParaRPr lang="ko-KR" altLang="en-US"/>
           </a:p>
@@ -1649,7 +1649,7 @@
           <a:p>
             <a:fld id="{843012E4-EA86-4BA1-A56C-00CD16D7F17B}" type="datetimeFigureOut">
               <a:rPr lang="ko-KR" altLang="en-US" smtClean="0"/>
-              <a:t>2024-08-09</a:t>
+              <a:t>2024-08-13</a:t>
             </a:fld>
             <a:endParaRPr lang="ko-KR" altLang="en-US"/>
           </a:p>
@@ -1914,7 +1914,7 @@
           <a:p>
             <a:fld id="{843012E4-EA86-4BA1-A56C-00CD16D7F17B}" type="datetimeFigureOut">
               <a:rPr lang="ko-KR" altLang="en-US" smtClean="0"/>
-              <a:t>2024-08-09</a:t>
+              <a:t>2024-08-13</a:t>
             </a:fld>
             <a:endParaRPr lang="ko-KR" altLang="en-US"/>
           </a:p>
@@ -2326,7 +2326,7 @@
           <a:p>
             <a:fld id="{843012E4-EA86-4BA1-A56C-00CD16D7F17B}" type="datetimeFigureOut">
               <a:rPr lang="ko-KR" altLang="en-US" smtClean="0"/>
-              <a:t>2024-08-09</a:t>
+              <a:t>2024-08-13</a:t>
             </a:fld>
             <a:endParaRPr lang="ko-KR" altLang="en-US"/>
           </a:p>
@@ -2467,7 +2467,7 @@
           <a:p>
             <a:fld id="{843012E4-EA86-4BA1-A56C-00CD16D7F17B}" type="datetimeFigureOut">
               <a:rPr lang="ko-KR" altLang="en-US" smtClean="0"/>
-              <a:t>2024-08-09</a:t>
+              <a:t>2024-08-13</a:t>
             </a:fld>
             <a:endParaRPr lang="ko-KR" altLang="en-US"/>
           </a:p>
@@ -2580,7 +2580,7 @@
           <a:p>
             <a:fld id="{843012E4-EA86-4BA1-A56C-00CD16D7F17B}" type="datetimeFigureOut">
               <a:rPr lang="ko-KR" altLang="en-US" smtClean="0"/>
-              <a:t>2024-08-09</a:t>
+              <a:t>2024-08-13</a:t>
             </a:fld>
             <a:endParaRPr lang="ko-KR" altLang="en-US"/>
           </a:p>
@@ -2891,7 +2891,7 @@
           <a:p>
             <a:fld id="{843012E4-EA86-4BA1-A56C-00CD16D7F17B}" type="datetimeFigureOut">
               <a:rPr lang="ko-KR" altLang="en-US" smtClean="0"/>
-              <a:t>2024-08-09</a:t>
+              <a:t>2024-08-13</a:t>
             </a:fld>
             <a:endParaRPr lang="ko-KR" altLang="en-US"/>
           </a:p>
@@ -3179,7 +3179,7 @@
           <a:p>
             <a:fld id="{843012E4-EA86-4BA1-A56C-00CD16D7F17B}" type="datetimeFigureOut">
               <a:rPr lang="ko-KR" altLang="en-US" smtClean="0"/>
-              <a:t>2024-08-09</a:t>
+              <a:t>2024-08-13</a:t>
             </a:fld>
             <a:endParaRPr lang="ko-KR" altLang="en-US"/>
           </a:p>
@@ -3420,7 +3420,7 @@
           <a:p>
             <a:fld id="{843012E4-EA86-4BA1-A56C-00CD16D7F17B}" type="datetimeFigureOut">
               <a:rPr lang="ko-KR" altLang="en-US" smtClean="0"/>
-              <a:t>2024-08-09</a:t>
+              <a:t>2024-08-13</a:t>
             </a:fld>
             <a:endParaRPr lang="ko-KR" altLang="en-US"/>
           </a:p>
@@ -3956,6 +3956,36 @@
               <a:buNone/>
               <a:defRPr/>
             </a:pPr>
+            <a:r>
+              <a:rPr lang="ko-KR" altLang="en-US" sz="3000" b="1" dirty="0"/>
+              <a:t>기준 </a:t>
+            </a:r>
+            <a:r>
+              <a:rPr lang="en-US" altLang="ko-KR" sz="3000" b="1" dirty="0"/>
+              <a:t>12</a:t>
+            </a:r>
+            <a:r>
+              <a:rPr lang="ko-KR" altLang="en-US" sz="3000" b="1" dirty="0"/>
+              <a:t>각형</a:t>
+            </a:r>
+            <a:r>
+              <a:rPr lang="en-US" altLang="ko-KR" sz="3000" b="1" dirty="0"/>
+              <a:t>, </a:t>
+            </a:r>
+            <a:r>
+              <a:rPr lang="ko-KR" altLang="en-US" sz="3000" b="1" dirty="0"/>
+              <a:t>몇 단위로 </a:t>
+            </a:r>
+            <a:r>
+              <a:rPr lang="en-US" altLang="ko-KR" sz="3000" b="1"/>
+              <a:t>2or3?</a:t>
+            </a:r>
+          </a:p>
+          <a:p>
+            <a:pPr marL="0" indent="0">
+              <a:buNone/>
+              <a:defRPr/>
+            </a:pPr>
             <a:endParaRPr lang="en-US" altLang="ko-KR" sz="3000" b="1" dirty="0"/>
           </a:p>
           <a:p>
@@ -3989,31 +4019,7 @@
                   <a:srgbClr val="FFFF00"/>
                 </a:highlight>
               </a:rPr>
-              <a:t>18, </a:t>
-            </a:r>
-            <a:r>
-              <a:rPr lang="en-US" altLang="ko-KR" sz="3000" b="1" dirty="0"/>
-              <a:t>21, </a:t>
-            </a:r>
-            <a:r>
-              <a:rPr lang="en-US" altLang="ko-KR" sz="3000" b="1" dirty="0">
-                <a:highlight>
-                  <a:srgbClr val="FFFF00"/>
-                </a:highlight>
-              </a:rPr>
-              <a:t>24, </a:t>
-            </a:r>
-            <a:r>
-              <a:rPr lang="en-US" altLang="ko-KR" sz="3000" b="1" dirty="0"/>
-              <a:t>27, 30, </a:t>
-            </a:r>
-            <a:r>
-              <a:rPr lang="en-US" altLang="ko-KR" sz="3000" b="1" dirty="0">
-                <a:highlight>
-                  <a:srgbClr val="FFFF00"/>
-                </a:highlight>
-              </a:rPr>
-              <a:t>33mm</a:t>
+              <a:t>18, 21, 24, 27, 30, 33mm</a:t>
             </a:r>
           </a:p>
           <a:p>
@@ -4091,7 +4097,7 @@
     <mc:Choice Requires="p14">
       <p:transition/>
     </mc:Choice>
-    <mc:Fallback xmlns="" xmlns:c="http://schemas.openxmlformats.org/drawingml/2006/chart" xmlns:dgm="http://schemas.openxmlformats.org/drawingml/2006/diagram" xmlns:dsp="http://schemas.microsoft.com/office/drawing/2008/diagram">
+    <mc:Fallback xmlns:dsp="http://schemas.microsoft.com/office/drawing/2008/diagram" xmlns:dgm="http://schemas.openxmlformats.org/drawingml/2006/diagram" xmlns:c="http://schemas.openxmlformats.org/drawingml/2006/chart" xmlns="">
       <p:transition/>
     </mc:Fallback>
   </mc:AlternateContent>

</xml_diff>